<commit_message>
Add slide content in part I
</commit_message>
<xml_diff>
--- a/Report/Presentation.pptx
+++ b/Report/Presentation.pptx
@@ -8,9 +8,10 @@
   <p:sldIdLst>
     <p:sldId id="256" r:id="rId3"/>
     <p:sldId id="257" r:id="rId4"/>
-    <p:sldId id="263" r:id="rId5"/>
-    <p:sldId id="258" r:id="rId6"/>
-    <p:sldId id="259" r:id="rId7"/>
+    <p:sldId id="264" r:id="rId5"/>
+    <p:sldId id="263" r:id="rId6"/>
+    <p:sldId id="258" r:id="rId7"/>
+    <p:sldId id="259" r:id="rId8"/>
   </p:sldIdLst>
   <p:sldSz cx="12192000" cy="6858000"/>
   <p:notesSz cx="6858000" cy="9144000"/>
@@ -15154,18 +15155,18 @@
           <a:p>
             <a:pPr algn="ctr"/>
             <a:r>
-              <a:rPr lang="en-US" sz="6000">
+              <a:rPr lang="en-US" sz="6000" dirty="0">
                 <a:latin typeface="Tw Cen MT Bold" panose="020B0802020104020603" pitchFamily="34" charset="0"/>
               </a:rPr>
               <a:t>DIGITAL HEALTH GROUP </a:t>
             </a:r>
             <a:r>
-              <a:rPr lang="en-US" sz="3200">
+              <a:rPr lang="en-US" sz="3200" dirty="0">
                 <a:latin typeface="Tw Cen MT Bold" panose="020B0802020104020603" pitchFamily="34" charset="0"/>
               </a:rPr>
               <a:t>CONTRACT PROPOSAL</a:t>
             </a:r>
-            <a:endParaRPr lang="en-US" sz="5400">
+            <a:endParaRPr lang="en-US" sz="5400" dirty="0">
               <a:latin typeface="Tw Cen MT Bold" panose="020B0802020104020603" pitchFamily="34" charset="0"/>
             </a:endParaRPr>
           </a:p>
@@ -15315,6 +15316,45 @@
           </a:p>
         </p:txBody>
       </p:sp>
+      <p:pic>
+        <p:nvPicPr>
+          <p:cNvPr id="5" name="Picture 4" descr="A blue and white sign&#10;&#10;AI-generated content may be incorrect.">
+            <a:extLst>
+              <a:ext uri="{FF2B5EF4-FFF2-40B4-BE49-F238E27FC236}">
+                <a16:creationId xmlns:a16="http://schemas.microsoft.com/office/drawing/2014/main" id="{EE4AE324-430D-252A-F20C-00281F136E7F}"/>
+              </a:ext>
+            </a:extLst>
+          </p:cNvPr>
+          <p:cNvPicPr>
+            <a:picLocks noChangeAspect="1"/>
+          </p:cNvPicPr>
+          <p:nvPr/>
+        </p:nvPicPr>
+        <p:blipFill>
+          <a:blip r:embed="rId2">
+            <a:extLst>
+              <a:ext uri="{28A0092B-C50C-407E-A947-70E740481C1C}">
+                <a14:useLocalDpi xmlns:a14="http://schemas.microsoft.com/office/drawing/2010/main" val="0"/>
+              </a:ext>
+              <a:ext uri="{837473B0-CC2E-450A-ABE3-18F120FF3D39}">
+                <a1611:picAttrSrcUrl xmlns:a1611="http://schemas.microsoft.com/office/drawing/2016/11/main" r:id="rId3"/>
+              </a:ext>
+            </a:extLst>
+          </a:blip>
+          <a:stretch>
+            <a:fillRect/>
+          </a:stretch>
+        </p:blipFill>
+        <p:spPr>
+          <a:xfrm>
+            <a:off x="7421111" y="4938938"/>
+            <a:ext cx="1345130" cy="1345130"/>
+          </a:xfrm>
+          <a:prstGeom prst="rect">
+            <a:avLst/>
+          </a:prstGeom>
+        </p:spPr>
+      </p:pic>
     </p:spTree>
     <p:extLst>
       <p:ext uri="{BB962C8B-B14F-4D97-AF65-F5344CB8AC3E}">
@@ -15364,7 +15404,7 @@
         <p:spPr>
           <a:xfrm>
             <a:off x="625702" y="483712"/>
-            <a:ext cx="4555897" cy="1010791"/>
+            <a:ext cx="6132286" cy="1010791"/>
           </a:xfrm>
         </p:spPr>
         <p:txBody>
@@ -15372,42 +15412,14 @@
           <a:lstStyle/>
           <a:p>
             <a:r>
-              <a:rPr lang="en-US" sz="4000">
+              <a:rPr lang="en-US" sz="4000" dirty="0">
                 <a:latin typeface="Tw Cen MT Bold" panose="020B0802020104020603" pitchFamily="34" charset="0"/>
               </a:rPr>
-              <a:t>PART I: </a:t>
+              <a:t>Clinical Modelling Project</a:t>
             </a:r>
-            <a:r>
-              <a:rPr lang="en-US" sz="4000" i="1">
-                <a:latin typeface="Tw Cen MT" panose="020B0602020104020603" pitchFamily="34" charset="0"/>
-              </a:rPr>
-              <a:t>The Problem</a:t>
-            </a:r>
-          </a:p>
-        </p:txBody>
-      </p:sp>
-      <p:sp>
-        <p:nvSpPr>
-          <p:cNvPr id="4" name="Subtitle 3">
-            <a:extLst>
-              <a:ext uri="{FF2B5EF4-FFF2-40B4-BE49-F238E27FC236}">
-                <a16:creationId xmlns:a16="http://schemas.microsoft.com/office/drawing/2014/main" id="{61590CD8-AEA0-AC73-ECE4-6A9FBB312D68}"/>
-              </a:ext>
-            </a:extLst>
-          </p:cNvPr>
-          <p:cNvSpPr>
-            <a:spLocks noGrp="1"/>
-          </p:cNvSpPr>
-          <p:nvPr>
-            <p:ph type="subTitle" idx="1"/>
-          </p:nvPr>
-        </p:nvSpPr>
-        <p:spPr/>
-        <p:txBody>
-          <a:bodyPr/>
-          <a:lstStyle/>
-          <a:p>
-            <a:endParaRPr lang="en-AU"/>
+            <a:endParaRPr lang="en-US" sz="4000" i="1" dirty="0">
+              <a:latin typeface="Tw Cen MT" panose="020B0602020104020603" pitchFamily="34" charset="0"/>
+            </a:endParaRPr>
           </a:p>
         </p:txBody>
       </p:sp>
@@ -15427,62 +15439,54 @@
             <p:ph type="subTitle" idx="2"/>
           </p:nvPr>
         </p:nvSpPr>
-        <p:spPr/>
+        <p:spPr>
+          <a:xfrm>
+            <a:off x="676402" y="1544736"/>
+            <a:ext cx="10564798" cy="2326873"/>
+          </a:xfrm>
+        </p:spPr>
         <p:txBody>
           <a:bodyPr/>
           <a:lstStyle/>
           <a:p>
-            <a:endParaRPr lang="en-AU"/>
+            <a:pPr>
+              <a:lnSpc>
+                <a:spcPct val="150000"/>
+              </a:lnSpc>
+              <a:buFont typeface="Arial" panose="020B0604020202020204" pitchFamily="34" charset="0"/>
+              <a:buChar char="•"/>
+            </a:pPr>
+            <a:r>
+              <a:rPr lang="en-US" sz="2000" dirty="0"/>
+              <a:t>Tackling real-world healthcare challenges through modelling</a:t>
+            </a:r>
           </a:p>
-        </p:txBody>
-      </p:sp>
-      <p:sp>
-        <p:nvSpPr>
-          <p:cNvPr id="6" name="Subtitle 5">
-            <a:extLst>
-              <a:ext uri="{FF2B5EF4-FFF2-40B4-BE49-F238E27FC236}">
-                <a16:creationId xmlns:a16="http://schemas.microsoft.com/office/drawing/2014/main" id="{EE806D20-38C8-0568-0097-3C7172A7C111}"/>
-              </a:ext>
-            </a:extLst>
-          </p:cNvPr>
-          <p:cNvSpPr>
-            <a:spLocks noGrp="1"/>
-          </p:cNvSpPr>
-          <p:nvPr>
-            <p:ph type="subTitle" idx="3"/>
-          </p:nvPr>
-        </p:nvSpPr>
-        <p:spPr/>
-        <p:txBody>
-          <a:bodyPr/>
-          <a:lstStyle/>
           <a:p>
-            <a:endParaRPr lang="en-AU"/>
+            <a:pPr>
+              <a:lnSpc>
+                <a:spcPct val="150000"/>
+              </a:lnSpc>
+              <a:buFont typeface="Arial" panose="020B0604020202020204" pitchFamily="34" charset="0"/>
+              <a:buChar char="•"/>
+            </a:pPr>
+            <a:r>
+              <a:rPr lang="en-US" sz="2000" dirty="0"/>
+              <a:t>Focus: MRI brain analysis (Part I) + image-based feature extraction (Part II)</a:t>
+            </a:r>
           </a:p>
-        </p:txBody>
-      </p:sp>
-      <p:sp>
-        <p:nvSpPr>
-          <p:cNvPr id="7" name="Subtitle 6">
-            <a:extLst>
-              <a:ext uri="{FF2B5EF4-FFF2-40B4-BE49-F238E27FC236}">
-                <a16:creationId xmlns:a16="http://schemas.microsoft.com/office/drawing/2014/main" id="{AB8F3B09-1A31-5B6B-317F-05137CCEECD1}"/>
-              </a:ext>
-            </a:extLst>
-          </p:cNvPr>
-          <p:cNvSpPr>
-            <a:spLocks noGrp="1"/>
-          </p:cNvSpPr>
-          <p:nvPr>
-            <p:ph type="subTitle" idx="4"/>
-          </p:nvPr>
-        </p:nvSpPr>
-        <p:spPr/>
-        <p:txBody>
-          <a:bodyPr/>
-          <a:lstStyle/>
           <a:p>
-            <a:endParaRPr lang="en-AU"/>
+            <a:pPr>
+              <a:lnSpc>
+                <a:spcPct val="150000"/>
+              </a:lnSpc>
+              <a:buFont typeface="Arial" panose="020B0604020202020204" pitchFamily="34" charset="0"/>
+              <a:buChar char="•"/>
+            </a:pPr>
+            <a:r>
+              <a:rPr lang="en-US" sz="2000" dirty="0"/>
+              <a:t>Goal: turn complex data into diagnostic insights</a:t>
+            </a:r>
+            <a:endParaRPr lang="en-AU" sz="2000" dirty="0"/>
           </a:p>
         </p:txBody>
       </p:sp>
@@ -15500,6 +15504,156 @@
 </file>
 
 <file path=ppt/slides/slide3.xml><?xml version="1.0" encoding="utf-8"?>
+<p:sld xmlns:a="http://schemas.openxmlformats.org/drawingml/2006/main" xmlns:r="http://schemas.openxmlformats.org/officeDocument/2006/relationships" xmlns:p="http://schemas.openxmlformats.org/presentationml/2006/main">
+  <p:cSld>
+    <p:spTree>
+      <p:nvGrpSpPr>
+        <p:cNvPr id="1" name=""/>
+        <p:cNvGrpSpPr/>
+        <p:nvPr/>
+      </p:nvGrpSpPr>
+      <p:grpSpPr>
+        <a:xfrm>
+          <a:off x="0" y="0"/>
+          <a:ext cx="0" cy="0"/>
+          <a:chOff x="0" y="0"/>
+          <a:chExt cx="0" cy="0"/>
+        </a:xfrm>
+      </p:grpSpPr>
+      <p:sp>
+        <p:nvSpPr>
+          <p:cNvPr id="2" name="Title 1">
+            <a:extLst>
+              <a:ext uri="{FF2B5EF4-FFF2-40B4-BE49-F238E27FC236}">
+                <a16:creationId xmlns:a16="http://schemas.microsoft.com/office/drawing/2014/main" id="{DE65DC02-C0CB-5789-6E04-C877D2EBBA4D}"/>
+              </a:ext>
+            </a:extLst>
+          </p:cNvPr>
+          <p:cNvSpPr>
+            <a:spLocks noGrp="1"/>
+          </p:cNvSpPr>
+          <p:nvPr>
+            <p:ph type="title"/>
+          </p:nvPr>
+        </p:nvSpPr>
+        <p:spPr>
+          <a:xfrm>
+            <a:off x="658845" y="861851"/>
+            <a:ext cx="9564925" cy="1279600"/>
+          </a:xfrm>
+        </p:spPr>
+        <p:txBody>
+          <a:bodyPr/>
+          <a:lstStyle/>
+          <a:p>
+            <a:r>
+              <a:rPr lang="en-US" sz="4400" b="1" dirty="0"/>
+              <a:t>Water Movement Reveals Brain Health</a:t>
+            </a:r>
+            <a:endParaRPr lang="en-AU" sz="4400" b="1" dirty="0"/>
+          </a:p>
+        </p:txBody>
+      </p:sp>
+      <p:sp>
+        <p:nvSpPr>
+          <p:cNvPr id="6" name="Subtitle 5">
+            <a:extLst>
+              <a:ext uri="{FF2B5EF4-FFF2-40B4-BE49-F238E27FC236}">
+                <a16:creationId xmlns:a16="http://schemas.microsoft.com/office/drawing/2014/main" id="{CF3DBFDB-E167-5C52-100F-3529656C333D}"/>
+              </a:ext>
+            </a:extLst>
+          </p:cNvPr>
+          <p:cNvSpPr>
+            <a:spLocks noGrp="1"/>
+          </p:cNvSpPr>
+          <p:nvPr>
+            <p:ph type="subTitle" idx="4"/>
+          </p:nvPr>
+        </p:nvSpPr>
+        <p:spPr>
+          <a:xfrm>
+            <a:off x="658845" y="2141451"/>
+            <a:ext cx="10635916" cy="1812758"/>
+          </a:xfrm>
+        </p:spPr>
+        <p:txBody>
+          <a:bodyPr/>
+          <a:lstStyle/>
+          <a:p>
+            <a:pPr marL="495300" indent="-342900">
+              <a:lnSpc>
+                <a:spcPct val="150000"/>
+              </a:lnSpc>
+              <a:buFont typeface="Arial" panose="020B0604020202020204" pitchFamily="34" charset="0"/>
+              <a:buChar char="•"/>
+            </a:pPr>
+            <a:r>
+              <a:rPr lang="en-US" dirty="0"/>
+              <a:t>In healthy brains, water moves along nerve </a:t>
+            </a:r>
+            <a:r>
+              <a:rPr lang="en-US" dirty="0" err="1"/>
+              <a:t>fibres</a:t>
+            </a:r>
+            <a:endParaRPr lang="en-US" dirty="0"/>
+          </a:p>
+          <a:p>
+            <a:pPr marL="495300" indent="-342900">
+              <a:lnSpc>
+                <a:spcPct val="150000"/>
+              </a:lnSpc>
+              <a:buFont typeface="Arial" panose="020B0604020202020204" pitchFamily="34" charset="0"/>
+              <a:buChar char="•"/>
+            </a:pPr>
+            <a:r>
+              <a:rPr lang="en-US" dirty="0"/>
+              <a:t>Tissue damage disrupts this flow</a:t>
+            </a:r>
+          </a:p>
+          <a:p>
+            <a:pPr marL="495300" indent="-342900">
+              <a:lnSpc>
+                <a:spcPct val="150000"/>
+              </a:lnSpc>
+              <a:buFont typeface="Arial" panose="020B0604020202020204" pitchFamily="34" charset="0"/>
+              <a:buChar char="•"/>
+            </a:pPr>
+            <a:r>
+              <a:rPr lang="en-US" dirty="0"/>
+              <a:t>DTI helps detect strokes, </a:t>
+            </a:r>
+            <a:r>
+              <a:rPr lang="en-US" dirty="0" err="1"/>
+              <a:t>tumours</a:t>
+            </a:r>
+            <a:r>
+              <a:rPr lang="en-US" dirty="0"/>
+              <a:t>, and degeneration earlier</a:t>
+            </a:r>
+          </a:p>
+          <a:p>
+            <a:pPr marL="495300" indent="-342900" algn="ctr">
+              <a:buFont typeface="Arial" panose="020B0604020202020204" pitchFamily="34" charset="0"/>
+              <a:buChar char="•"/>
+            </a:pPr>
+            <a:endParaRPr lang="en-AU" dirty="0"/>
+          </a:p>
+        </p:txBody>
+      </p:sp>
+    </p:spTree>
+    <p:extLst>
+      <p:ext uri="{BB962C8B-B14F-4D97-AF65-F5344CB8AC3E}">
+        <p14:creationId xmlns:p14="http://schemas.microsoft.com/office/powerpoint/2010/main" val="830529124"/>
+      </p:ext>
+    </p:extLst>
+  </p:cSld>
+  <p:clrMapOvr>
+    <a:masterClrMapping/>
+  </p:clrMapOvr>
+</p:sld>
+</file>
+
+<file path=ppt/slides/slide4.xml><?xml version="1.0" encoding="utf-8"?>
 <p:sld xmlns:a="http://schemas.openxmlformats.org/drawingml/2006/main" xmlns:r="http://schemas.openxmlformats.org/officeDocument/2006/relationships" xmlns:p="http://schemas.openxmlformats.org/presentationml/2006/main">
   <p:cSld>
     <p:spTree>
@@ -15570,7 +15724,7 @@
 </p:sld>
 </file>
 
-<file path=ppt/slides/slide4.xml><?xml version="1.0" encoding="utf-8"?>
+<file path=ppt/slides/slide5.xml><?xml version="1.0" encoding="utf-8"?>
 <p:sld xmlns:a="http://schemas.openxmlformats.org/drawingml/2006/main" xmlns:r="http://schemas.openxmlformats.org/officeDocument/2006/relationships" xmlns:p="http://schemas.openxmlformats.org/presentationml/2006/main">
   <p:cSld>
     <p:spTree>
@@ -15641,7 +15795,7 @@
 </p:sld>
 </file>
 
-<file path=ppt/slides/slide5.xml><?xml version="1.0" encoding="utf-8"?>
+<file path=ppt/slides/slide6.xml><?xml version="1.0" encoding="utf-8"?>
 <p:sld xmlns:a="http://schemas.openxmlformats.org/drawingml/2006/main" xmlns:r="http://schemas.openxmlformats.org/officeDocument/2006/relationships" xmlns:p="http://schemas.openxmlformats.org/presentationml/2006/main">
   <p:cSld>
     <p:spTree>

</xml_diff>

<commit_message>
Improved formatting and grammar for all existing work in Part1
For professionalism and aesthetics
</commit_message>
<xml_diff>
--- a/Report/Presentation.pptx
+++ b/Report/Presentation.pptx
@@ -15205,7 +15205,7 @@
           </a:p>
           <a:p>
             <a:pPr algn="l"/>
-            <a:endParaRPr lang="en-US" sz="900" b="1">
+            <a:endParaRPr lang="en-US" sz="900" b="1" dirty="0">
               <a:latin typeface="Segoe UI Light" panose="020B0502040204020203" pitchFamily="34" charset="0"/>
               <a:cs typeface="Segoe UI Light" panose="020B0502040204020203" pitchFamily="34" charset="0"/>
             </a:endParaRPr>
@@ -15252,7 +15252,7 @@
             <a:endParaRPr lang="en-US" dirty="0"/>
           </a:p>
           <a:p>
-            <a:endParaRPr lang="en-US"/>
+            <a:endParaRPr lang="en-US" dirty="0"/>
           </a:p>
         </p:txBody>
       </p:sp>
@@ -15270,7 +15270,7 @@
         </p:nvSpPr>
         <p:spPr>
           <a:xfrm>
-            <a:off x="103239" y="111583"/>
+            <a:off x="545691" y="131248"/>
             <a:ext cx="6105832" cy="292388"/>
           </a:xfrm>
           <a:prstGeom prst="rect">
@@ -15286,7 +15286,7 @@
           <a:p>
             <a:pPr algn="l"/>
             <a:r>
-              <a:rPr lang="en-US" sz="1300" b="1">
+              <a:rPr lang="en-US" sz="1300" b="1" dirty="0">
                 <a:solidFill>
                   <a:schemeClr val="tx1"/>
                 </a:solidFill>
@@ -15296,7 +15296,7 @@
               <a:t>MXB201 Group Project </a:t>
             </a:r>
             <a:r>
-              <a:rPr lang="en-AU" sz="1300" b="1" i="0">
+              <a:rPr lang="en-AU" sz="1300" b="1" i="0" dirty="0">
                 <a:solidFill>
                   <a:srgbClr val="FFFFFF"/>
                 </a:solidFill>
@@ -15306,7 +15306,7 @@
               </a:rPr>
               <a:t>— Group 15</a:t>
             </a:r>
-            <a:endParaRPr lang="en-US" sz="1300" b="1">
+            <a:endParaRPr lang="en-US" sz="1300" b="1" dirty="0">
               <a:solidFill>
                 <a:schemeClr val="tx1"/>
               </a:solidFill>
@@ -15331,7 +15331,7 @@
           <p:nvPr/>
         </p:nvPicPr>
         <p:blipFill>
-          <a:blip r:embed="rId2">
+          <a:blip r:embed="rId2" cstate="print">
             <a:extLst>
               <a:ext uri="{28A0092B-C50C-407E-A947-70E740481C1C}">
                 <a14:useLocalDpi xmlns:a14="http://schemas.microsoft.com/office/drawing/2010/main" val="0"/>
@@ -15347,8 +15347,8 @@
         </p:blipFill>
         <p:spPr>
           <a:xfrm>
-            <a:off x="7421111" y="4938938"/>
-            <a:ext cx="1345130" cy="1345130"/>
+            <a:off x="125577" y="115634"/>
+            <a:ext cx="395534" cy="395534"/>
           </a:xfrm>
           <a:prstGeom prst="rect">
             <a:avLst/>
@@ -15401,7 +15401,7 @@
         </p:nvSpPr>
         <p:spPr>
           <a:xfrm>
-            <a:off x="845685" y="4052494"/>
+            <a:off x="767028" y="4180315"/>
             <a:ext cx="6132286" cy="1010791"/>
           </a:xfrm>
           <a:prstGeom prst="rect">
@@ -15665,19 +15665,19 @@
           </a:lstStyle>
           <a:p>
             <a:r>
-              <a:rPr lang="en-US" sz="4000" b="1" dirty="0">
-                <a:latin typeface="+mj-lt"/>
+              <a:rPr lang="en-US" sz="3600" b="1" dirty="0">
+                <a:latin typeface="Tw Cen MT Bold" panose="020B0802020104020603" pitchFamily="34" charset="0"/>
               </a:rPr>
-              <a:t>Overview</a:t>
+              <a:t>OVERVIEW</a:t>
             </a:r>
             <a:r>
-              <a:rPr lang="en-US" sz="4000" dirty="0">
-                <a:latin typeface="+mj-lt"/>
+              <a:rPr lang="en-US" sz="4000" b="1" dirty="0">
+                <a:latin typeface="Tw Cen MT Bold" panose="020B0802020104020603" pitchFamily="34" charset="0"/>
               </a:rPr>
               <a:t>:</a:t>
             </a:r>
             <a:endParaRPr lang="en-US" sz="4000" i="1" dirty="0">
-              <a:latin typeface="+mj-lt"/>
+              <a:latin typeface="Tw Cen MT Bold" panose="020B0802020104020603" pitchFamily="34" charset="0"/>
             </a:endParaRPr>
           </a:p>
         </p:txBody>
@@ -15970,7 +15970,8 @@
             </a:pPr>
             <a:r>
               <a:rPr lang="en-US" sz="2400" dirty="0">
-                <a:latin typeface="+mn-lt"/>
+                <a:latin typeface="Segoe UI Light" panose="020B0502040204020203" pitchFamily="34" charset="0"/>
+                <a:cs typeface="Segoe UI Light" panose="020B0502040204020203" pitchFamily="34" charset="0"/>
               </a:rPr>
               <a:t>Part I: Brain analysis using DTI MRI scans</a:t>
             </a:r>
@@ -15985,12 +15986,14 @@
             </a:pPr>
             <a:r>
               <a:rPr lang="en-US" sz="2400" dirty="0">
-                <a:latin typeface="+mn-lt"/>
+                <a:latin typeface="Segoe UI Light" panose="020B0502040204020203" pitchFamily="34" charset="0"/>
+                <a:cs typeface="Segoe UI Light" panose="020B0502040204020203" pitchFamily="34" charset="0"/>
               </a:rPr>
               <a:t>Part II: Image-based feature extraction using machine learning</a:t>
             </a:r>
             <a:endParaRPr lang="en-AU" sz="2400" dirty="0">
-              <a:latin typeface="+mn-lt"/>
+              <a:latin typeface="Segoe UI Light" panose="020B0502040204020203" pitchFamily="34" charset="0"/>
+              <a:cs typeface="Segoe UI Light" panose="020B0502040204020203" pitchFamily="34" charset="0"/>
             </a:endParaRPr>
           </a:p>
         </p:txBody>
@@ -16011,8 +16014,8 @@
         </p:nvSpPr>
         <p:spPr>
           <a:xfrm>
-            <a:off x="637138" y="577765"/>
-            <a:ext cx="6132286" cy="1010791"/>
+            <a:off x="761852" y="794076"/>
+            <a:ext cx="6007572" cy="799427"/>
           </a:xfrm>
           <a:prstGeom prst="rect">
             <a:avLst/>
@@ -16275,14 +16278,14 @@
           </a:lstStyle>
           <a:p>
             <a:r>
-              <a:rPr lang="en-US" sz="4000" b="1" dirty="0">
-                <a:latin typeface="+mj-lt"/>
+              <a:rPr lang="en-US" sz="3600" b="1" dirty="0">
+                <a:latin typeface="Tw Cen MT Bold" panose="020B0802020104020603" pitchFamily="34" charset="0"/>
               </a:rPr>
-              <a:t>Aim</a:t>
+              <a:t>AIM</a:t>
             </a:r>
             <a:r>
               <a:rPr lang="en-US" sz="4000" dirty="0">
-                <a:latin typeface="+mj-lt"/>
+                <a:latin typeface="Tw Cen MT Bold" panose="020B0802020104020603" pitchFamily="34" charset="0"/>
               </a:rPr>
               <a:t>:</a:t>
             </a:r>
@@ -16305,8 +16308,8 @@
         </p:nvSpPr>
         <p:spPr>
           <a:xfrm>
-            <a:off x="414822" y="1411705"/>
-            <a:ext cx="11362356" cy="2640789"/>
+            <a:off x="637138" y="1411705"/>
+            <a:ext cx="10709177" cy="2088579"/>
           </a:xfrm>
           <a:prstGeom prst="rect">
             <a:avLst/>
@@ -16577,7 +16580,8 @@
             </a:pPr>
             <a:r>
               <a:rPr lang="en-AU" sz="2400" dirty="0">
-                <a:latin typeface="+mn-lt"/>
+                <a:latin typeface="Segoe UI Light" panose="020B0502040204020203" pitchFamily="34" charset="0"/>
+                <a:cs typeface="Segoe UI Light" panose="020B0502040204020203" pitchFamily="34" charset="0"/>
               </a:rPr>
               <a:t>Transform complex medical imaging data into clinically useful insights</a:t>
             </a:r>
@@ -16592,7 +16596,8 @@
             </a:pPr>
             <a:r>
               <a:rPr lang="en-AU" sz="2400" dirty="0">
-                <a:latin typeface="+mn-lt"/>
+                <a:latin typeface="Segoe UI Light" panose="020B0502040204020203" pitchFamily="34" charset="0"/>
+                <a:cs typeface="Segoe UI Light" panose="020B0502040204020203" pitchFamily="34" charset="0"/>
               </a:rPr>
               <a:t>Apply mathematical modelling to estimate brain tissue health from MRI scans</a:t>
             </a:r>
@@ -16607,7 +16612,8 @@
             </a:pPr>
             <a:r>
               <a:rPr lang="en-AU" sz="2400" dirty="0">
-                <a:latin typeface="+mn-lt"/>
+                <a:latin typeface="Segoe UI Light" panose="020B0502040204020203" pitchFamily="34" charset="0"/>
+                <a:cs typeface="Segoe UI Light" panose="020B0502040204020203" pitchFamily="34" charset="0"/>
               </a:rPr>
               <a:t>Use image analysis techniques to extract diagnostic features from medical images</a:t>
             </a:r>
@@ -16662,8 +16668,8 @@
         </p:nvSpPr>
         <p:spPr>
           <a:xfrm>
-            <a:off x="778042" y="2176652"/>
-            <a:ext cx="10635916" cy="2504696"/>
+            <a:off x="778042" y="2471360"/>
+            <a:ext cx="9919455" cy="2504696"/>
           </a:xfrm>
         </p:spPr>
         <p:txBody>
@@ -16671,7 +16677,10 @@
           <a:lstStyle/>
           <a:p>
             <a:pPr marL="152400" indent="0"/>
-            <a:endParaRPr lang="en-US" sz="2400" dirty="0"/>
+            <a:endParaRPr lang="en-US" sz="2400" dirty="0">
+              <a:latin typeface="Segoe UI Light" panose="020B0502040204020203" pitchFamily="34" charset="0"/>
+              <a:cs typeface="Segoe UI Light" panose="020B0502040204020203" pitchFamily="34" charset="0"/>
+            </a:endParaRPr>
           </a:p>
           <a:p>
             <a:pPr marL="495300" indent="-342900">
@@ -16679,8 +16688,11 @@
               <a:buChar char="•"/>
             </a:pPr>
             <a:r>
-              <a:rPr lang="en-US" sz="2400" dirty="0"/>
-              <a:t>DTI (Diffusion Tensor Imaging): A type of MRI that tracks how water molecules move through brain tissue</a:t>
+              <a:rPr lang="en-US" sz="2400" dirty="0">
+                <a:latin typeface="Segoe UI Light" panose="020B0502040204020203" pitchFamily="34" charset="0"/>
+                <a:cs typeface="Segoe UI Light" panose="020B0502040204020203" pitchFamily="34" charset="0"/>
+              </a:rPr>
+              <a:t>Diffusion Tensor Imaging (DTI): A type of MRI that tracks how water molecules move through brain tissue</a:t>
             </a:r>
           </a:p>
           <a:p>
@@ -16688,7 +16700,10 @@
               <a:buFont typeface="Arial" panose="020B0604020202020204" pitchFamily="34" charset="0"/>
               <a:buChar char="•"/>
             </a:pPr>
-            <a:endParaRPr lang="en-US" sz="2400" dirty="0"/>
+            <a:endParaRPr lang="en-US" sz="2400" dirty="0">
+              <a:latin typeface="Segoe UI Light" panose="020B0502040204020203" pitchFamily="34" charset="0"/>
+              <a:cs typeface="Segoe UI Light" panose="020B0502040204020203" pitchFamily="34" charset="0"/>
+            </a:endParaRPr>
           </a:p>
           <a:p>
             <a:pPr marL="495300" indent="-342900">
@@ -16696,8 +16711,11 @@
               <a:buChar char="•"/>
             </a:pPr>
             <a:r>
-              <a:rPr lang="en-US" sz="2400" dirty="0"/>
-              <a:t>Detects early, subtle tissue changes clinicians can act on</a:t>
+              <a:rPr lang="en-US" sz="2400" dirty="0">
+                <a:latin typeface="Segoe UI Light" panose="020B0502040204020203" pitchFamily="34" charset="0"/>
+                <a:cs typeface="Segoe UI Light" panose="020B0502040204020203" pitchFamily="34" charset="0"/>
+              </a:rPr>
+              <a:t>Early detection of subtle tissue changes clinicians can act on</a:t>
             </a:r>
           </a:p>
           <a:p>
@@ -16705,7 +16723,10 @@
               <a:buFont typeface="Arial" panose="020B0604020202020204" pitchFamily="34" charset="0"/>
               <a:buChar char="•"/>
             </a:pPr>
-            <a:endParaRPr lang="en-US" sz="2400" dirty="0"/>
+            <a:endParaRPr lang="en-US" sz="2400" dirty="0">
+              <a:latin typeface="Segoe UI Light" panose="020B0502040204020203" pitchFamily="34" charset="0"/>
+              <a:cs typeface="Segoe UI Light" panose="020B0502040204020203" pitchFamily="34" charset="0"/>
+            </a:endParaRPr>
           </a:p>
           <a:p>
             <a:pPr marL="495300" indent="-342900">
@@ -16713,10 +16734,16 @@
               <a:buChar char="•"/>
             </a:pPr>
             <a:r>
-              <a:rPr lang="en-US" sz="2400" dirty="0"/>
+              <a:rPr lang="en-US" sz="2400" dirty="0">
+                <a:latin typeface="Segoe UI Light" panose="020B0502040204020203" pitchFamily="34" charset="0"/>
+                <a:cs typeface="Segoe UI Light" panose="020B0502040204020203" pitchFamily="34" charset="0"/>
+              </a:rPr>
               <a:t>Enables faster, more confident decision-making in healthcare</a:t>
             </a:r>
-            <a:endParaRPr lang="en-AU" sz="2400" dirty="0"/>
+            <a:endParaRPr lang="en-AU" sz="2400" dirty="0">
+              <a:latin typeface="Segoe UI Light" panose="020B0502040204020203" pitchFamily="34" charset="0"/>
+              <a:cs typeface="Segoe UI Light" panose="020B0502040204020203" pitchFamily="34" charset="0"/>
+            </a:endParaRPr>
           </a:p>
         </p:txBody>
       </p:sp>
@@ -16734,7 +16761,7 @@
         </p:nvSpPr>
         <p:spPr>
           <a:xfrm>
-            <a:off x="778042" y="1001266"/>
+            <a:off x="778042" y="589284"/>
             <a:ext cx="9601200" cy="707886"/>
           </a:xfrm>
           <a:prstGeom prst="rect">
@@ -16753,15 +16780,123 @@
                 <a:solidFill>
                   <a:schemeClr val="tx1"/>
                 </a:solidFill>
-                <a:latin typeface="+mj-lt"/>
+                <a:latin typeface="Tw Cen MT Bold" panose="020B0802020104020603" pitchFamily="34" charset="0"/>
               </a:rPr>
-              <a:t>What is DTI – and Why It’s Powerful</a:t>
+              <a:t>PART I: </a:t>
             </a:r>
-            <a:endParaRPr lang="en-AU" sz="4000" b="1" dirty="0">
+            <a:r>
+              <a:rPr lang="en-US" sz="4000" dirty="0">
+                <a:solidFill>
+                  <a:schemeClr val="tx1"/>
+                </a:solidFill>
+                <a:latin typeface="Tw Cen MT" panose="020B0602020104020603" pitchFamily="34" charset="0"/>
+              </a:rPr>
+              <a:t>DTI</a:t>
+            </a:r>
+            <a:endParaRPr lang="en-AU" sz="4000" dirty="0">
               <a:solidFill>
                 <a:schemeClr val="tx1"/>
               </a:solidFill>
-              <a:latin typeface="+mj-lt"/>
+              <a:latin typeface="Tw Cen MT" panose="020B0602020104020603" pitchFamily="34" charset="0"/>
+            </a:endParaRPr>
+          </a:p>
+        </p:txBody>
+      </p:sp>
+      <p:sp>
+        <p:nvSpPr>
+          <p:cNvPr id="5" name="TextBox 4">
+            <a:extLst>
+              <a:ext uri="{FF2B5EF4-FFF2-40B4-BE49-F238E27FC236}">
+                <a16:creationId xmlns:a16="http://schemas.microsoft.com/office/drawing/2014/main" id="{B90D0033-B0F4-D868-1F99-582C1B6C7AA5}"/>
+              </a:ext>
+            </a:extLst>
+          </p:cNvPr>
+          <p:cNvSpPr txBox="1"/>
+          <p:nvPr/>
+        </p:nvSpPr>
+        <p:spPr>
+          <a:xfrm>
+            <a:off x="778042" y="1299489"/>
+            <a:ext cx="6105832" cy="538609"/>
+          </a:xfrm>
+          <a:prstGeom prst="rect">
+            <a:avLst/>
+          </a:prstGeom>
+          <a:noFill/>
+        </p:spPr>
+        <p:txBody>
+          <a:bodyPr wrap="square">
+            <a:spAutoFit/>
+          </a:bodyPr>
+          <a:lstStyle/>
+          <a:p>
+            <a:r>
+              <a:rPr lang="en-US" sz="2900" b="0" i="1" dirty="0">
+                <a:solidFill>
+                  <a:schemeClr val="tx1"/>
+                </a:solidFill>
+                <a:latin typeface="Tw Cen MT" panose="020B0602020104020603" pitchFamily="34" charset="0"/>
+              </a:rPr>
+              <a:t>What</a:t>
+            </a:r>
+            <a:r>
+              <a:rPr lang="en-US" sz="2900" b="0" dirty="0">
+                <a:solidFill>
+                  <a:schemeClr val="tx1"/>
+                </a:solidFill>
+                <a:latin typeface="Tw Cen MT" panose="020B0602020104020603" pitchFamily="34" charset="0"/>
+              </a:rPr>
+              <a:t> is </a:t>
+            </a:r>
+            <a:r>
+              <a:rPr lang="en-US" sz="2900" b="1" dirty="0">
+                <a:solidFill>
+                  <a:schemeClr val="tx1"/>
+                </a:solidFill>
+                <a:latin typeface="Tw Cen MT" panose="020B0602020104020603" pitchFamily="34" charset="0"/>
+              </a:rPr>
+              <a:t>DTI</a:t>
+            </a:r>
+            <a:r>
+              <a:rPr lang="en-US" sz="2900" b="0" dirty="0">
+                <a:solidFill>
+                  <a:schemeClr val="tx1"/>
+                </a:solidFill>
+                <a:latin typeface="Tw Cen MT" panose="020B0602020104020603" pitchFamily="34" charset="0"/>
+              </a:rPr>
+              <a:t> and </a:t>
+            </a:r>
+            <a:r>
+              <a:rPr lang="en-US" sz="2900" b="0" i="1" dirty="0">
+                <a:solidFill>
+                  <a:schemeClr val="tx1"/>
+                </a:solidFill>
+                <a:latin typeface="Tw Cen MT" panose="020B0602020104020603" pitchFamily="34" charset="0"/>
+              </a:rPr>
+              <a:t>Why</a:t>
+            </a:r>
+            <a:r>
+              <a:rPr lang="en-US" sz="2900" b="0" dirty="0">
+                <a:solidFill>
+                  <a:schemeClr val="tx1"/>
+                </a:solidFill>
+                <a:latin typeface="Tw Cen MT" panose="020B0602020104020603" pitchFamily="34" charset="0"/>
+              </a:rPr>
+              <a:t> it’s </a:t>
+            </a:r>
+            <a:r>
+              <a:rPr lang="en-US" sz="2900" b="1" dirty="0">
+                <a:solidFill>
+                  <a:schemeClr val="tx1"/>
+                </a:solidFill>
+                <a:latin typeface="Tw Cen MT" panose="020B0602020104020603" pitchFamily="34" charset="0"/>
+              </a:rPr>
+              <a:t>Powerful ↴</a:t>
+            </a:r>
+            <a:endParaRPr lang="en-AU" sz="2900" dirty="0">
+              <a:solidFill>
+                <a:schemeClr val="tx1"/>
+              </a:solidFill>
             </a:endParaRPr>
           </a:p>
         </p:txBody>

</xml_diff>

<commit_message>
re-do my slides and added relevant images
</commit_message>
<xml_diff>
--- a/Report/Presentation.pptx
+++ b/Report/Presentation.pptx
@@ -5,13 +5,17 @@
     <p:sldMasterId id="2147483672" r:id="rId1"/>
     <p:sldMasterId id="2147483696" r:id="rId2"/>
   </p:sldMasterIdLst>
+  <p:notesMasterIdLst>
+    <p:notesMasterId r:id="rId10"/>
+  </p:notesMasterIdLst>
   <p:sldIdLst>
     <p:sldId id="256" r:id="rId3"/>
     <p:sldId id="257" r:id="rId4"/>
     <p:sldId id="264" r:id="rId5"/>
-    <p:sldId id="263" r:id="rId6"/>
-    <p:sldId id="258" r:id="rId7"/>
-    <p:sldId id="259" r:id="rId8"/>
+    <p:sldId id="265" r:id="rId6"/>
+    <p:sldId id="263" r:id="rId7"/>
+    <p:sldId id="258" r:id="rId8"/>
+    <p:sldId id="259" r:id="rId9"/>
   </p:sldIdLst>
   <p:sldSz cx="12192000" cy="6858000"/>
   <p:notesSz cx="6858000" cy="9144000"/>
@@ -264,6 +268,551 @@
     <p1510:client id="{F8974FA8-AD47-451F-BEDE-FF0C4B3EDA56}" v="16" dt="2025-05-22T09:23:20.447"/>
   </p1510:revLst>
 </p1510:revInfo>
+</file>
+
+<file path=ppt/notesMasters/notesMaster1.xml><?xml version="1.0" encoding="utf-8"?>
+<p:notesMaster xmlns:a="http://schemas.openxmlformats.org/drawingml/2006/main" xmlns:r="http://schemas.openxmlformats.org/officeDocument/2006/relationships" xmlns:p="http://schemas.openxmlformats.org/presentationml/2006/main">
+  <p:cSld>
+    <p:bg>
+      <p:bgRef idx="1001">
+        <a:schemeClr val="bg1"/>
+      </p:bgRef>
+    </p:bg>
+    <p:spTree>
+      <p:nvGrpSpPr>
+        <p:cNvPr id="1" name=""/>
+        <p:cNvGrpSpPr/>
+        <p:nvPr/>
+      </p:nvGrpSpPr>
+      <p:grpSpPr>
+        <a:xfrm>
+          <a:off x="0" y="0"/>
+          <a:ext cx="0" cy="0"/>
+          <a:chOff x="0" y="0"/>
+          <a:chExt cx="0" cy="0"/>
+        </a:xfrm>
+      </p:grpSpPr>
+      <p:sp>
+        <p:nvSpPr>
+          <p:cNvPr id="2" name="Header Placeholder 1"/>
+          <p:cNvSpPr>
+            <a:spLocks noGrp="1"/>
+          </p:cNvSpPr>
+          <p:nvPr>
+            <p:ph type="hdr" sz="quarter"/>
+          </p:nvPr>
+        </p:nvSpPr>
+        <p:spPr>
+          <a:xfrm>
+            <a:off x="0" y="0"/>
+            <a:ext cx="2971800" cy="458788"/>
+          </a:xfrm>
+          <a:prstGeom prst="rect">
+            <a:avLst/>
+          </a:prstGeom>
+        </p:spPr>
+        <p:txBody>
+          <a:bodyPr vert="horz" lIns="91440" tIns="45720" rIns="91440" bIns="45720" rtlCol="0"/>
+          <a:lstStyle>
+            <a:lvl1pPr algn="l">
+              <a:defRPr sz="1200"/>
+            </a:lvl1pPr>
+          </a:lstStyle>
+          <a:p>
+            <a:endParaRPr lang="en-AU"/>
+          </a:p>
+        </p:txBody>
+      </p:sp>
+      <p:sp>
+        <p:nvSpPr>
+          <p:cNvPr id="3" name="Date Placeholder 2"/>
+          <p:cNvSpPr>
+            <a:spLocks noGrp="1"/>
+          </p:cNvSpPr>
+          <p:nvPr>
+            <p:ph type="dt" idx="1"/>
+          </p:nvPr>
+        </p:nvSpPr>
+        <p:spPr>
+          <a:xfrm>
+            <a:off x="3884613" y="0"/>
+            <a:ext cx="2971800" cy="458788"/>
+          </a:xfrm>
+          <a:prstGeom prst="rect">
+            <a:avLst/>
+          </a:prstGeom>
+        </p:spPr>
+        <p:txBody>
+          <a:bodyPr vert="horz" lIns="91440" tIns="45720" rIns="91440" bIns="45720" rtlCol="0"/>
+          <a:lstStyle>
+            <a:lvl1pPr algn="r">
+              <a:defRPr sz="1200"/>
+            </a:lvl1pPr>
+          </a:lstStyle>
+          <a:p>
+            <a:fld id="{56630FE1-2033-45DF-940A-B39C033298BC}" type="datetimeFigureOut">
+              <a:rPr lang="en-AU" smtClean="0"/>
+              <a:t>29/05/2025</a:t>
+            </a:fld>
+            <a:endParaRPr lang="en-AU"/>
+          </a:p>
+        </p:txBody>
+      </p:sp>
+      <p:sp>
+        <p:nvSpPr>
+          <p:cNvPr id="4" name="Slide Image Placeholder 3"/>
+          <p:cNvSpPr>
+            <a:spLocks noGrp="1" noRot="1" noChangeAspect="1"/>
+          </p:cNvSpPr>
+          <p:nvPr>
+            <p:ph type="sldImg" idx="2"/>
+          </p:nvPr>
+        </p:nvSpPr>
+        <p:spPr>
+          <a:xfrm>
+            <a:off x="685800" y="1143000"/>
+            <a:ext cx="5486400" cy="3086100"/>
+          </a:xfrm>
+          <a:prstGeom prst="rect">
+            <a:avLst/>
+          </a:prstGeom>
+          <a:noFill/>
+          <a:ln w="12700">
+            <a:solidFill>
+              <a:prstClr val="black"/>
+            </a:solidFill>
+          </a:ln>
+        </p:spPr>
+        <p:txBody>
+          <a:bodyPr vert="horz" lIns="91440" tIns="45720" rIns="91440" bIns="45720" rtlCol="0" anchor="ctr"/>
+          <a:lstStyle/>
+          <a:p>
+            <a:endParaRPr lang="en-AU"/>
+          </a:p>
+        </p:txBody>
+      </p:sp>
+      <p:sp>
+        <p:nvSpPr>
+          <p:cNvPr id="5" name="Notes Placeholder 4"/>
+          <p:cNvSpPr>
+            <a:spLocks noGrp="1"/>
+          </p:cNvSpPr>
+          <p:nvPr>
+            <p:ph type="body" sz="quarter" idx="3"/>
+          </p:nvPr>
+        </p:nvSpPr>
+        <p:spPr>
+          <a:xfrm>
+            <a:off x="685800" y="4400550"/>
+            <a:ext cx="5486400" cy="3600450"/>
+          </a:xfrm>
+          <a:prstGeom prst="rect">
+            <a:avLst/>
+          </a:prstGeom>
+        </p:spPr>
+        <p:txBody>
+          <a:bodyPr vert="horz" lIns="91440" tIns="45720" rIns="91440" bIns="45720" rtlCol="0"/>
+          <a:lstStyle/>
+          <a:p>
+            <a:pPr lvl="0"/>
+            <a:r>
+              <a:rPr lang="en-US"/>
+              <a:t>Click to edit Master text styles</a:t>
+            </a:r>
+          </a:p>
+          <a:p>
+            <a:pPr lvl="1"/>
+            <a:r>
+              <a:rPr lang="en-US"/>
+              <a:t>Second level</a:t>
+            </a:r>
+          </a:p>
+          <a:p>
+            <a:pPr lvl="2"/>
+            <a:r>
+              <a:rPr lang="en-US"/>
+              <a:t>Third level</a:t>
+            </a:r>
+          </a:p>
+          <a:p>
+            <a:pPr lvl="3"/>
+            <a:r>
+              <a:rPr lang="en-US"/>
+              <a:t>Fourth level</a:t>
+            </a:r>
+          </a:p>
+          <a:p>
+            <a:pPr lvl="4"/>
+            <a:r>
+              <a:rPr lang="en-US"/>
+              <a:t>Fifth level</a:t>
+            </a:r>
+            <a:endParaRPr lang="en-AU"/>
+          </a:p>
+        </p:txBody>
+      </p:sp>
+      <p:sp>
+        <p:nvSpPr>
+          <p:cNvPr id="6" name="Footer Placeholder 5"/>
+          <p:cNvSpPr>
+            <a:spLocks noGrp="1"/>
+          </p:cNvSpPr>
+          <p:nvPr>
+            <p:ph type="ftr" sz="quarter" idx="4"/>
+          </p:nvPr>
+        </p:nvSpPr>
+        <p:spPr>
+          <a:xfrm>
+            <a:off x="0" y="8685213"/>
+            <a:ext cx="2971800" cy="458787"/>
+          </a:xfrm>
+          <a:prstGeom prst="rect">
+            <a:avLst/>
+          </a:prstGeom>
+        </p:spPr>
+        <p:txBody>
+          <a:bodyPr vert="horz" lIns="91440" tIns="45720" rIns="91440" bIns="45720" rtlCol="0" anchor="b"/>
+          <a:lstStyle>
+            <a:lvl1pPr algn="l">
+              <a:defRPr sz="1200"/>
+            </a:lvl1pPr>
+          </a:lstStyle>
+          <a:p>
+            <a:endParaRPr lang="en-AU"/>
+          </a:p>
+        </p:txBody>
+      </p:sp>
+      <p:sp>
+        <p:nvSpPr>
+          <p:cNvPr id="7" name="Slide Number Placeholder 6"/>
+          <p:cNvSpPr>
+            <a:spLocks noGrp="1"/>
+          </p:cNvSpPr>
+          <p:nvPr>
+            <p:ph type="sldNum" sz="quarter" idx="5"/>
+          </p:nvPr>
+        </p:nvSpPr>
+        <p:spPr>
+          <a:xfrm>
+            <a:off x="3884613" y="8685213"/>
+            <a:ext cx="2971800" cy="458787"/>
+          </a:xfrm>
+          <a:prstGeom prst="rect">
+            <a:avLst/>
+          </a:prstGeom>
+        </p:spPr>
+        <p:txBody>
+          <a:bodyPr vert="horz" lIns="91440" tIns="45720" rIns="91440" bIns="45720" rtlCol="0" anchor="b"/>
+          <a:lstStyle>
+            <a:lvl1pPr algn="r">
+              <a:defRPr sz="1200"/>
+            </a:lvl1pPr>
+          </a:lstStyle>
+          <a:p>
+            <a:fld id="{5089F5C8-CD77-4CFA-B6B5-FFE806853977}" type="slidenum">
+              <a:rPr lang="en-AU" smtClean="0"/>
+              <a:t>‹#›</a:t>
+            </a:fld>
+            <a:endParaRPr lang="en-AU"/>
+          </a:p>
+        </p:txBody>
+      </p:sp>
+    </p:spTree>
+    <p:extLst>
+      <p:ext uri="{BB962C8B-B14F-4D97-AF65-F5344CB8AC3E}">
+        <p14:creationId xmlns:p14="http://schemas.microsoft.com/office/powerpoint/2010/main" val="298438083"/>
+      </p:ext>
+    </p:extLst>
+  </p:cSld>
+  <p:clrMap bg1="lt1" tx1="dk1" bg2="lt2" tx2="dk2" accent1="accent1" accent2="accent2" accent3="accent3" accent4="accent4" accent5="accent5" accent6="accent6" hlink="hlink" folHlink="folHlink"/>
+  <p:notesStyle>
+    <a:lvl1pPr marL="0" algn="l" defTabSz="914400" rtl="0" eaLnBrk="1" latinLnBrk="0" hangingPunct="1">
+      <a:defRPr sz="1200" kern="1200">
+        <a:solidFill>
+          <a:schemeClr val="tx1"/>
+        </a:solidFill>
+        <a:latin typeface="+mn-lt"/>
+        <a:ea typeface="+mn-ea"/>
+        <a:cs typeface="+mn-cs"/>
+      </a:defRPr>
+    </a:lvl1pPr>
+    <a:lvl2pPr marL="457200" algn="l" defTabSz="914400" rtl="0" eaLnBrk="1" latinLnBrk="0" hangingPunct="1">
+      <a:defRPr sz="1200" kern="1200">
+        <a:solidFill>
+          <a:schemeClr val="tx1"/>
+        </a:solidFill>
+        <a:latin typeface="+mn-lt"/>
+        <a:ea typeface="+mn-ea"/>
+        <a:cs typeface="+mn-cs"/>
+      </a:defRPr>
+    </a:lvl2pPr>
+    <a:lvl3pPr marL="914400" algn="l" defTabSz="914400" rtl="0" eaLnBrk="1" latinLnBrk="0" hangingPunct="1">
+      <a:defRPr sz="1200" kern="1200">
+        <a:solidFill>
+          <a:schemeClr val="tx1"/>
+        </a:solidFill>
+        <a:latin typeface="+mn-lt"/>
+        <a:ea typeface="+mn-ea"/>
+        <a:cs typeface="+mn-cs"/>
+      </a:defRPr>
+    </a:lvl3pPr>
+    <a:lvl4pPr marL="1371600" algn="l" defTabSz="914400" rtl="0" eaLnBrk="1" latinLnBrk="0" hangingPunct="1">
+      <a:defRPr sz="1200" kern="1200">
+        <a:solidFill>
+          <a:schemeClr val="tx1"/>
+        </a:solidFill>
+        <a:latin typeface="+mn-lt"/>
+        <a:ea typeface="+mn-ea"/>
+        <a:cs typeface="+mn-cs"/>
+      </a:defRPr>
+    </a:lvl4pPr>
+    <a:lvl5pPr marL="1828800" algn="l" defTabSz="914400" rtl="0" eaLnBrk="1" latinLnBrk="0" hangingPunct="1">
+      <a:defRPr sz="1200" kern="1200">
+        <a:solidFill>
+          <a:schemeClr val="tx1"/>
+        </a:solidFill>
+        <a:latin typeface="+mn-lt"/>
+        <a:ea typeface="+mn-ea"/>
+        <a:cs typeface="+mn-cs"/>
+      </a:defRPr>
+    </a:lvl5pPr>
+    <a:lvl6pPr marL="2286000" algn="l" defTabSz="914400" rtl="0" eaLnBrk="1" latinLnBrk="0" hangingPunct="1">
+      <a:defRPr sz="1200" kern="1200">
+        <a:solidFill>
+          <a:schemeClr val="tx1"/>
+        </a:solidFill>
+        <a:latin typeface="+mn-lt"/>
+        <a:ea typeface="+mn-ea"/>
+        <a:cs typeface="+mn-cs"/>
+      </a:defRPr>
+    </a:lvl6pPr>
+    <a:lvl7pPr marL="2743200" algn="l" defTabSz="914400" rtl="0" eaLnBrk="1" latinLnBrk="0" hangingPunct="1">
+      <a:defRPr sz="1200" kern="1200">
+        <a:solidFill>
+          <a:schemeClr val="tx1"/>
+        </a:solidFill>
+        <a:latin typeface="+mn-lt"/>
+        <a:ea typeface="+mn-ea"/>
+        <a:cs typeface="+mn-cs"/>
+      </a:defRPr>
+    </a:lvl7pPr>
+    <a:lvl8pPr marL="3200400" algn="l" defTabSz="914400" rtl="0" eaLnBrk="1" latinLnBrk="0" hangingPunct="1">
+      <a:defRPr sz="1200" kern="1200">
+        <a:solidFill>
+          <a:schemeClr val="tx1"/>
+        </a:solidFill>
+        <a:latin typeface="+mn-lt"/>
+        <a:ea typeface="+mn-ea"/>
+        <a:cs typeface="+mn-cs"/>
+      </a:defRPr>
+    </a:lvl8pPr>
+    <a:lvl9pPr marL="3657600" algn="l" defTabSz="914400" rtl="0" eaLnBrk="1" latinLnBrk="0" hangingPunct="1">
+      <a:defRPr sz="1200" kern="1200">
+        <a:solidFill>
+          <a:schemeClr val="tx1"/>
+        </a:solidFill>
+        <a:latin typeface="+mn-lt"/>
+        <a:ea typeface="+mn-ea"/>
+        <a:cs typeface="+mn-cs"/>
+      </a:defRPr>
+    </a:lvl9pPr>
+  </p:notesStyle>
+</p:notesMaster>
+</file>
+
+<file path=ppt/notesSlides/notesSlide1.xml><?xml version="1.0" encoding="utf-8"?>
+<p:notes xmlns:a="http://schemas.openxmlformats.org/drawingml/2006/main" xmlns:r="http://schemas.openxmlformats.org/officeDocument/2006/relationships" xmlns:p="http://schemas.openxmlformats.org/presentationml/2006/main">
+  <p:cSld>
+    <p:spTree>
+      <p:nvGrpSpPr>
+        <p:cNvPr id="1" name=""/>
+        <p:cNvGrpSpPr/>
+        <p:nvPr/>
+      </p:nvGrpSpPr>
+      <p:grpSpPr>
+        <a:xfrm>
+          <a:off x="0" y="0"/>
+          <a:ext cx="0" cy="0"/>
+          <a:chOff x="0" y="0"/>
+          <a:chExt cx="0" cy="0"/>
+        </a:xfrm>
+      </p:grpSpPr>
+      <p:sp>
+        <p:nvSpPr>
+          <p:cNvPr id="2" name="Slide Image Placeholder 1"/>
+          <p:cNvSpPr>
+            <a:spLocks noGrp="1" noRot="1" noChangeAspect="1"/>
+          </p:cNvSpPr>
+          <p:nvPr>
+            <p:ph type="sldImg"/>
+          </p:nvPr>
+        </p:nvSpPr>
+        <p:spPr/>
+      </p:sp>
+      <p:sp>
+        <p:nvSpPr>
+          <p:cNvPr id="3" name="Notes Placeholder 2"/>
+          <p:cNvSpPr>
+            <a:spLocks noGrp="1"/>
+          </p:cNvSpPr>
+          <p:nvPr>
+            <p:ph type="body" idx="1"/>
+          </p:nvPr>
+        </p:nvSpPr>
+        <p:spPr/>
+        <p:txBody>
+          <a:bodyPr/>
+          <a:lstStyle/>
+          <a:p>
+            <a:r>
+              <a:rPr lang="en-AU" dirty="0"/>
+              <a:t>Panel A: Illustrates the diffusion tensor ellipsoid, representing the probability distribution of water molecule diffusion within a voxel.</a:t>
+            </a:r>
+          </a:p>
+          <a:p>
+            <a:r>
+              <a:rPr lang="en-AU" dirty="0"/>
+              <a:t>Panel B: Shows areas of high anisotropy with elongated ellipsoids, indicating a higher likelihood of diffusion in one direction.</a:t>
+            </a:r>
+          </a:p>
+          <a:p>
+            <a:r>
+              <a:rPr lang="en-AU" dirty="0"/>
+              <a:t>Panel C: Depicts areas of lower anisotropy with more spherical distributions, reflecting uniform diffusion in all directions.</a:t>
+            </a:r>
+          </a:p>
+          <a:p>
+            <a:r>
+              <a:rPr lang="en-AU" dirty="0"/>
+              <a:t>Panel D: Presents a color-coded fractional anisotropy (FA) map, highlighting principal diffusion directions within white matter pathways.</a:t>
+            </a:r>
+          </a:p>
+          <a:p>
+            <a:r>
+              <a:rPr lang="en-AU" dirty="0"/>
+              <a:t>Panel E: Overlays principal diffusion directions (red lines) on an FA map, demonstrating alignment with white matter tracts.</a:t>
+            </a:r>
+          </a:p>
+        </p:txBody>
+      </p:sp>
+      <p:sp>
+        <p:nvSpPr>
+          <p:cNvPr id="4" name="Slide Number Placeholder 3"/>
+          <p:cNvSpPr>
+            <a:spLocks noGrp="1"/>
+          </p:cNvSpPr>
+          <p:nvPr>
+            <p:ph type="sldNum" sz="quarter" idx="5"/>
+          </p:nvPr>
+        </p:nvSpPr>
+        <p:spPr/>
+        <p:txBody>
+          <a:bodyPr/>
+          <a:lstStyle/>
+          <a:p>
+            <a:fld id="{5089F5C8-CD77-4CFA-B6B5-FFE806853977}" type="slidenum">
+              <a:rPr lang="en-AU" smtClean="0"/>
+              <a:t>3</a:t>
+            </a:fld>
+            <a:endParaRPr lang="en-AU"/>
+          </a:p>
+        </p:txBody>
+      </p:sp>
+    </p:spTree>
+    <p:extLst>
+      <p:ext uri="{BB962C8B-B14F-4D97-AF65-F5344CB8AC3E}">
+        <p14:creationId xmlns:p14="http://schemas.microsoft.com/office/powerpoint/2010/main" val="1297965320"/>
+      </p:ext>
+    </p:extLst>
+  </p:cSld>
+  <p:clrMapOvr>
+    <a:masterClrMapping/>
+  </p:clrMapOvr>
+</p:notes>
+</file>
+
+<file path=ppt/notesSlides/notesSlide2.xml><?xml version="1.0" encoding="utf-8"?>
+<p:notes xmlns:a="http://schemas.openxmlformats.org/drawingml/2006/main" xmlns:r="http://schemas.openxmlformats.org/officeDocument/2006/relationships" xmlns:p="http://schemas.openxmlformats.org/presentationml/2006/main">
+  <p:cSld>
+    <p:spTree>
+      <p:nvGrpSpPr>
+        <p:cNvPr id="1" name=""/>
+        <p:cNvGrpSpPr/>
+        <p:nvPr/>
+      </p:nvGrpSpPr>
+      <p:grpSpPr>
+        <a:xfrm>
+          <a:off x="0" y="0"/>
+          <a:ext cx="0" cy="0"/>
+          <a:chOff x="0" y="0"/>
+          <a:chExt cx="0" cy="0"/>
+        </a:xfrm>
+      </p:grpSpPr>
+      <p:sp>
+        <p:nvSpPr>
+          <p:cNvPr id="2" name="Slide Image Placeholder 1"/>
+          <p:cNvSpPr>
+            <a:spLocks noGrp="1" noRot="1" noChangeAspect="1"/>
+          </p:cNvSpPr>
+          <p:nvPr>
+            <p:ph type="sldImg"/>
+          </p:nvPr>
+        </p:nvSpPr>
+        <p:spPr/>
+      </p:sp>
+      <p:sp>
+        <p:nvSpPr>
+          <p:cNvPr id="3" name="Notes Placeholder 2"/>
+          <p:cNvSpPr>
+            <a:spLocks noGrp="1"/>
+          </p:cNvSpPr>
+          <p:nvPr>
+            <p:ph type="body" idx="1"/>
+          </p:nvPr>
+        </p:nvSpPr>
+        <p:spPr/>
+        <p:txBody>
+          <a:bodyPr/>
+          <a:lstStyle/>
+          <a:p>
+            <a:endParaRPr lang="en-AU" dirty="0"/>
+          </a:p>
+        </p:txBody>
+      </p:sp>
+      <p:sp>
+        <p:nvSpPr>
+          <p:cNvPr id="4" name="Slide Number Placeholder 3"/>
+          <p:cNvSpPr>
+            <a:spLocks noGrp="1"/>
+          </p:cNvSpPr>
+          <p:nvPr>
+            <p:ph type="sldNum" sz="quarter" idx="5"/>
+          </p:nvPr>
+        </p:nvSpPr>
+        <p:spPr/>
+        <p:txBody>
+          <a:bodyPr/>
+          <a:lstStyle/>
+          <a:p>
+            <a:fld id="{5089F5C8-CD77-4CFA-B6B5-FFE806853977}" type="slidenum">
+              <a:rPr lang="en-AU" smtClean="0"/>
+              <a:t>4</a:t>
+            </a:fld>
+            <a:endParaRPr lang="en-AU"/>
+          </a:p>
+        </p:txBody>
+      </p:sp>
+    </p:spTree>
+    <p:extLst>
+      <p:ext uri="{BB962C8B-B14F-4D97-AF65-F5344CB8AC3E}">
+        <p14:creationId xmlns:p14="http://schemas.microsoft.com/office/powerpoint/2010/main" val="234950062"/>
+      </p:ext>
+    </p:extLst>
+  </p:cSld>
+  <p:clrMapOvr>
+    <a:masterClrMapping/>
+  </p:clrMapOvr>
+</p:notes>
 </file>
 
 <file path=ppt/slideLayouts/slideLayout1.xml><?xml version="1.0" encoding="utf-8"?>
@@ -15387,10 +15936,10 @@
       </p:grpSpPr>
       <p:sp>
         <p:nvSpPr>
-          <p:cNvPr id="4" name="Title 1">
+          <p:cNvPr id="10" name="Title 1">
             <a:extLst>
               <a:ext uri="{FF2B5EF4-FFF2-40B4-BE49-F238E27FC236}">
-                <a16:creationId xmlns:a16="http://schemas.microsoft.com/office/drawing/2014/main" id="{17F949CF-EEFD-E6DD-30CE-C28BA9EC1B14}"/>
+                <a16:creationId xmlns:a16="http://schemas.microsoft.com/office/drawing/2014/main" id="{C0D3F2F4-7016-619D-480B-9A8161CBDA30}"/>
               </a:ext>
             </a:extLst>
           </p:cNvPr>
@@ -15401,8 +15950,8 @@
         </p:nvSpPr>
         <p:spPr>
           <a:xfrm>
-            <a:off x="767028" y="4180315"/>
-            <a:ext cx="6132286" cy="1010791"/>
+            <a:off x="741410" y="662669"/>
+            <a:ext cx="10787007" cy="799427"/>
           </a:xfrm>
           <a:prstGeom prst="rect">
             <a:avLst/>
@@ -15665,630 +16214,14 @@
           </a:lstStyle>
           <a:p>
             <a:r>
-              <a:rPr lang="en-US" sz="3600" b="1" dirty="0">
-                <a:latin typeface="Tw Cen MT Bold" panose="020B0802020104020603" pitchFamily="34" charset="0"/>
-              </a:rPr>
-              <a:t>OVERVIEW</a:t>
-            </a:r>
-            <a:r>
               <a:rPr lang="en-US" sz="4000" b="1" dirty="0">
                 <a:latin typeface="Tw Cen MT Bold" panose="020B0802020104020603" pitchFamily="34" charset="0"/>
               </a:rPr>
-              <a:t>:</a:t>
+              <a:t>Exploring Non-Invasive Insights into Brain Health</a:t>
             </a:r>
-            <a:endParaRPr lang="en-US" sz="4000" i="1" dirty="0">
+            <a:endParaRPr lang="en-US" sz="4400" dirty="0">
               <a:latin typeface="Tw Cen MT Bold" panose="020B0802020104020603" pitchFamily="34" charset="0"/>
             </a:endParaRPr>
-          </a:p>
-        </p:txBody>
-      </p:sp>
-      <p:sp>
-        <p:nvSpPr>
-          <p:cNvPr id="7" name="Subtitle 4">
-            <a:extLst>
-              <a:ext uri="{FF2B5EF4-FFF2-40B4-BE49-F238E27FC236}">
-                <a16:creationId xmlns:a16="http://schemas.microsoft.com/office/drawing/2014/main" id="{0C368CC4-AFE2-2654-DD5D-EC8AF21A3196}"/>
-              </a:ext>
-            </a:extLst>
-          </p:cNvPr>
-          <p:cNvSpPr txBox="1">
-            <a:spLocks/>
-          </p:cNvSpPr>
-          <p:nvPr/>
-        </p:nvSpPr>
-        <p:spPr>
-          <a:xfrm>
-            <a:off x="637138" y="4857127"/>
-            <a:ext cx="10564798" cy="1423108"/>
-          </a:xfrm>
-          <a:prstGeom prst="rect">
-            <a:avLst/>
-          </a:prstGeom>
-          <a:noFill/>
-          <a:ln>
-            <a:noFill/>
-          </a:ln>
-        </p:spPr>
-        <p:txBody>
-          <a:bodyPr spcFirstLastPara="1" wrap="square" lIns="91425" tIns="91425" rIns="91425" bIns="91425" anchor="t" anchorCtr="0">
-            <a:noAutofit/>
-          </a:bodyPr>
-          <a:lstStyle>
-            <a:defPPr marR="0" lvl="0" algn="l" rtl="0">
-              <a:lnSpc>
-                <a:spcPct val="100000"/>
-              </a:lnSpc>
-              <a:spcBef>
-                <a:spcPts val="0"/>
-              </a:spcBef>
-              <a:spcAft>
-                <a:spcPts val="0"/>
-              </a:spcAft>
-            </a:defPPr>
-            <a:lvl1pPr marL="457200" marR="0" lvl="0" indent="-304800" algn="l" rtl="0" eaLnBrk="1" hangingPunct="1">
-              <a:lnSpc>
-                <a:spcPct val="100000"/>
-              </a:lnSpc>
-              <a:spcBef>
-                <a:spcPts val="0"/>
-              </a:spcBef>
-              <a:spcAft>
-                <a:spcPts val="0"/>
-              </a:spcAft>
-              <a:buClr>
-                <a:schemeClr val="dk1"/>
-              </a:buClr>
-              <a:buSzPts val="1200"/>
-              <a:buFont typeface="Albert Sans"/>
-              <a:buNone/>
-              <a:defRPr sz="1200" b="0" i="0" u="none" strike="noStrike" cap="none">
-                <a:solidFill>
-                  <a:schemeClr val="dk1"/>
-                </a:solidFill>
-                <a:latin typeface="Albert Sans"/>
-                <a:ea typeface="Albert Sans"/>
-                <a:cs typeface="Albert Sans"/>
-                <a:sym typeface="Albert Sans"/>
-              </a:defRPr>
-            </a:lvl1pPr>
-            <a:lvl2pPr marL="914400" marR="0" lvl="1" indent="-304800" algn="ctr" rtl="0" eaLnBrk="1" hangingPunct="1">
-              <a:lnSpc>
-                <a:spcPct val="100000"/>
-              </a:lnSpc>
-              <a:spcBef>
-                <a:spcPts val="0"/>
-              </a:spcBef>
-              <a:spcAft>
-                <a:spcPts val="0"/>
-              </a:spcAft>
-              <a:buClr>
-                <a:schemeClr val="dk1"/>
-              </a:buClr>
-              <a:buSzPts val="1200"/>
-              <a:buFont typeface="Albert Sans"/>
-              <a:buNone/>
-              <a:defRPr sz="1200" b="0" i="0" u="none" strike="noStrike" cap="none">
-                <a:solidFill>
-                  <a:schemeClr val="dk1"/>
-                </a:solidFill>
-                <a:latin typeface="Albert Sans"/>
-                <a:ea typeface="Albert Sans"/>
-                <a:cs typeface="Albert Sans"/>
-                <a:sym typeface="Albert Sans"/>
-              </a:defRPr>
-            </a:lvl2pPr>
-            <a:lvl3pPr marL="1371600" marR="0" lvl="2" indent="-304800" algn="ctr" rtl="0" eaLnBrk="1" hangingPunct="1">
-              <a:lnSpc>
-                <a:spcPct val="100000"/>
-              </a:lnSpc>
-              <a:spcBef>
-                <a:spcPts val="0"/>
-              </a:spcBef>
-              <a:spcAft>
-                <a:spcPts val="0"/>
-              </a:spcAft>
-              <a:buClr>
-                <a:schemeClr val="dk1"/>
-              </a:buClr>
-              <a:buSzPts val="1200"/>
-              <a:buFont typeface="Albert Sans"/>
-              <a:buNone/>
-              <a:defRPr sz="1200" b="0" i="0" u="none" strike="noStrike" cap="none">
-                <a:solidFill>
-                  <a:schemeClr val="dk1"/>
-                </a:solidFill>
-                <a:latin typeface="Albert Sans"/>
-                <a:ea typeface="Albert Sans"/>
-                <a:cs typeface="Albert Sans"/>
-                <a:sym typeface="Albert Sans"/>
-              </a:defRPr>
-            </a:lvl3pPr>
-            <a:lvl4pPr marL="1828800" marR="0" lvl="3" indent="-304800" algn="ctr" rtl="0" eaLnBrk="1" hangingPunct="1">
-              <a:lnSpc>
-                <a:spcPct val="100000"/>
-              </a:lnSpc>
-              <a:spcBef>
-                <a:spcPts val="0"/>
-              </a:spcBef>
-              <a:spcAft>
-                <a:spcPts val="0"/>
-              </a:spcAft>
-              <a:buClr>
-                <a:schemeClr val="dk1"/>
-              </a:buClr>
-              <a:buSzPts val="1200"/>
-              <a:buFont typeface="Albert Sans"/>
-              <a:buNone/>
-              <a:defRPr sz="1200" b="0" i="0" u="none" strike="noStrike" cap="none">
-                <a:solidFill>
-                  <a:schemeClr val="dk1"/>
-                </a:solidFill>
-                <a:latin typeface="Albert Sans"/>
-                <a:ea typeface="Albert Sans"/>
-                <a:cs typeface="Albert Sans"/>
-                <a:sym typeface="Albert Sans"/>
-              </a:defRPr>
-            </a:lvl4pPr>
-            <a:lvl5pPr marL="2286000" marR="0" lvl="4" indent="-304800" algn="ctr" rtl="0" eaLnBrk="1" hangingPunct="1">
-              <a:lnSpc>
-                <a:spcPct val="100000"/>
-              </a:lnSpc>
-              <a:spcBef>
-                <a:spcPts val="0"/>
-              </a:spcBef>
-              <a:spcAft>
-                <a:spcPts val="0"/>
-              </a:spcAft>
-              <a:buClr>
-                <a:schemeClr val="dk1"/>
-              </a:buClr>
-              <a:buSzPts val="1200"/>
-              <a:buFont typeface="Albert Sans"/>
-              <a:buNone/>
-              <a:defRPr sz="1200" b="0" i="0" u="none" strike="noStrike" cap="none">
-                <a:solidFill>
-                  <a:schemeClr val="dk1"/>
-                </a:solidFill>
-                <a:latin typeface="Albert Sans"/>
-                <a:ea typeface="Albert Sans"/>
-                <a:cs typeface="Albert Sans"/>
-                <a:sym typeface="Albert Sans"/>
-              </a:defRPr>
-            </a:lvl5pPr>
-            <a:lvl6pPr marL="2743200" marR="0" lvl="5" indent="-304800" algn="ctr" rtl="0" eaLnBrk="1" hangingPunct="1">
-              <a:lnSpc>
-                <a:spcPct val="100000"/>
-              </a:lnSpc>
-              <a:spcBef>
-                <a:spcPts val="0"/>
-              </a:spcBef>
-              <a:spcAft>
-                <a:spcPts val="0"/>
-              </a:spcAft>
-              <a:buClr>
-                <a:schemeClr val="dk1"/>
-              </a:buClr>
-              <a:buSzPts val="1200"/>
-              <a:buFont typeface="Albert Sans"/>
-              <a:buNone/>
-              <a:defRPr sz="1200" b="0" i="0" u="none" strike="noStrike" cap="none">
-                <a:solidFill>
-                  <a:schemeClr val="dk1"/>
-                </a:solidFill>
-                <a:latin typeface="Albert Sans"/>
-                <a:ea typeface="Albert Sans"/>
-                <a:cs typeface="Albert Sans"/>
-                <a:sym typeface="Albert Sans"/>
-              </a:defRPr>
-            </a:lvl6pPr>
-            <a:lvl7pPr marL="3200400" marR="0" lvl="6" indent="-304800" algn="ctr" rtl="0" eaLnBrk="1" hangingPunct="1">
-              <a:lnSpc>
-                <a:spcPct val="100000"/>
-              </a:lnSpc>
-              <a:spcBef>
-                <a:spcPts val="0"/>
-              </a:spcBef>
-              <a:spcAft>
-                <a:spcPts val="0"/>
-              </a:spcAft>
-              <a:buClr>
-                <a:schemeClr val="dk1"/>
-              </a:buClr>
-              <a:buSzPts val="1200"/>
-              <a:buFont typeface="Albert Sans"/>
-              <a:buNone/>
-              <a:defRPr sz="1200" b="0" i="0" u="none" strike="noStrike" cap="none">
-                <a:solidFill>
-                  <a:schemeClr val="dk1"/>
-                </a:solidFill>
-                <a:latin typeface="Albert Sans"/>
-                <a:ea typeface="Albert Sans"/>
-                <a:cs typeface="Albert Sans"/>
-                <a:sym typeface="Albert Sans"/>
-              </a:defRPr>
-            </a:lvl7pPr>
-            <a:lvl8pPr marL="3657600" marR="0" lvl="7" indent="-304800" algn="ctr" rtl="0" eaLnBrk="1" hangingPunct="1">
-              <a:lnSpc>
-                <a:spcPct val="100000"/>
-              </a:lnSpc>
-              <a:spcBef>
-                <a:spcPts val="0"/>
-              </a:spcBef>
-              <a:spcAft>
-                <a:spcPts val="0"/>
-              </a:spcAft>
-              <a:buClr>
-                <a:schemeClr val="dk1"/>
-              </a:buClr>
-              <a:buSzPts val="1200"/>
-              <a:buFont typeface="Albert Sans"/>
-              <a:buNone/>
-              <a:defRPr sz="1200" b="0" i="0" u="none" strike="noStrike" cap="none">
-                <a:solidFill>
-                  <a:schemeClr val="dk1"/>
-                </a:solidFill>
-                <a:latin typeface="Albert Sans"/>
-                <a:ea typeface="Albert Sans"/>
-                <a:cs typeface="Albert Sans"/>
-                <a:sym typeface="Albert Sans"/>
-              </a:defRPr>
-            </a:lvl8pPr>
-            <a:lvl9pPr marL="4114800" marR="0" lvl="8" indent="-304800" algn="ctr" rtl="0" eaLnBrk="1" hangingPunct="1">
-              <a:lnSpc>
-                <a:spcPct val="100000"/>
-              </a:lnSpc>
-              <a:spcBef>
-                <a:spcPts val="0"/>
-              </a:spcBef>
-              <a:spcAft>
-                <a:spcPts val="0"/>
-              </a:spcAft>
-              <a:buClr>
-                <a:schemeClr val="dk1"/>
-              </a:buClr>
-              <a:buSzPts val="1200"/>
-              <a:buFont typeface="Albert Sans"/>
-              <a:buNone/>
-              <a:defRPr sz="1200" b="0" i="0" u="none" strike="noStrike" cap="none">
-                <a:solidFill>
-                  <a:schemeClr val="dk1"/>
-                </a:solidFill>
-                <a:latin typeface="Albert Sans"/>
-                <a:ea typeface="Albert Sans"/>
-                <a:cs typeface="Albert Sans"/>
-                <a:sym typeface="Albert Sans"/>
-              </a:defRPr>
-            </a:lvl9pPr>
-          </a:lstStyle>
-          <a:p>
-            <a:pPr marL="609600" indent="-457200">
-              <a:lnSpc>
-                <a:spcPct val="150000"/>
-              </a:lnSpc>
-              <a:buFont typeface="Arial" panose="020B0604020202020204" pitchFamily="34" charset="0"/>
-              <a:buChar char="•"/>
-            </a:pPr>
-            <a:r>
-              <a:rPr lang="en-US" sz="2400" dirty="0">
-                <a:latin typeface="Segoe UI Light" panose="020B0502040204020203" pitchFamily="34" charset="0"/>
-                <a:cs typeface="Segoe UI Light" panose="020B0502040204020203" pitchFamily="34" charset="0"/>
-              </a:rPr>
-              <a:t>Part I: Brain analysis using DTI MRI scans</a:t>
-            </a:r>
-          </a:p>
-          <a:p>
-            <a:pPr marL="609600" indent="-457200">
-              <a:lnSpc>
-                <a:spcPct val="150000"/>
-              </a:lnSpc>
-              <a:buFont typeface="Arial" panose="020B0604020202020204" pitchFamily="34" charset="0"/>
-              <a:buChar char="•"/>
-            </a:pPr>
-            <a:r>
-              <a:rPr lang="en-US" sz="2400" dirty="0">
-                <a:latin typeface="Segoe UI Light" panose="020B0502040204020203" pitchFamily="34" charset="0"/>
-                <a:cs typeface="Segoe UI Light" panose="020B0502040204020203" pitchFamily="34" charset="0"/>
-              </a:rPr>
-              <a:t>Part II: Image-based feature extraction using machine learning</a:t>
-            </a:r>
-            <a:endParaRPr lang="en-AU" sz="2400" dirty="0">
-              <a:latin typeface="Segoe UI Light" panose="020B0502040204020203" pitchFamily="34" charset="0"/>
-              <a:cs typeface="Segoe UI Light" panose="020B0502040204020203" pitchFamily="34" charset="0"/>
-            </a:endParaRPr>
-          </a:p>
-        </p:txBody>
-      </p:sp>
-      <p:sp>
-        <p:nvSpPr>
-          <p:cNvPr id="10" name="Title 1">
-            <a:extLst>
-              <a:ext uri="{FF2B5EF4-FFF2-40B4-BE49-F238E27FC236}">
-                <a16:creationId xmlns:a16="http://schemas.microsoft.com/office/drawing/2014/main" id="{C0D3F2F4-7016-619D-480B-9A8161CBDA30}"/>
-              </a:ext>
-            </a:extLst>
-          </p:cNvPr>
-          <p:cNvSpPr txBox="1">
-            <a:spLocks/>
-          </p:cNvSpPr>
-          <p:nvPr/>
-        </p:nvSpPr>
-        <p:spPr>
-          <a:xfrm>
-            <a:off x="761852" y="794076"/>
-            <a:ext cx="6007572" cy="799427"/>
-          </a:xfrm>
-          <a:prstGeom prst="rect">
-            <a:avLst/>
-          </a:prstGeom>
-          <a:noFill/>
-          <a:ln>
-            <a:noFill/>
-          </a:ln>
-        </p:spPr>
-        <p:txBody>
-          <a:bodyPr spcFirstLastPara="1" wrap="square" lIns="91425" tIns="91425" rIns="91425" bIns="91425" anchor="t" anchorCtr="0">
-            <a:noAutofit/>
-          </a:bodyPr>
-          <a:lstStyle>
-            <a:defPPr marR="0" lvl="0" algn="l" rtl="0">
-              <a:lnSpc>
-                <a:spcPct val="100000"/>
-              </a:lnSpc>
-              <a:spcBef>
-                <a:spcPts val="0"/>
-              </a:spcBef>
-              <a:spcAft>
-                <a:spcPts val="0"/>
-              </a:spcAft>
-            </a:defPPr>
-            <a:lvl1pPr marR="0" lvl="0" algn="l" rtl="0" eaLnBrk="1" hangingPunct="1">
-              <a:lnSpc>
-                <a:spcPct val="100000"/>
-              </a:lnSpc>
-              <a:spcBef>
-                <a:spcPts val="0"/>
-              </a:spcBef>
-              <a:spcAft>
-                <a:spcPts val="0"/>
-              </a:spcAft>
-              <a:buClr>
-                <a:schemeClr val="dk1"/>
-              </a:buClr>
-              <a:buSzPts val="2600"/>
-              <a:buFont typeface="Syne"/>
-              <a:buNone/>
-              <a:defRPr sz="2600" b="0" i="0" u="none" strike="noStrike" cap="none">
-                <a:solidFill>
-                  <a:schemeClr val="dk1"/>
-                </a:solidFill>
-                <a:latin typeface="Syne SemiBold"/>
-                <a:ea typeface="Syne SemiBold"/>
-                <a:cs typeface="Syne SemiBold"/>
-                <a:sym typeface="Syne SemiBold"/>
-              </a:defRPr>
-            </a:lvl1pPr>
-            <a:lvl2pPr marR="0" lvl="1" algn="l" rtl="0" eaLnBrk="1" hangingPunct="1">
-              <a:lnSpc>
-                <a:spcPct val="100000"/>
-              </a:lnSpc>
-              <a:spcBef>
-                <a:spcPts val="0"/>
-              </a:spcBef>
-              <a:spcAft>
-                <a:spcPts val="0"/>
-              </a:spcAft>
-              <a:buClr>
-                <a:schemeClr val="dk1"/>
-              </a:buClr>
-              <a:buSzPts val="2600"/>
-              <a:buFont typeface="Syne"/>
-              <a:buNone/>
-              <a:defRPr sz="2600" b="1" i="0" u="none" strike="noStrike" cap="none">
-                <a:solidFill>
-                  <a:schemeClr val="dk1"/>
-                </a:solidFill>
-                <a:latin typeface="Syne"/>
-                <a:ea typeface="Syne"/>
-                <a:cs typeface="Syne"/>
-                <a:sym typeface="Syne"/>
-              </a:defRPr>
-            </a:lvl2pPr>
-            <a:lvl3pPr marR="0" lvl="2" algn="l" rtl="0" eaLnBrk="1" hangingPunct="1">
-              <a:lnSpc>
-                <a:spcPct val="100000"/>
-              </a:lnSpc>
-              <a:spcBef>
-                <a:spcPts val="0"/>
-              </a:spcBef>
-              <a:spcAft>
-                <a:spcPts val="0"/>
-              </a:spcAft>
-              <a:buClr>
-                <a:schemeClr val="dk1"/>
-              </a:buClr>
-              <a:buSzPts val="2600"/>
-              <a:buFont typeface="Syne"/>
-              <a:buNone/>
-              <a:defRPr sz="2600" b="1" i="0" u="none" strike="noStrike" cap="none">
-                <a:solidFill>
-                  <a:schemeClr val="dk1"/>
-                </a:solidFill>
-                <a:latin typeface="Syne"/>
-                <a:ea typeface="Syne"/>
-                <a:cs typeface="Syne"/>
-                <a:sym typeface="Syne"/>
-              </a:defRPr>
-            </a:lvl3pPr>
-            <a:lvl4pPr marR="0" lvl="3" algn="l" rtl="0" eaLnBrk="1" hangingPunct="1">
-              <a:lnSpc>
-                <a:spcPct val="100000"/>
-              </a:lnSpc>
-              <a:spcBef>
-                <a:spcPts val="0"/>
-              </a:spcBef>
-              <a:spcAft>
-                <a:spcPts val="0"/>
-              </a:spcAft>
-              <a:buClr>
-                <a:schemeClr val="dk1"/>
-              </a:buClr>
-              <a:buSzPts val="2600"/>
-              <a:buFont typeface="Syne"/>
-              <a:buNone/>
-              <a:defRPr sz="2600" b="1" i="0" u="none" strike="noStrike" cap="none">
-                <a:solidFill>
-                  <a:schemeClr val="dk1"/>
-                </a:solidFill>
-                <a:latin typeface="Syne"/>
-                <a:ea typeface="Syne"/>
-                <a:cs typeface="Syne"/>
-                <a:sym typeface="Syne"/>
-              </a:defRPr>
-            </a:lvl4pPr>
-            <a:lvl5pPr marR="0" lvl="4" algn="l" rtl="0" eaLnBrk="1" hangingPunct="1">
-              <a:lnSpc>
-                <a:spcPct val="100000"/>
-              </a:lnSpc>
-              <a:spcBef>
-                <a:spcPts val="0"/>
-              </a:spcBef>
-              <a:spcAft>
-                <a:spcPts val="0"/>
-              </a:spcAft>
-              <a:buClr>
-                <a:schemeClr val="dk1"/>
-              </a:buClr>
-              <a:buSzPts val="2600"/>
-              <a:buFont typeface="Syne"/>
-              <a:buNone/>
-              <a:defRPr sz="2600" b="1" i="0" u="none" strike="noStrike" cap="none">
-                <a:solidFill>
-                  <a:schemeClr val="dk1"/>
-                </a:solidFill>
-                <a:latin typeface="Syne"/>
-                <a:ea typeface="Syne"/>
-                <a:cs typeface="Syne"/>
-                <a:sym typeface="Syne"/>
-              </a:defRPr>
-            </a:lvl5pPr>
-            <a:lvl6pPr marR="0" lvl="5" algn="l" rtl="0" eaLnBrk="1" hangingPunct="1">
-              <a:lnSpc>
-                <a:spcPct val="100000"/>
-              </a:lnSpc>
-              <a:spcBef>
-                <a:spcPts val="0"/>
-              </a:spcBef>
-              <a:spcAft>
-                <a:spcPts val="0"/>
-              </a:spcAft>
-              <a:buClr>
-                <a:schemeClr val="dk1"/>
-              </a:buClr>
-              <a:buSzPts val="2600"/>
-              <a:buFont typeface="Syne"/>
-              <a:buNone/>
-              <a:defRPr sz="2600" b="1" i="0" u="none" strike="noStrike" cap="none">
-                <a:solidFill>
-                  <a:schemeClr val="dk1"/>
-                </a:solidFill>
-                <a:latin typeface="Syne"/>
-                <a:ea typeface="Syne"/>
-                <a:cs typeface="Syne"/>
-                <a:sym typeface="Syne"/>
-              </a:defRPr>
-            </a:lvl6pPr>
-            <a:lvl7pPr marR="0" lvl="6" algn="l" rtl="0" eaLnBrk="1" hangingPunct="1">
-              <a:lnSpc>
-                <a:spcPct val="100000"/>
-              </a:lnSpc>
-              <a:spcBef>
-                <a:spcPts val="0"/>
-              </a:spcBef>
-              <a:spcAft>
-                <a:spcPts val="0"/>
-              </a:spcAft>
-              <a:buClr>
-                <a:schemeClr val="dk1"/>
-              </a:buClr>
-              <a:buSzPts val="2600"/>
-              <a:buFont typeface="Syne"/>
-              <a:buNone/>
-              <a:defRPr sz="2600" b="1" i="0" u="none" strike="noStrike" cap="none">
-                <a:solidFill>
-                  <a:schemeClr val="dk1"/>
-                </a:solidFill>
-                <a:latin typeface="Syne"/>
-                <a:ea typeface="Syne"/>
-                <a:cs typeface="Syne"/>
-                <a:sym typeface="Syne"/>
-              </a:defRPr>
-            </a:lvl7pPr>
-            <a:lvl8pPr marR="0" lvl="7" algn="l" rtl="0" eaLnBrk="1" hangingPunct="1">
-              <a:lnSpc>
-                <a:spcPct val="100000"/>
-              </a:lnSpc>
-              <a:spcBef>
-                <a:spcPts val="0"/>
-              </a:spcBef>
-              <a:spcAft>
-                <a:spcPts val="0"/>
-              </a:spcAft>
-              <a:buClr>
-                <a:schemeClr val="dk1"/>
-              </a:buClr>
-              <a:buSzPts val="2600"/>
-              <a:buFont typeface="Syne"/>
-              <a:buNone/>
-              <a:defRPr sz="2600" b="1" i="0" u="none" strike="noStrike" cap="none">
-                <a:solidFill>
-                  <a:schemeClr val="dk1"/>
-                </a:solidFill>
-                <a:latin typeface="Syne"/>
-                <a:ea typeface="Syne"/>
-                <a:cs typeface="Syne"/>
-                <a:sym typeface="Syne"/>
-              </a:defRPr>
-            </a:lvl8pPr>
-            <a:lvl9pPr marR="0" lvl="8" algn="l" rtl="0" eaLnBrk="1" hangingPunct="1">
-              <a:lnSpc>
-                <a:spcPct val="100000"/>
-              </a:lnSpc>
-              <a:spcBef>
-                <a:spcPts val="0"/>
-              </a:spcBef>
-              <a:spcAft>
-                <a:spcPts val="0"/>
-              </a:spcAft>
-              <a:buClr>
-                <a:schemeClr val="dk1"/>
-              </a:buClr>
-              <a:buSzPts val="2600"/>
-              <a:buFont typeface="Syne"/>
-              <a:buNone/>
-              <a:defRPr sz="2600" b="1" i="0" u="none" strike="noStrike" cap="none">
-                <a:solidFill>
-                  <a:schemeClr val="dk1"/>
-                </a:solidFill>
-                <a:latin typeface="Syne"/>
-                <a:ea typeface="Syne"/>
-                <a:cs typeface="Syne"/>
-                <a:sym typeface="Syne"/>
-              </a:defRPr>
-            </a:lvl9pPr>
-          </a:lstStyle>
-          <a:p>
-            <a:r>
-              <a:rPr lang="en-US" sz="3600" b="1" dirty="0">
-                <a:latin typeface="Tw Cen MT Bold" panose="020B0802020104020603" pitchFamily="34" charset="0"/>
-              </a:rPr>
-              <a:t>AIM</a:t>
-            </a:r>
-            <a:r>
-              <a:rPr lang="en-US" sz="4000" dirty="0">
-                <a:latin typeface="Tw Cen MT Bold" panose="020B0802020104020603" pitchFamily="34" charset="0"/>
-              </a:rPr>
-              <a:t>:</a:t>
-            </a:r>
           </a:p>
         </p:txBody>
       </p:sp>
@@ -16308,8 +16241,8 @@
         </p:nvSpPr>
         <p:spPr>
           <a:xfrm>
-            <a:off x="637138" y="1411705"/>
-            <a:ext cx="10709177" cy="2088579"/>
+            <a:off x="741410" y="1687669"/>
+            <a:ext cx="6723639" cy="4257387"/>
           </a:xfrm>
           <a:prstGeom prst="rect">
             <a:avLst/>
@@ -16579,11 +16512,11 @@
               <a:buChar char="•"/>
             </a:pPr>
             <a:r>
-              <a:rPr lang="en-AU" sz="2400" dirty="0">
+              <a:rPr lang="en-US" sz="2800" dirty="0">
                 <a:latin typeface="Segoe UI Light" panose="020B0502040204020203" pitchFamily="34" charset="0"/>
                 <a:cs typeface="Segoe UI Light" panose="020B0502040204020203" pitchFamily="34" charset="0"/>
               </a:rPr>
-              <a:t>Transform complex medical imaging data into clinically useful insights</a:t>
+              <a:t>Utilizing diffusion-weighted MRI to assess brain tissue integrity.</a:t>
             </a:r>
           </a:p>
           <a:p>
@@ -16595,15 +16528,15 @@
               <a:buChar char="•"/>
             </a:pPr>
             <a:r>
-              <a:rPr lang="en-AU" sz="2400" dirty="0">
+              <a:rPr lang="en-US" sz="2800" dirty="0">
                 <a:latin typeface="Segoe UI Light" panose="020B0502040204020203" pitchFamily="34" charset="0"/>
                 <a:cs typeface="Segoe UI Light" panose="020B0502040204020203" pitchFamily="34" charset="0"/>
               </a:rPr>
-              <a:t>Apply mathematical modelling to estimate brain tissue health from MRI scans</a:t>
+              <a:t>Project divided into two parts:</a:t>
             </a:r>
           </a:p>
           <a:p>
-            <a:pPr marL="609600" indent="-457200">
+            <a:pPr marL="1066800" lvl="1" indent="-457200" algn="l">
               <a:lnSpc>
                 <a:spcPct val="150000"/>
               </a:lnSpc>
@@ -16611,15 +16544,159 @@
               <a:buChar char="•"/>
             </a:pPr>
             <a:r>
-              <a:rPr lang="en-AU" sz="2400" dirty="0">
+              <a:rPr lang="en-US" sz="2800" b="1" dirty="0">
                 <a:latin typeface="Segoe UI Light" panose="020B0502040204020203" pitchFamily="34" charset="0"/>
                 <a:cs typeface="Segoe UI Light" panose="020B0502040204020203" pitchFamily="34" charset="0"/>
               </a:rPr>
-              <a:t>Use image analysis techniques to extract diagnostic features from medical images</a:t>
+              <a:t>Part I</a:t>
             </a:r>
+            <a:r>
+              <a:rPr lang="en-US" sz="2800" dirty="0">
+                <a:latin typeface="Segoe UI Light" panose="020B0502040204020203" pitchFamily="34" charset="0"/>
+                <a:cs typeface="Segoe UI Light" panose="020B0502040204020203" pitchFamily="34" charset="0"/>
+              </a:rPr>
+              <a:t>: Brain MRI Analysis</a:t>
+            </a:r>
+          </a:p>
+          <a:p>
+            <a:pPr marL="1066800" lvl="1" indent="-457200" algn="l">
+              <a:lnSpc>
+                <a:spcPct val="150000"/>
+              </a:lnSpc>
+              <a:buFont typeface="Arial" panose="020B0604020202020204" pitchFamily="34" charset="0"/>
+              <a:buChar char="•"/>
+            </a:pPr>
+            <a:r>
+              <a:rPr lang="en-US" sz="2800" b="1" dirty="0">
+                <a:latin typeface="Segoe UI Light" panose="020B0502040204020203" pitchFamily="34" charset="0"/>
+                <a:cs typeface="Segoe UI Light" panose="020B0502040204020203" pitchFamily="34" charset="0"/>
+              </a:rPr>
+              <a:t>Part II</a:t>
+            </a:r>
+            <a:r>
+              <a:rPr lang="en-US" sz="2800" dirty="0">
+                <a:latin typeface="Segoe UI Light" panose="020B0502040204020203" pitchFamily="34" charset="0"/>
+                <a:cs typeface="Segoe UI Light" panose="020B0502040204020203" pitchFamily="34" charset="0"/>
+              </a:rPr>
+              <a:t>: Image-Based Feature Extraction</a:t>
+            </a:r>
+            <a:endParaRPr lang="en-AU" sz="2800" dirty="0">
+              <a:latin typeface="Segoe UI Light" panose="020B0502040204020203" pitchFamily="34" charset="0"/>
+              <a:cs typeface="Segoe UI Light" panose="020B0502040204020203" pitchFamily="34" charset="0"/>
+            </a:endParaRPr>
           </a:p>
         </p:txBody>
       </p:sp>
+      <p:grpSp>
+        <p:nvGrpSpPr>
+          <p:cNvPr id="3" name="Group 2">
+            <a:extLst>
+              <a:ext uri="{FF2B5EF4-FFF2-40B4-BE49-F238E27FC236}">
+                <a16:creationId xmlns:a16="http://schemas.microsoft.com/office/drawing/2014/main" id="{E2645C18-C8C6-35B2-433A-B214A513FAAC}"/>
+              </a:ext>
+            </a:extLst>
+          </p:cNvPr>
+          <p:cNvGrpSpPr/>
+          <p:nvPr/>
+        </p:nvGrpSpPr>
+        <p:grpSpPr>
+          <a:xfrm>
+            <a:off x="7790386" y="2188363"/>
+            <a:ext cx="3432723" cy="3756693"/>
+            <a:chOff x="7859949" y="1561896"/>
+            <a:chExt cx="3289090" cy="3631637"/>
+          </a:xfrm>
+        </p:grpSpPr>
+        <p:pic>
+          <p:nvPicPr>
+            <p:cNvPr id="3074" name="Picture 2" descr="Axial images of diffusion-weighted MRI of the brain with contrast ...">
+              <a:extLst>
+                <a:ext uri="{FF2B5EF4-FFF2-40B4-BE49-F238E27FC236}">
+                  <a16:creationId xmlns:a16="http://schemas.microsoft.com/office/drawing/2014/main" id="{BEC95533-BAD9-CB36-9DFF-C38941A5CD3C}"/>
+                </a:ext>
+              </a:extLst>
+            </p:cNvPr>
+            <p:cNvPicPr>
+              <a:picLocks noChangeAspect="1" noChangeArrowheads="1"/>
+            </p:cNvPicPr>
+            <p:nvPr/>
+          </p:nvPicPr>
+          <p:blipFill rotWithShape="1">
+            <a:blip r:embed="rId2">
+              <a:extLst>
+                <a:ext uri="{28A0092B-C50C-407E-A947-70E740481C1C}">
+                  <a14:useLocalDpi xmlns:a14="http://schemas.microsoft.com/office/drawing/2010/main" val="0"/>
+                </a:ext>
+              </a:extLst>
+            </a:blip>
+            <a:srcRect l="3929" t="3788" r="3789" b="3993"/>
+            <a:stretch/>
+          </p:blipFill>
+          <p:spPr bwMode="auto">
+            <a:xfrm>
+              <a:off x="7859949" y="1561896"/>
+              <a:ext cx="3289090" cy="3370027"/>
+            </a:xfrm>
+            <a:prstGeom prst="rect">
+              <a:avLst/>
+            </a:prstGeom>
+            <a:noFill/>
+            <a:extLst>
+              <a:ext uri="{909E8E84-426E-40DD-AFC4-6F175D3DCCD1}">
+                <a14:hiddenFill xmlns:a14="http://schemas.microsoft.com/office/drawing/2010/main">
+                  <a:solidFill>
+                    <a:srgbClr val="FFFFFF"/>
+                  </a:solidFill>
+                </a14:hiddenFill>
+              </a:ext>
+            </a:extLst>
+          </p:spPr>
+        </p:pic>
+        <p:sp>
+          <p:nvSpPr>
+            <p:cNvPr id="2" name="TextBox 1">
+              <a:extLst>
+                <a:ext uri="{FF2B5EF4-FFF2-40B4-BE49-F238E27FC236}">
+                  <a16:creationId xmlns:a16="http://schemas.microsoft.com/office/drawing/2014/main" id="{31A6E3B1-360E-1FC4-BD2F-220FFA5EDB06}"/>
+                </a:ext>
+              </a:extLst>
+            </p:cNvPr>
+            <p:cNvSpPr txBox="1"/>
+            <p:nvPr/>
+          </p:nvSpPr>
+          <p:spPr>
+            <a:xfrm>
+              <a:off x="7859949" y="4931923"/>
+              <a:ext cx="2869660" cy="261610"/>
+            </a:xfrm>
+            <a:prstGeom prst="rect">
+              <a:avLst/>
+            </a:prstGeom>
+            <a:noFill/>
+          </p:spPr>
+          <p:txBody>
+            <a:bodyPr wrap="square" rtlCol="0">
+              <a:spAutoFit/>
+            </a:bodyPr>
+            <a:lstStyle/>
+            <a:p>
+              <a:r>
+                <a:rPr lang="fr-FR" sz="1050" dirty="0">
+                  <a:solidFill>
+                    <a:schemeClr val="tx1"/>
+                  </a:solidFill>
+                </a:rPr>
+                <a:t>Source: Chin, R.-I., et al. (2017)</a:t>
+              </a:r>
+              <a:endParaRPr lang="en-AU" sz="1050" dirty="0">
+                <a:solidFill>
+                  <a:schemeClr val="tx1"/>
+                </a:solidFill>
+              </a:endParaRPr>
+            </a:p>
+          </p:txBody>
+        </p:sp>
+      </p:grpSp>
     </p:spTree>
     <p:extLst>
       <p:ext uri="{BB962C8B-B14F-4D97-AF65-F5344CB8AC3E}">
@@ -16652,103 +16729,6 @@
       </p:grpSpPr>
       <p:sp>
         <p:nvSpPr>
-          <p:cNvPr id="6" name="Subtitle 5">
-            <a:extLst>
-              <a:ext uri="{FF2B5EF4-FFF2-40B4-BE49-F238E27FC236}">
-                <a16:creationId xmlns:a16="http://schemas.microsoft.com/office/drawing/2014/main" id="{CF3DBFDB-E167-5C52-100F-3529656C333D}"/>
-              </a:ext>
-            </a:extLst>
-          </p:cNvPr>
-          <p:cNvSpPr>
-            <a:spLocks noGrp="1"/>
-          </p:cNvSpPr>
-          <p:nvPr>
-            <p:ph type="subTitle" idx="4"/>
-          </p:nvPr>
-        </p:nvSpPr>
-        <p:spPr>
-          <a:xfrm>
-            <a:off x="778042" y="2471360"/>
-            <a:ext cx="9919455" cy="2504696"/>
-          </a:xfrm>
-        </p:spPr>
-        <p:txBody>
-          <a:bodyPr/>
-          <a:lstStyle/>
-          <a:p>
-            <a:pPr marL="152400" indent="0"/>
-            <a:endParaRPr lang="en-US" sz="2400" dirty="0">
-              <a:latin typeface="Segoe UI Light" panose="020B0502040204020203" pitchFamily="34" charset="0"/>
-              <a:cs typeface="Segoe UI Light" panose="020B0502040204020203" pitchFamily="34" charset="0"/>
-            </a:endParaRPr>
-          </a:p>
-          <a:p>
-            <a:pPr marL="495300" indent="-342900">
-              <a:buFont typeface="Arial" panose="020B0604020202020204" pitchFamily="34" charset="0"/>
-              <a:buChar char="•"/>
-            </a:pPr>
-            <a:r>
-              <a:rPr lang="en-US" sz="2400" dirty="0">
-                <a:latin typeface="Segoe UI Light" panose="020B0502040204020203" pitchFamily="34" charset="0"/>
-                <a:cs typeface="Segoe UI Light" panose="020B0502040204020203" pitchFamily="34" charset="0"/>
-              </a:rPr>
-              <a:t>Diffusion Tensor Imaging (DTI): A type of MRI that tracks how water molecules move through brain tissue</a:t>
-            </a:r>
-          </a:p>
-          <a:p>
-            <a:pPr marL="495300" indent="-342900">
-              <a:buFont typeface="Arial" panose="020B0604020202020204" pitchFamily="34" charset="0"/>
-              <a:buChar char="•"/>
-            </a:pPr>
-            <a:endParaRPr lang="en-US" sz="2400" dirty="0">
-              <a:latin typeface="Segoe UI Light" panose="020B0502040204020203" pitchFamily="34" charset="0"/>
-              <a:cs typeface="Segoe UI Light" panose="020B0502040204020203" pitchFamily="34" charset="0"/>
-            </a:endParaRPr>
-          </a:p>
-          <a:p>
-            <a:pPr marL="495300" indent="-342900">
-              <a:buFont typeface="Arial" panose="020B0604020202020204" pitchFamily="34" charset="0"/>
-              <a:buChar char="•"/>
-            </a:pPr>
-            <a:r>
-              <a:rPr lang="en-US" sz="2400" dirty="0">
-                <a:latin typeface="Segoe UI Light" panose="020B0502040204020203" pitchFamily="34" charset="0"/>
-                <a:cs typeface="Segoe UI Light" panose="020B0502040204020203" pitchFamily="34" charset="0"/>
-              </a:rPr>
-              <a:t>Early detection of subtle tissue changes clinicians can act on</a:t>
-            </a:r>
-          </a:p>
-          <a:p>
-            <a:pPr marL="495300" indent="-342900">
-              <a:buFont typeface="Arial" panose="020B0604020202020204" pitchFamily="34" charset="0"/>
-              <a:buChar char="•"/>
-            </a:pPr>
-            <a:endParaRPr lang="en-US" sz="2400" dirty="0">
-              <a:latin typeface="Segoe UI Light" panose="020B0502040204020203" pitchFamily="34" charset="0"/>
-              <a:cs typeface="Segoe UI Light" panose="020B0502040204020203" pitchFamily="34" charset="0"/>
-            </a:endParaRPr>
-          </a:p>
-          <a:p>
-            <a:pPr marL="495300" indent="-342900">
-              <a:buFont typeface="Arial" panose="020B0604020202020204" pitchFamily="34" charset="0"/>
-              <a:buChar char="•"/>
-            </a:pPr>
-            <a:r>
-              <a:rPr lang="en-US" sz="2400" dirty="0">
-                <a:latin typeface="Segoe UI Light" panose="020B0502040204020203" pitchFamily="34" charset="0"/>
-                <a:cs typeface="Segoe UI Light" panose="020B0502040204020203" pitchFamily="34" charset="0"/>
-              </a:rPr>
-              <a:t>Enables faster, more confident decision-making in healthcare</a:t>
-            </a:r>
-            <a:endParaRPr lang="en-AU" sz="2400" dirty="0">
-              <a:latin typeface="Segoe UI Light" panose="020B0502040204020203" pitchFamily="34" charset="0"/>
-              <a:cs typeface="Segoe UI Light" panose="020B0502040204020203" pitchFamily="34" charset="0"/>
-            </a:endParaRPr>
-          </a:p>
-        </p:txBody>
-      </p:sp>
-      <p:sp>
-        <p:nvSpPr>
           <p:cNvPr id="7" name="TextBox 6">
             <a:extLst>
               <a:ext uri="{FF2B5EF4-FFF2-40B4-BE49-F238E27FC236}">
@@ -16761,8 +16741,8 @@
         </p:nvSpPr>
         <p:spPr>
           <a:xfrm>
-            <a:off x="778042" y="589284"/>
-            <a:ext cx="9601200" cy="707886"/>
+            <a:off x="638088" y="862298"/>
+            <a:ext cx="9789280" cy="1323439"/>
           </a:xfrm>
           <a:prstGeom prst="rect">
             <a:avLst/>
@@ -16782,16 +16762,7 @@
                 </a:solidFill>
                 <a:latin typeface="Tw Cen MT Bold" panose="020B0802020104020603" pitchFamily="34" charset="0"/>
               </a:rPr>
-              <a:t>PART I: </a:t>
-            </a:r>
-            <a:r>
-              <a:rPr lang="en-US" sz="4000" dirty="0">
-                <a:solidFill>
-                  <a:schemeClr val="tx1"/>
-                </a:solidFill>
-                <a:latin typeface="Tw Cen MT" panose="020B0602020104020603" pitchFamily="34" charset="0"/>
-              </a:rPr>
-              <a:t>DTI</a:t>
+              <a:t>PART I: Modeling Water Molecule Movement in the Brain</a:t>
             </a:r>
             <a:endParaRPr lang="en-AU" sz="4000" dirty="0">
               <a:solidFill>
@@ -16804,103 +16775,427 @@
       </p:sp>
       <p:sp>
         <p:nvSpPr>
-          <p:cNvPr id="5" name="TextBox 4">
+          <p:cNvPr id="4" name="Subtitle 4">
             <a:extLst>
               <a:ext uri="{FF2B5EF4-FFF2-40B4-BE49-F238E27FC236}">
-                <a16:creationId xmlns:a16="http://schemas.microsoft.com/office/drawing/2014/main" id="{B90D0033-B0F4-D868-1F99-582C1B6C7AA5}"/>
+                <a16:creationId xmlns:a16="http://schemas.microsoft.com/office/drawing/2014/main" id="{A4AA9083-2D92-D928-2DBA-69FE2619EC8A}"/>
               </a:ext>
             </a:extLst>
           </p:cNvPr>
-          <p:cNvSpPr txBox="1"/>
+          <p:cNvSpPr txBox="1">
+            <a:spLocks/>
+          </p:cNvSpPr>
           <p:nvPr/>
         </p:nvSpPr>
         <p:spPr>
           <a:xfrm>
-            <a:off x="778042" y="1299489"/>
-            <a:ext cx="6105832" cy="538609"/>
+            <a:off x="429541" y="2394284"/>
+            <a:ext cx="5666459" cy="2454442"/>
           </a:xfrm>
           <a:prstGeom prst="rect">
             <a:avLst/>
           </a:prstGeom>
           <a:noFill/>
+          <a:ln>
+            <a:noFill/>
+          </a:ln>
         </p:spPr>
         <p:txBody>
-          <a:bodyPr wrap="square">
-            <a:spAutoFit/>
+          <a:bodyPr spcFirstLastPara="1" wrap="square" lIns="91425" tIns="91425" rIns="91425" bIns="91425" anchor="t" anchorCtr="0">
+            <a:noAutofit/>
           </a:bodyPr>
-          <a:lstStyle/>
+          <a:lstStyle>
+            <a:defPPr marR="0" lvl="0" algn="l" rtl="0">
+              <a:lnSpc>
+                <a:spcPct val="100000"/>
+              </a:lnSpc>
+              <a:spcBef>
+                <a:spcPts val="0"/>
+              </a:spcBef>
+              <a:spcAft>
+                <a:spcPts val="0"/>
+              </a:spcAft>
+            </a:defPPr>
+            <a:lvl1pPr marL="457200" marR="0" lvl="0" indent="-304800" algn="l" rtl="0" eaLnBrk="1" hangingPunct="1">
+              <a:lnSpc>
+                <a:spcPct val="100000"/>
+              </a:lnSpc>
+              <a:spcBef>
+                <a:spcPts val="0"/>
+              </a:spcBef>
+              <a:spcAft>
+                <a:spcPts val="0"/>
+              </a:spcAft>
+              <a:buClr>
+                <a:schemeClr val="dk1"/>
+              </a:buClr>
+              <a:buSzPts val="1200"/>
+              <a:buFont typeface="Albert Sans"/>
+              <a:buNone/>
+              <a:defRPr sz="1200" b="0" i="0" u="none" strike="noStrike" cap="none">
+                <a:solidFill>
+                  <a:schemeClr val="dk1"/>
+                </a:solidFill>
+                <a:latin typeface="Albert Sans"/>
+                <a:ea typeface="Albert Sans"/>
+                <a:cs typeface="Albert Sans"/>
+                <a:sym typeface="Albert Sans"/>
+              </a:defRPr>
+            </a:lvl1pPr>
+            <a:lvl2pPr marL="914400" marR="0" lvl="1" indent="-304800" algn="ctr" rtl="0" eaLnBrk="1" hangingPunct="1">
+              <a:lnSpc>
+                <a:spcPct val="100000"/>
+              </a:lnSpc>
+              <a:spcBef>
+                <a:spcPts val="0"/>
+              </a:spcBef>
+              <a:spcAft>
+                <a:spcPts val="0"/>
+              </a:spcAft>
+              <a:buClr>
+                <a:schemeClr val="dk1"/>
+              </a:buClr>
+              <a:buSzPts val="1200"/>
+              <a:buFont typeface="Albert Sans"/>
+              <a:buNone/>
+              <a:defRPr sz="1200" b="0" i="0" u="none" strike="noStrike" cap="none">
+                <a:solidFill>
+                  <a:schemeClr val="dk1"/>
+                </a:solidFill>
+                <a:latin typeface="Albert Sans"/>
+                <a:ea typeface="Albert Sans"/>
+                <a:cs typeface="Albert Sans"/>
+                <a:sym typeface="Albert Sans"/>
+              </a:defRPr>
+            </a:lvl2pPr>
+            <a:lvl3pPr marL="1371600" marR="0" lvl="2" indent="-304800" algn="ctr" rtl="0" eaLnBrk="1" hangingPunct="1">
+              <a:lnSpc>
+                <a:spcPct val="100000"/>
+              </a:lnSpc>
+              <a:spcBef>
+                <a:spcPts val="0"/>
+              </a:spcBef>
+              <a:spcAft>
+                <a:spcPts val="0"/>
+              </a:spcAft>
+              <a:buClr>
+                <a:schemeClr val="dk1"/>
+              </a:buClr>
+              <a:buSzPts val="1200"/>
+              <a:buFont typeface="Albert Sans"/>
+              <a:buNone/>
+              <a:defRPr sz="1200" b="0" i="0" u="none" strike="noStrike" cap="none">
+                <a:solidFill>
+                  <a:schemeClr val="dk1"/>
+                </a:solidFill>
+                <a:latin typeface="Albert Sans"/>
+                <a:ea typeface="Albert Sans"/>
+                <a:cs typeface="Albert Sans"/>
+                <a:sym typeface="Albert Sans"/>
+              </a:defRPr>
+            </a:lvl3pPr>
+            <a:lvl4pPr marL="1828800" marR="0" lvl="3" indent="-304800" algn="ctr" rtl="0" eaLnBrk="1" hangingPunct="1">
+              <a:lnSpc>
+                <a:spcPct val="100000"/>
+              </a:lnSpc>
+              <a:spcBef>
+                <a:spcPts val="0"/>
+              </a:spcBef>
+              <a:spcAft>
+                <a:spcPts val="0"/>
+              </a:spcAft>
+              <a:buClr>
+                <a:schemeClr val="dk1"/>
+              </a:buClr>
+              <a:buSzPts val="1200"/>
+              <a:buFont typeface="Albert Sans"/>
+              <a:buNone/>
+              <a:defRPr sz="1200" b="0" i="0" u="none" strike="noStrike" cap="none">
+                <a:solidFill>
+                  <a:schemeClr val="dk1"/>
+                </a:solidFill>
+                <a:latin typeface="Albert Sans"/>
+                <a:ea typeface="Albert Sans"/>
+                <a:cs typeface="Albert Sans"/>
+                <a:sym typeface="Albert Sans"/>
+              </a:defRPr>
+            </a:lvl4pPr>
+            <a:lvl5pPr marL="2286000" marR="0" lvl="4" indent="-304800" algn="ctr" rtl="0" eaLnBrk="1" hangingPunct="1">
+              <a:lnSpc>
+                <a:spcPct val="100000"/>
+              </a:lnSpc>
+              <a:spcBef>
+                <a:spcPts val="0"/>
+              </a:spcBef>
+              <a:spcAft>
+                <a:spcPts val="0"/>
+              </a:spcAft>
+              <a:buClr>
+                <a:schemeClr val="dk1"/>
+              </a:buClr>
+              <a:buSzPts val="1200"/>
+              <a:buFont typeface="Albert Sans"/>
+              <a:buNone/>
+              <a:defRPr sz="1200" b="0" i="0" u="none" strike="noStrike" cap="none">
+                <a:solidFill>
+                  <a:schemeClr val="dk1"/>
+                </a:solidFill>
+                <a:latin typeface="Albert Sans"/>
+                <a:ea typeface="Albert Sans"/>
+                <a:cs typeface="Albert Sans"/>
+                <a:sym typeface="Albert Sans"/>
+              </a:defRPr>
+            </a:lvl5pPr>
+            <a:lvl6pPr marL="2743200" marR="0" lvl="5" indent="-304800" algn="ctr" rtl="0" eaLnBrk="1" hangingPunct="1">
+              <a:lnSpc>
+                <a:spcPct val="100000"/>
+              </a:lnSpc>
+              <a:spcBef>
+                <a:spcPts val="0"/>
+              </a:spcBef>
+              <a:spcAft>
+                <a:spcPts val="0"/>
+              </a:spcAft>
+              <a:buClr>
+                <a:schemeClr val="dk1"/>
+              </a:buClr>
+              <a:buSzPts val="1200"/>
+              <a:buFont typeface="Albert Sans"/>
+              <a:buNone/>
+              <a:defRPr sz="1200" b="0" i="0" u="none" strike="noStrike" cap="none">
+                <a:solidFill>
+                  <a:schemeClr val="dk1"/>
+                </a:solidFill>
+                <a:latin typeface="Albert Sans"/>
+                <a:ea typeface="Albert Sans"/>
+                <a:cs typeface="Albert Sans"/>
+                <a:sym typeface="Albert Sans"/>
+              </a:defRPr>
+            </a:lvl6pPr>
+            <a:lvl7pPr marL="3200400" marR="0" lvl="6" indent="-304800" algn="ctr" rtl="0" eaLnBrk="1" hangingPunct="1">
+              <a:lnSpc>
+                <a:spcPct val="100000"/>
+              </a:lnSpc>
+              <a:spcBef>
+                <a:spcPts val="0"/>
+              </a:spcBef>
+              <a:spcAft>
+                <a:spcPts val="0"/>
+              </a:spcAft>
+              <a:buClr>
+                <a:schemeClr val="dk1"/>
+              </a:buClr>
+              <a:buSzPts val="1200"/>
+              <a:buFont typeface="Albert Sans"/>
+              <a:buNone/>
+              <a:defRPr sz="1200" b="0" i="0" u="none" strike="noStrike" cap="none">
+                <a:solidFill>
+                  <a:schemeClr val="dk1"/>
+                </a:solidFill>
+                <a:latin typeface="Albert Sans"/>
+                <a:ea typeface="Albert Sans"/>
+                <a:cs typeface="Albert Sans"/>
+                <a:sym typeface="Albert Sans"/>
+              </a:defRPr>
+            </a:lvl7pPr>
+            <a:lvl8pPr marL="3657600" marR="0" lvl="7" indent="-304800" algn="ctr" rtl="0" eaLnBrk="1" hangingPunct="1">
+              <a:lnSpc>
+                <a:spcPct val="100000"/>
+              </a:lnSpc>
+              <a:spcBef>
+                <a:spcPts val="0"/>
+              </a:spcBef>
+              <a:spcAft>
+                <a:spcPts val="0"/>
+              </a:spcAft>
+              <a:buClr>
+                <a:schemeClr val="dk1"/>
+              </a:buClr>
+              <a:buSzPts val="1200"/>
+              <a:buFont typeface="Albert Sans"/>
+              <a:buNone/>
+              <a:defRPr sz="1200" b="0" i="0" u="none" strike="noStrike" cap="none">
+                <a:solidFill>
+                  <a:schemeClr val="dk1"/>
+                </a:solidFill>
+                <a:latin typeface="Albert Sans"/>
+                <a:ea typeface="Albert Sans"/>
+                <a:cs typeface="Albert Sans"/>
+                <a:sym typeface="Albert Sans"/>
+              </a:defRPr>
+            </a:lvl8pPr>
+            <a:lvl9pPr marL="4114800" marR="0" lvl="8" indent="-304800" algn="ctr" rtl="0" eaLnBrk="1" hangingPunct="1">
+              <a:lnSpc>
+                <a:spcPct val="100000"/>
+              </a:lnSpc>
+              <a:spcBef>
+                <a:spcPts val="0"/>
+              </a:spcBef>
+              <a:spcAft>
+                <a:spcPts val="0"/>
+              </a:spcAft>
+              <a:buClr>
+                <a:schemeClr val="dk1"/>
+              </a:buClr>
+              <a:buSzPts val="1200"/>
+              <a:buFont typeface="Albert Sans"/>
+              <a:buNone/>
+              <a:defRPr sz="1200" b="0" i="0" u="none" strike="noStrike" cap="none">
+                <a:solidFill>
+                  <a:schemeClr val="dk1"/>
+                </a:solidFill>
+                <a:latin typeface="Albert Sans"/>
+                <a:ea typeface="Albert Sans"/>
+                <a:cs typeface="Albert Sans"/>
+                <a:sym typeface="Albert Sans"/>
+              </a:defRPr>
+            </a:lvl9pPr>
+          </a:lstStyle>
           <a:p>
+            <a:pPr marL="609600" indent="-457200">
+              <a:lnSpc>
+                <a:spcPct val="150000"/>
+              </a:lnSpc>
+              <a:buFont typeface="Arial" panose="020B0604020202020204" pitchFamily="34" charset="0"/>
+              <a:buChar char="•"/>
+            </a:pPr>
             <a:r>
-              <a:rPr lang="en-US" sz="2900" b="0" i="1" dirty="0">
-                <a:solidFill>
-                  <a:schemeClr val="tx1"/>
-                </a:solidFill>
-                <a:latin typeface="Tw Cen MT" panose="020B0602020104020603" pitchFamily="34" charset="0"/>
+              <a:rPr lang="en-US" sz="2800" dirty="0">
+                <a:latin typeface="Segoe UI Light" panose="020B0502040204020203" pitchFamily="34" charset="0"/>
+                <a:cs typeface="Segoe UI Light" panose="020B0502040204020203" pitchFamily="34" charset="0"/>
               </a:rPr>
-              <a:t>What</a:t>
+              <a:t>Estimation of the diffusion tensor to capture water diffusion patterns.</a:t>
             </a:r>
+          </a:p>
+          <a:p>
+            <a:pPr marL="609600" indent="-457200">
+              <a:lnSpc>
+                <a:spcPct val="150000"/>
+              </a:lnSpc>
+              <a:buFont typeface="Arial" panose="020B0604020202020204" pitchFamily="34" charset="0"/>
+              <a:buChar char="•"/>
+            </a:pPr>
             <a:r>
-              <a:rPr lang="en-US" sz="2900" b="0" dirty="0">
-                <a:solidFill>
-                  <a:schemeClr val="tx1"/>
-                </a:solidFill>
-                <a:latin typeface="Tw Cen MT" panose="020B0602020104020603" pitchFamily="34" charset="0"/>
+              <a:rPr lang="en-US" sz="2800" dirty="0">
+                <a:latin typeface="Segoe UI Light" panose="020B0502040204020203" pitchFamily="34" charset="0"/>
+                <a:cs typeface="Segoe UI Light" panose="020B0502040204020203" pitchFamily="34" charset="0"/>
               </a:rPr>
-              <a:t> is </a:t>
+              <a:t>Reveals microstructural changes in neural tissue.</a:t>
             </a:r>
-            <a:r>
-              <a:rPr lang="en-US" sz="2900" b="1" dirty="0">
-                <a:solidFill>
-                  <a:schemeClr val="tx1"/>
-                </a:solidFill>
-                <a:latin typeface="Tw Cen MT" panose="020B0602020104020603" pitchFamily="34" charset="0"/>
-              </a:rPr>
-              <a:t>DTI</a:t>
-            </a:r>
-            <a:r>
-              <a:rPr lang="en-US" sz="2900" b="0" dirty="0">
-                <a:solidFill>
-                  <a:schemeClr val="tx1"/>
-                </a:solidFill>
-                <a:latin typeface="Tw Cen MT" panose="020B0602020104020603" pitchFamily="34" charset="0"/>
-              </a:rPr>
-              <a:t> and </a:t>
-            </a:r>
-            <a:r>
-              <a:rPr lang="en-US" sz="2900" b="0" i="1" dirty="0">
-                <a:solidFill>
-                  <a:schemeClr val="tx1"/>
-                </a:solidFill>
-                <a:latin typeface="Tw Cen MT" panose="020B0602020104020603" pitchFamily="34" charset="0"/>
-              </a:rPr>
-              <a:t>Why</a:t>
-            </a:r>
-            <a:r>
-              <a:rPr lang="en-US" sz="2900" b="0" dirty="0">
-                <a:solidFill>
-                  <a:schemeClr val="tx1"/>
-                </a:solidFill>
-                <a:latin typeface="Tw Cen MT" panose="020B0602020104020603" pitchFamily="34" charset="0"/>
-              </a:rPr>
-              <a:t> it’s </a:t>
-            </a:r>
-            <a:r>
-              <a:rPr lang="en-US" sz="2900" b="1" dirty="0">
-                <a:solidFill>
-                  <a:schemeClr val="tx1"/>
-                </a:solidFill>
-                <a:latin typeface="Tw Cen MT" panose="020B0602020104020603" pitchFamily="34" charset="0"/>
-              </a:rPr>
-              <a:t>Powerful ↴</a:t>
-            </a:r>
-            <a:endParaRPr lang="en-AU" sz="2900" dirty="0">
-              <a:solidFill>
-                <a:schemeClr val="tx1"/>
-              </a:solidFill>
+            <a:endParaRPr lang="en-AU" sz="2800" dirty="0">
+              <a:latin typeface="Segoe UI Light" panose="020B0502040204020203" pitchFamily="34" charset="0"/>
+              <a:cs typeface="Segoe UI Light" panose="020B0502040204020203" pitchFamily="34" charset="0"/>
             </a:endParaRPr>
           </a:p>
         </p:txBody>
       </p:sp>
+      <p:grpSp>
+        <p:nvGrpSpPr>
+          <p:cNvPr id="9" name="Group 8">
+            <a:extLst>
+              <a:ext uri="{FF2B5EF4-FFF2-40B4-BE49-F238E27FC236}">
+                <a16:creationId xmlns:a16="http://schemas.microsoft.com/office/drawing/2014/main" id="{94BDD0FD-FD2D-006C-51DE-FDF76A95E1C2}"/>
+              </a:ext>
+            </a:extLst>
+          </p:cNvPr>
+          <p:cNvGrpSpPr/>
+          <p:nvPr/>
+        </p:nvGrpSpPr>
+        <p:grpSpPr>
+          <a:xfrm>
+            <a:off x="6866653" y="1899712"/>
+            <a:ext cx="5008101" cy="4598445"/>
+            <a:chOff x="6866653" y="1899712"/>
+            <a:chExt cx="5008101" cy="4598445"/>
+          </a:xfrm>
+        </p:grpSpPr>
+        <p:pic>
+          <p:nvPicPr>
+            <p:cNvPr id="1028" name="Picture 4" descr="Principles of diffusion. (A) The diffusion tensor ellipsoid represents ...">
+              <a:extLst>
+                <a:ext uri="{FF2B5EF4-FFF2-40B4-BE49-F238E27FC236}">
+                  <a16:creationId xmlns:a16="http://schemas.microsoft.com/office/drawing/2014/main" id="{A2C1C5EF-BF64-C75E-43F8-6E2E510BE480}"/>
+                </a:ext>
+              </a:extLst>
+            </p:cNvPr>
+            <p:cNvPicPr>
+              <a:picLocks noChangeAspect="1" noChangeArrowheads="1"/>
+            </p:cNvPicPr>
+            <p:nvPr/>
+          </p:nvPicPr>
+          <p:blipFill>
+            <a:blip r:embed="rId3">
+              <a:extLst>
+                <a:ext uri="{28A0092B-C50C-407E-A947-70E740481C1C}">
+                  <a14:useLocalDpi xmlns:a14="http://schemas.microsoft.com/office/drawing/2010/main" val="0"/>
+                </a:ext>
+              </a:extLst>
+            </a:blip>
+            <a:srcRect/>
+            <a:stretch>
+              <a:fillRect/>
+            </a:stretch>
+          </p:blipFill>
+          <p:spPr bwMode="auto">
+            <a:xfrm>
+              <a:off x="6866653" y="1899712"/>
+              <a:ext cx="5008101" cy="4336835"/>
+            </a:xfrm>
+            <a:prstGeom prst="rect">
+              <a:avLst/>
+            </a:prstGeom>
+            <a:noFill/>
+            <a:extLst>
+              <a:ext uri="{909E8E84-426E-40DD-AFC4-6F175D3DCCD1}">
+                <a14:hiddenFill xmlns:a14="http://schemas.microsoft.com/office/drawing/2010/main">
+                  <a:solidFill>
+                    <a:srgbClr val="FFFFFF"/>
+                  </a:solidFill>
+                </a14:hiddenFill>
+              </a:ext>
+            </a:extLst>
+          </p:spPr>
+        </p:pic>
+        <p:sp>
+          <p:nvSpPr>
+            <p:cNvPr id="8" name="TextBox 7">
+              <a:extLst>
+                <a:ext uri="{FF2B5EF4-FFF2-40B4-BE49-F238E27FC236}">
+                  <a16:creationId xmlns:a16="http://schemas.microsoft.com/office/drawing/2014/main" id="{15DAC1F6-ABA0-01EC-60F1-AF1E06E21F69}"/>
+                </a:ext>
+              </a:extLst>
+            </p:cNvPr>
+            <p:cNvSpPr txBox="1"/>
+            <p:nvPr/>
+          </p:nvSpPr>
+          <p:spPr>
+            <a:xfrm>
+              <a:off x="6866653" y="6236547"/>
+              <a:ext cx="4591455" cy="261610"/>
+            </a:xfrm>
+            <a:prstGeom prst="rect">
+              <a:avLst/>
+            </a:prstGeom>
+            <a:noFill/>
+          </p:spPr>
+          <p:txBody>
+            <a:bodyPr wrap="square" rtlCol="0">
+              <a:spAutoFit/>
+            </a:bodyPr>
+            <a:lstStyle/>
+            <a:p>
+              <a:r>
+                <a:rPr lang="en-AU" sz="1100" dirty="0">
+                  <a:solidFill>
+                    <a:schemeClr val="tx1"/>
+                  </a:solidFill>
+                </a:rPr>
+                <a:t>Source: Anderson, E. J., et al. (2011).</a:t>
+              </a:r>
+            </a:p>
+          </p:txBody>
+        </p:sp>
+      </p:grpSp>
     </p:spTree>
     <p:extLst>
       <p:ext uri="{BB962C8B-B14F-4D97-AF65-F5344CB8AC3E}">
@@ -16915,6 +17210,838 @@
 </file>
 
 <file path=ppt/slides/slide4.xml><?xml version="1.0" encoding="utf-8"?>
+<p:sld xmlns:a="http://schemas.openxmlformats.org/drawingml/2006/main" xmlns:r="http://schemas.openxmlformats.org/officeDocument/2006/relationships" xmlns:p="http://schemas.openxmlformats.org/presentationml/2006/main">
+  <p:cSld>
+    <p:spTree>
+      <p:nvGrpSpPr>
+        <p:cNvPr id="1" name="">
+          <a:extLst>
+            <a:ext uri="{FF2B5EF4-FFF2-40B4-BE49-F238E27FC236}">
+              <a16:creationId xmlns:a16="http://schemas.microsoft.com/office/drawing/2014/main" id="{980DAF9A-2118-2352-CB91-9D8681DB4D0C}"/>
+            </a:ext>
+          </a:extLst>
+        </p:cNvPr>
+        <p:cNvGrpSpPr/>
+        <p:nvPr/>
+      </p:nvGrpSpPr>
+      <p:grpSpPr>
+        <a:xfrm>
+          <a:off x="0" y="0"/>
+          <a:ext cx="0" cy="0"/>
+          <a:chOff x="0" y="0"/>
+          <a:chExt cx="0" cy="0"/>
+        </a:xfrm>
+      </p:grpSpPr>
+      <p:sp>
+        <p:nvSpPr>
+          <p:cNvPr id="4" name="Subtitle 4">
+            <a:extLst>
+              <a:ext uri="{FF2B5EF4-FFF2-40B4-BE49-F238E27FC236}">
+                <a16:creationId xmlns:a16="http://schemas.microsoft.com/office/drawing/2014/main" id="{420BFD1E-E24C-B3F8-45E3-E41E73E8AC6F}"/>
+              </a:ext>
+            </a:extLst>
+          </p:cNvPr>
+          <p:cNvSpPr txBox="1">
+            <a:spLocks/>
+          </p:cNvSpPr>
+          <p:nvPr/>
+        </p:nvSpPr>
+        <p:spPr>
+          <a:xfrm>
+            <a:off x="460712" y="1586988"/>
+            <a:ext cx="6256421" cy="5102569"/>
+          </a:xfrm>
+          <a:prstGeom prst="rect">
+            <a:avLst/>
+          </a:prstGeom>
+          <a:noFill/>
+          <a:ln>
+            <a:noFill/>
+          </a:ln>
+        </p:spPr>
+        <p:txBody>
+          <a:bodyPr spcFirstLastPara="1" wrap="square" lIns="91425" tIns="91425" rIns="91425" bIns="91425" anchor="t" anchorCtr="0">
+            <a:noAutofit/>
+          </a:bodyPr>
+          <a:lstStyle>
+            <a:defPPr marR="0" lvl="0" algn="l" rtl="0">
+              <a:lnSpc>
+                <a:spcPct val="100000"/>
+              </a:lnSpc>
+              <a:spcBef>
+                <a:spcPts val="0"/>
+              </a:spcBef>
+              <a:spcAft>
+                <a:spcPts val="0"/>
+              </a:spcAft>
+            </a:defPPr>
+            <a:lvl1pPr marL="457200" marR="0" lvl="0" indent="-304800" algn="l" rtl="0" eaLnBrk="1" hangingPunct="1">
+              <a:lnSpc>
+                <a:spcPct val="100000"/>
+              </a:lnSpc>
+              <a:spcBef>
+                <a:spcPts val="0"/>
+              </a:spcBef>
+              <a:spcAft>
+                <a:spcPts val="0"/>
+              </a:spcAft>
+              <a:buClr>
+                <a:schemeClr val="dk1"/>
+              </a:buClr>
+              <a:buSzPts val="1200"/>
+              <a:buFont typeface="Albert Sans"/>
+              <a:buNone/>
+              <a:defRPr sz="1200" b="0" i="0" u="none" strike="noStrike" cap="none">
+                <a:solidFill>
+                  <a:schemeClr val="dk1"/>
+                </a:solidFill>
+                <a:latin typeface="Albert Sans"/>
+                <a:ea typeface="Albert Sans"/>
+                <a:cs typeface="Albert Sans"/>
+                <a:sym typeface="Albert Sans"/>
+              </a:defRPr>
+            </a:lvl1pPr>
+            <a:lvl2pPr marL="914400" marR="0" lvl="1" indent="-304800" algn="ctr" rtl="0" eaLnBrk="1" hangingPunct="1">
+              <a:lnSpc>
+                <a:spcPct val="100000"/>
+              </a:lnSpc>
+              <a:spcBef>
+                <a:spcPts val="0"/>
+              </a:spcBef>
+              <a:spcAft>
+                <a:spcPts val="0"/>
+              </a:spcAft>
+              <a:buClr>
+                <a:schemeClr val="dk1"/>
+              </a:buClr>
+              <a:buSzPts val="1200"/>
+              <a:buFont typeface="Albert Sans"/>
+              <a:buNone/>
+              <a:defRPr sz="1200" b="0" i="0" u="none" strike="noStrike" cap="none">
+                <a:solidFill>
+                  <a:schemeClr val="dk1"/>
+                </a:solidFill>
+                <a:latin typeface="Albert Sans"/>
+                <a:ea typeface="Albert Sans"/>
+                <a:cs typeface="Albert Sans"/>
+                <a:sym typeface="Albert Sans"/>
+              </a:defRPr>
+            </a:lvl2pPr>
+            <a:lvl3pPr marL="1371600" marR="0" lvl="2" indent="-304800" algn="ctr" rtl="0" eaLnBrk="1" hangingPunct="1">
+              <a:lnSpc>
+                <a:spcPct val="100000"/>
+              </a:lnSpc>
+              <a:spcBef>
+                <a:spcPts val="0"/>
+              </a:spcBef>
+              <a:spcAft>
+                <a:spcPts val="0"/>
+              </a:spcAft>
+              <a:buClr>
+                <a:schemeClr val="dk1"/>
+              </a:buClr>
+              <a:buSzPts val="1200"/>
+              <a:buFont typeface="Albert Sans"/>
+              <a:buNone/>
+              <a:defRPr sz="1200" b="0" i="0" u="none" strike="noStrike" cap="none">
+                <a:solidFill>
+                  <a:schemeClr val="dk1"/>
+                </a:solidFill>
+                <a:latin typeface="Albert Sans"/>
+                <a:ea typeface="Albert Sans"/>
+                <a:cs typeface="Albert Sans"/>
+                <a:sym typeface="Albert Sans"/>
+              </a:defRPr>
+            </a:lvl3pPr>
+            <a:lvl4pPr marL="1828800" marR="0" lvl="3" indent="-304800" algn="ctr" rtl="0" eaLnBrk="1" hangingPunct="1">
+              <a:lnSpc>
+                <a:spcPct val="100000"/>
+              </a:lnSpc>
+              <a:spcBef>
+                <a:spcPts val="0"/>
+              </a:spcBef>
+              <a:spcAft>
+                <a:spcPts val="0"/>
+              </a:spcAft>
+              <a:buClr>
+                <a:schemeClr val="dk1"/>
+              </a:buClr>
+              <a:buSzPts val="1200"/>
+              <a:buFont typeface="Albert Sans"/>
+              <a:buNone/>
+              <a:defRPr sz="1200" b="0" i="0" u="none" strike="noStrike" cap="none">
+                <a:solidFill>
+                  <a:schemeClr val="dk1"/>
+                </a:solidFill>
+                <a:latin typeface="Albert Sans"/>
+                <a:ea typeface="Albert Sans"/>
+                <a:cs typeface="Albert Sans"/>
+                <a:sym typeface="Albert Sans"/>
+              </a:defRPr>
+            </a:lvl4pPr>
+            <a:lvl5pPr marL="2286000" marR="0" lvl="4" indent="-304800" algn="ctr" rtl="0" eaLnBrk="1" hangingPunct="1">
+              <a:lnSpc>
+                <a:spcPct val="100000"/>
+              </a:lnSpc>
+              <a:spcBef>
+                <a:spcPts val="0"/>
+              </a:spcBef>
+              <a:spcAft>
+                <a:spcPts val="0"/>
+              </a:spcAft>
+              <a:buClr>
+                <a:schemeClr val="dk1"/>
+              </a:buClr>
+              <a:buSzPts val="1200"/>
+              <a:buFont typeface="Albert Sans"/>
+              <a:buNone/>
+              <a:defRPr sz="1200" b="0" i="0" u="none" strike="noStrike" cap="none">
+                <a:solidFill>
+                  <a:schemeClr val="dk1"/>
+                </a:solidFill>
+                <a:latin typeface="Albert Sans"/>
+                <a:ea typeface="Albert Sans"/>
+                <a:cs typeface="Albert Sans"/>
+                <a:sym typeface="Albert Sans"/>
+              </a:defRPr>
+            </a:lvl5pPr>
+            <a:lvl6pPr marL="2743200" marR="0" lvl="5" indent="-304800" algn="ctr" rtl="0" eaLnBrk="1" hangingPunct="1">
+              <a:lnSpc>
+                <a:spcPct val="100000"/>
+              </a:lnSpc>
+              <a:spcBef>
+                <a:spcPts val="0"/>
+              </a:spcBef>
+              <a:spcAft>
+                <a:spcPts val="0"/>
+              </a:spcAft>
+              <a:buClr>
+                <a:schemeClr val="dk1"/>
+              </a:buClr>
+              <a:buSzPts val="1200"/>
+              <a:buFont typeface="Albert Sans"/>
+              <a:buNone/>
+              <a:defRPr sz="1200" b="0" i="0" u="none" strike="noStrike" cap="none">
+                <a:solidFill>
+                  <a:schemeClr val="dk1"/>
+                </a:solidFill>
+                <a:latin typeface="Albert Sans"/>
+                <a:ea typeface="Albert Sans"/>
+                <a:cs typeface="Albert Sans"/>
+                <a:sym typeface="Albert Sans"/>
+              </a:defRPr>
+            </a:lvl6pPr>
+            <a:lvl7pPr marL="3200400" marR="0" lvl="6" indent="-304800" algn="ctr" rtl="0" eaLnBrk="1" hangingPunct="1">
+              <a:lnSpc>
+                <a:spcPct val="100000"/>
+              </a:lnSpc>
+              <a:spcBef>
+                <a:spcPts val="0"/>
+              </a:spcBef>
+              <a:spcAft>
+                <a:spcPts val="0"/>
+              </a:spcAft>
+              <a:buClr>
+                <a:schemeClr val="dk1"/>
+              </a:buClr>
+              <a:buSzPts val="1200"/>
+              <a:buFont typeface="Albert Sans"/>
+              <a:buNone/>
+              <a:defRPr sz="1200" b="0" i="0" u="none" strike="noStrike" cap="none">
+                <a:solidFill>
+                  <a:schemeClr val="dk1"/>
+                </a:solidFill>
+                <a:latin typeface="Albert Sans"/>
+                <a:ea typeface="Albert Sans"/>
+                <a:cs typeface="Albert Sans"/>
+                <a:sym typeface="Albert Sans"/>
+              </a:defRPr>
+            </a:lvl7pPr>
+            <a:lvl8pPr marL="3657600" marR="0" lvl="7" indent="-304800" algn="ctr" rtl="0" eaLnBrk="1" hangingPunct="1">
+              <a:lnSpc>
+                <a:spcPct val="100000"/>
+              </a:lnSpc>
+              <a:spcBef>
+                <a:spcPts val="0"/>
+              </a:spcBef>
+              <a:spcAft>
+                <a:spcPts val="0"/>
+              </a:spcAft>
+              <a:buClr>
+                <a:schemeClr val="dk1"/>
+              </a:buClr>
+              <a:buSzPts val="1200"/>
+              <a:buFont typeface="Albert Sans"/>
+              <a:buNone/>
+              <a:defRPr sz="1200" b="0" i="0" u="none" strike="noStrike" cap="none">
+                <a:solidFill>
+                  <a:schemeClr val="dk1"/>
+                </a:solidFill>
+                <a:latin typeface="Albert Sans"/>
+                <a:ea typeface="Albert Sans"/>
+                <a:cs typeface="Albert Sans"/>
+                <a:sym typeface="Albert Sans"/>
+              </a:defRPr>
+            </a:lvl8pPr>
+            <a:lvl9pPr marL="4114800" marR="0" lvl="8" indent="-304800" algn="ctr" rtl="0" eaLnBrk="1" hangingPunct="1">
+              <a:lnSpc>
+                <a:spcPct val="100000"/>
+              </a:lnSpc>
+              <a:spcBef>
+                <a:spcPts val="0"/>
+              </a:spcBef>
+              <a:spcAft>
+                <a:spcPts val="0"/>
+              </a:spcAft>
+              <a:buClr>
+                <a:schemeClr val="dk1"/>
+              </a:buClr>
+              <a:buSzPts val="1200"/>
+              <a:buFont typeface="Albert Sans"/>
+              <a:buNone/>
+              <a:defRPr sz="1200" b="0" i="0" u="none" strike="noStrike" cap="none">
+                <a:solidFill>
+                  <a:schemeClr val="dk1"/>
+                </a:solidFill>
+                <a:latin typeface="Albert Sans"/>
+                <a:ea typeface="Albert Sans"/>
+                <a:cs typeface="Albert Sans"/>
+                <a:sym typeface="Albert Sans"/>
+              </a:defRPr>
+            </a:lvl9pPr>
+          </a:lstStyle>
+          <a:p>
+            <a:pPr marL="609600" indent="-457200">
+              <a:lnSpc>
+                <a:spcPct val="150000"/>
+              </a:lnSpc>
+              <a:buFont typeface="Arial" panose="020B0604020202020204" pitchFamily="34" charset="0"/>
+              <a:buChar char="•"/>
+            </a:pPr>
+            <a:r>
+              <a:rPr lang="en-US" sz="2400" dirty="0">
+                <a:latin typeface="Segoe UI Light" panose="020B0502040204020203" pitchFamily="34" charset="0"/>
+                <a:cs typeface="Segoe UI Light" panose="020B0502040204020203" pitchFamily="34" charset="0"/>
+              </a:rPr>
+              <a:t>Detecting Neurological Conditions Early</a:t>
+            </a:r>
+          </a:p>
+          <a:p>
+            <a:pPr marL="1066800" lvl="1" indent="-457200" algn="l">
+              <a:lnSpc>
+                <a:spcPct val="150000"/>
+              </a:lnSpc>
+              <a:buFont typeface="Arial" panose="020B0604020202020204" pitchFamily="34" charset="0"/>
+              <a:buChar char="•"/>
+            </a:pPr>
+            <a:r>
+              <a:rPr lang="en-AU" sz="2400" dirty="0">
+                <a:latin typeface="Segoe UI Light" panose="020B0502040204020203" pitchFamily="34" charset="0"/>
+                <a:cs typeface="Segoe UI Light" panose="020B0502040204020203" pitchFamily="34" charset="0"/>
+              </a:rPr>
+              <a:t>Stroke</a:t>
+            </a:r>
+          </a:p>
+          <a:p>
+            <a:pPr marL="1066800" lvl="1" indent="-457200" algn="l">
+              <a:lnSpc>
+                <a:spcPct val="150000"/>
+              </a:lnSpc>
+              <a:buFont typeface="Arial" panose="020B0604020202020204" pitchFamily="34" charset="0"/>
+              <a:buChar char="•"/>
+            </a:pPr>
+            <a:r>
+              <a:rPr lang="en-AU" sz="2400" dirty="0" err="1">
+                <a:latin typeface="Segoe UI Light" panose="020B0502040204020203" pitchFamily="34" charset="0"/>
+                <a:cs typeface="Segoe UI Light" panose="020B0502040204020203" pitchFamily="34" charset="0"/>
+              </a:rPr>
+              <a:t>Tumors</a:t>
+            </a:r>
+            <a:endParaRPr lang="en-AU" sz="2400" dirty="0">
+              <a:latin typeface="Segoe UI Light" panose="020B0502040204020203" pitchFamily="34" charset="0"/>
+              <a:cs typeface="Segoe UI Light" panose="020B0502040204020203" pitchFamily="34" charset="0"/>
+            </a:endParaRPr>
+          </a:p>
+          <a:p>
+            <a:pPr marL="1066800" lvl="1" indent="-457200" algn="l">
+              <a:lnSpc>
+                <a:spcPct val="150000"/>
+              </a:lnSpc>
+              <a:buFont typeface="Arial" panose="020B0604020202020204" pitchFamily="34" charset="0"/>
+              <a:buChar char="•"/>
+            </a:pPr>
+            <a:r>
+              <a:rPr lang="en-AU" sz="2400" dirty="0">
+                <a:latin typeface="Segoe UI Light" panose="020B0502040204020203" pitchFamily="34" charset="0"/>
+                <a:cs typeface="Segoe UI Light" panose="020B0502040204020203" pitchFamily="34" charset="0"/>
+              </a:rPr>
+              <a:t>Neurodegenerative diseases</a:t>
+            </a:r>
+          </a:p>
+          <a:p>
+            <a:pPr marL="609600" indent="-457200">
+              <a:lnSpc>
+                <a:spcPct val="150000"/>
+              </a:lnSpc>
+              <a:buFont typeface="Arial" panose="020B0604020202020204" pitchFamily="34" charset="0"/>
+              <a:buChar char="•"/>
+            </a:pPr>
+            <a:r>
+              <a:rPr lang="en-US" sz="2400" dirty="0">
+                <a:latin typeface="Segoe UI Light" panose="020B0502040204020203" pitchFamily="34" charset="0"/>
+                <a:cs typeface="Segoe UI Light" panose="020B0502040204020203" pitchFamily="34" charset="0"/>
+              </a:rPr>
+              <a:t>Transforming Complex Imaging Data into Actionable Insights</a:t>
+            </a:r>
+          </a:p>
+          <a:p>
+            <a:pPr marL="609600" indent="-457200">
+              <a:lnSpc>
+                <a:spcPct val="150000"/>
+              </a:lnSpc>
+              <a:buFont typeface="Arial" panose="020B0604020202020204" pitchFamily="34" charset="0"/>
+              <a:buChar char="•"/>
+            </a:pPr>
+            <a:r>
+              <a:rPr lang="en-US" sz="2400" dirty="0">
+                <a:latin typeface="Segoe UI Light" panose="020B0502040204020203" pitchFamily="34" charset="0"/>
+                <a:cs typeface="Segoe UI Light" panose="020B0502040204020203" pitchFamily="34" charset="0"/>
+              </a:rPr>
+              <a:t>Facilitating early and confident clinical decisions. </a:t>
+            </a:r>
+          </a:p>
+          <a:p>
+            <a:pPr marL="609600" indent="-457200">
+              <a:lnSpc>
+                <a:spcPct val="150000"/>
+              </a:lnSpc>
+              <a:buFont typeface="Arial" panose="020B0604020202020204" pitchFamily="34" charset="0"/>
+              <a:buChar char="•"/>
+            </a:pPr>
+            <a:endParaRPr lang="en-US" sz="2400" dirty="0">
+              <a:latin typeface="Segoe UI Light" panose="020B0502040204020203" pitchFamily="34" charset="0"/>
+              <a:cs typeface="Segoe UI Light" panose="020B0502040204020203" pitchFamily="34" charset="0"/>
+            </a:endParaRPr>
+          </a:p>
+        </p:txBody>
+      </p:sp>
+      <p:sp>
+        <p:nvSpPr>
+          <p:cNvPr id="2" name="TextBox 4">
+            <a:extLst>
+              <a:ext uri="{FF2B5EF4-FFF2-40B4-BE49-F238E27FC236}">
+                <a16:creationId xmlns:a16="http://schemas.microsoft.com/office/drawing/2014/main" id="{B90D0033-B0F4-D868-1F99-582C1B6C7AA5}"/>
+              </a:ext>
+            </a:extLst>
+          </p:cNvPr>
+          <p:cNvSpPr txBox="1"/>
+          <p:nvPr/>
+        </p:nvSpPr>
+        <p:spPr>
+          <a:xfrm>
+            <a:off x="464816" y="592958"/>
+            <a:ext cx="5010053" cy="769441"/>
+          </a:xfrm>
+          <a:prstGeom prst="rect">
+            <a:avLst/>
+          </a:prstGeom>
+          <a:noFill/>
+        </p:spPr>
+        <p:txBody>
+          <a:bodyPr wrap="square">
+            <a:spAutoFit/>
+          </a:bodyPr>
+          <a:lstStyle>
+            <a:defPPr marR="0" lvl="0" algn="l" rtl="0">
+              <a:lnSpc>
+                <a:spcPct val="100000"/>
+              </a:lnSpc>
+              <a:spcBef>
+                <a:spcPts val="0"/>
+              </a:spcBef>
+              <a:spcAft>
+                <a:spcPts val="0"/>
+              </a:spcAft>
+            </a:defPPr>
+            <a:lvl1pPr marR="0" lvl="0" algn="l" rtl="0">
+              <a:lnSpc>
+                <a:spcPct val="100000"/>
+              </a:lnSpc>
+              <a:spcBef>
+                <a:spcPts val="0"/>
+              </a:spcBef>
+              <a:spcAft>
+                <a:spcPts val="0"/>
+              </a:spcAft>
+              <a:buClr>
+                <a:srgbClr val="000000"/>
+              </a:buClr>
+              <a:buFont typeface="Arial"/>
+              <a:defRPr sz="1400" b="0" i="0" u="none" strike="noStrike" cap="none">
+                <a:solidFill>
+                  <a:srgbClr val="000000"/>
+                </a:solidFill>
+                <a:latin typeface="Arial"/>
+                <a:ea typeface="Arial"/>
+                <a:cs typeface="Arial"/>
+                <a:sym typeface="Arial"/>
+              </a:defRPr>
+            </a:lvl1pPr>
+            <a:lvl2pPr marR="0" lvl="1" algn="l" rtl="0">
+              <a:lnSpc>
+                <a:spcPct val="100000"/>
+              </a:lnSpc>
+              <a:spcBef>
+                <a:spcPts val="0"/>
+              </a:spcBef>
+              <a:spcAft>
+                <a:spcPts val="0"/>
+              </a:spcAft>
+              <a:buClr>
+                <a:srgbClr val="000000"/>
+              </a:buClr>
+              <a:buFont typeface="Arial"/>
+              <a:defRPr sz="1400" b="0" i="0" u="none" strike="noStrike" cap="none">
+                <a:solidFill>
+                  <a:srgbClr val="000000"/>
+                </a:solidFill>
+                <a:latin typeface="Arial"/>
+                <a:ea typeface="Arial"/>
+                <a:cs typeface="Arial"/>
+                <a:sym typeface="Arial"/>
+              </a:defRPr>
+            </a:lvl2pPr>
+            <a:lvl3pPr marR="0" lvl="2" algn="l" rtl="0">
+              <a:lnSpc>
+                <a:spcPct val="100000"/>
+              </a:lnSpc>
+              <a:spcBef>
+                <a:spcPts val="0"/>
+              </a:spcBef>
+              <a:spcAft>
+                <a:spcPts val="0"/>
+              </a:spcAft>
+              <a:buClr>
+                <a:srgbClr val="000000"/>
+              </a:buClr>
+              <a:buFont typeface="Arial"/>
+              <a:defRPr sz="1400" b="0" i="0" u="none" strike="noStrike" cap="none">
+                <a:solidFill>
+                  <a:srgbClr val="000000"/>
+                </a:solidFill>
+                <a:latin typeface="Arial"/>
+                <a:ea typeface="Arial"/>
+                <a:cs typeface="Arial"/>
+                <a:sym typeface="Arial"/>
+              </a:defRPr>
+            </a:lvl3pPr>
+            <a:lvl4pPr marR="0" lvl="3" algn="l" rtl="0">
+              <a:lnSpc>
+                <a:spcPct val="100000"/>
+              </a:lnSpc>
+              <a:spcBef>
+                <a:spcPts val="0"/>
+              </a:spcBef>
+              <a:spcAft>
+                <a:spcPts val="0"/>
+              </a:spcAft>
+              <a:buClr>
+                <a:srgbClr val="000000"/>
+              </a:buClr>
+              <a:buFont typeface="Arial"/>
+              <a:defRPr sz="1400" b="0" i="0" u="none" strike="noStrike" cap="none">
+                <a:solidFill>
+                  <a:srgbClr val="000000"/>
+                </a:solidFill>
+                <a:latin typeface="Arial"/>
+                <a:ea typeface="Arial"/>
+                <a:cs typeface="Arial"/>
+                <a:sym typeface="Arial"/>
+              </a:defRPr>
+            </a:lvl4pPr>
+            <a:lvl5pPr marR="0" lvl="4" algn="l" rtl="0">
+              <a:lnSpc>
+                <a:spcPct val="100000"/>
+              </a:lnSpc>
+              <a:spcBef>
+                <a:spcPts val="0"/>
+              </a:spcBef>
+              <a:spcAft>
+                <a:spcPts val="0"/>
+              </a:spcAft>
+              <a:buClr>
+                <a:srgbClr val="000000"/>
+              </a:buClr>
+              <a:buFont typeface="Arial"/>
+              <a:defRPr sz="1400" b="0" i="0" u="none" strike="noStrike" cap="none">
+                <a:solidFill>
+                  <a:srgbClr val="000000"/>
+                </a:solidFill>
+                <a:latin typeface="Arial"/>
+                <a:ea typeface="Arial"/>
+                <a:cs typeface="Arial"/>
+                <a:sym typeface="Arial"/>
+              </a:defRPr>
+            </a:lvl5pPr>
+            <a:lvl6pPr marR="0" lvl="5" algn="l" rtl="0">
+              <a:lnSpc>
+                <a:spcPct val="100000"/>
+              </a:lnSpc>
+              <a:spcBef>
+                <a:spcPts val="0"/>
+              </a:spcBef>
+              <a:spcAft>
+                <a:spcPts val="0"/>
+              </a:spcAft>
+              <a:buClr>
+                <a:srgbClr val="000000"/>
+              </a:buClr>
+              <a:buFont typeface="Arial"/>
+              <a:defRPr sz="1400" b="0" i="0" u="none" strike="noStrike" cap="none">
+                <a:solidFill>
+                  <a:srgbClr val="000000"/>
+                </a:solidFill>
+                <a:latin typeface="Arial"/>
+                <a:ea typeface="Arial"/>
+                <a:cs typeface="Arial"/>
+                <a:sym typeface="Arial"/>
+              </a:defRPr>
+            </a:lvl6pPr>
+            <a:lvl7pPr marR="0" lvl="6" algn="l" rtl="0">
+              <a:lnSpc>
+                <a:spcPct val="100000"/>
+              </a:lnSpc>
+              <a:spcBef>
+                <a:spcPts val="0"/>
+              </a:spcBef>
+              <a:spcAft>
+                <a:spcPts val="0"/>
+              </a:spcAft>
+              <a:buClr>
+                <a:srgbClr val="000000"/>
+              </a:buClr>
+              <a:buFont typeface="Arial"/>
+              <a:defRPr sz="1400" b="0" i="0" u="none" strike="noStrike" cap="none">
+                <a:solidFill>
+                  <a:srgbClr val="000000"/>
+                </a:solidFill>
+                <a:latin typeface="Arial"/>
+                <a:ea typeface="Arial"/>
+                <a:cs typeface="Arial"/>
+                <a:sym typeface="Arial"/>
+              </a:defRPr>
+            </a:lvl7pPr>
+            <a:lvl8pPr marR="0" lvl="7" algn="l" rtl="0">
+              <a:lnSpc>
+                <a:spcPct val="100000"/>
+              </a:lnSpc>
+              <a:spcBef>
+                <a:spcPts val="0"/>
+              </a:spcBef>
+              <a:spcAft>
+                <a:spcPts val="0"/>
+              </a:spcAft>
+              <a:buClr>
+                <a:srgbClr val="000000"/>
+              </a:buClr>
+              <a:buFont typeface="Arial"/>
+              <a:defRPr sz="1400" b="0" i="0" u="none" strike="noStrike" cap="none">
+                <a:solidFill>
+                  <a:srgbClr val="000000"/>
+                </a:solidFill>
+                <a:latin typeface="Arial"/>
+                <a:ea typeface="Arial"/>
+                <a:cs typeface="Arial"/>
+                <a:sym typeface="Arial"/>
+              </a:defRPr>
+            </a:lvl8pPr>
+            <a:lvl9pPr marR="0" lvl="8" algn="l" rtl="0">
+              <a:lnSpc>
+                <a:spcPct val="100000"/>
+              </a:lnSpc>
+              <a:spcBef>
+                <a:spcPts val="0"/>
+              </a:spcBef>
+              <a:spcAft>
+                <a:spcPts val="0"/>
+              </a:spcAft>
+              <a:buClr>
+                <a:srgbClr val="000000"/>
+              </a:buClr>
+              <a:buFont typeface="Arial"/>
+              <a:defRPr sz="1400" b="0" i="0" u="none" strike="noStrike" cap="none">
+                <a:solidFill>
+                  <a:srgbClr val="000000"/>
+                </a:solidFill>
+                <a:latin typeface="Arial"/>
+                <a:ea typeface="Arial"/>
+                <a:cs typeface="Arial"/>
+                <a:sym typeface="Arial"/>
+              </a:defRPr>
+            </a:lvl9pPr>
+          </a:lstStyle>
+          <a:p>
+            <a:r>
+              <a:rPr lang="en-US" sz="4400" b="0" i="1" dirty="0">
+                <a:solidFill>
+                  <a:schemeClr val="tx1"/>
+                </a:solidFill>
+                <a:latin typeface="Tw Cen MT" panose="020B0602020104020603" pitchFamily="34" charset="0"/>
+              </a:rPr>
+              <a:t>Why</a:t>
+            </a:r>
+            <a:r>
+              <a:rPr lang="en-US" sz="4400" b="0" dirty="0">
+                <a:solidFill>
+                  <a:schemeClr val="tx1"/>
+                </a:solidFill>
+                <a:latin typeface="Tw Cen MT" panose="020B0602020104020603" pitchFamily="34" charset="0"/>
+              </a:rPr>
+              <a:t> it’s </a:t>
+            </a:r>
+            <a:r>
+              <a:rPr lang="en-US" sz="4400" b="1" dirty="0">
+                <a:solidFill>
+                  <a:schemeClr val="tx1"/>
+                </a:solidFill>
+                <a:latin typeface="Tw Cen MT" panose="020B0602020104020603" pitchFamily="34" charset="0"/>
+              </a:rPr>
+              <a:t>Powerful ↴</a:t>
+            </a:r>
+            <a:endParaRPr lang="en-AU" sz="4400" dirty="0">
+              <a:solidFill>
+                <a:schemeClr val="tx1"/>
+              </a:solidFill>
+            </a:endParaRPr>
+          </a:p>
+        </p:txBody>
+      </p:sp>
+      <p:grpSp>
+        <p:nvGrpSpPr>
+          <p:cNvPr id="5" name="Group 4">
+            <a:extLst>
+              <a:ext uri="{FF2B5EF4-FFF2-40B4-BE49-F238E27FC236}">
+                <a16:creationId xmlns:a16="http://schemas.microsoft.com/office/drawing/2014/main" id="{148D10DC-ED4B-FD85-C468-2E0F33ECFBD7}"/>
+              </a:ext>
+            </a:extLst>
+          </p:cNvPr>
+          <p:cNvGrpSpPr/>
+          <p:nvPr/>
+        </p:nvGrpSpPr>
+        <p:grpSpPr>
+          <a:xfrm>
+            <a:off x="6946234" y="433387"/>
+            <a:ext cx="5530174" cy="6210003"/>
+            <a:chOff x="6946234" y="433387"/>
+            <a:chExt cx="5530174" cy="6210003"/>
+          </a:xfrm>
+        </p:grpSpPr>
+        <p:pic>
+          <p:nvPicPr>
+            <p:cNvPr id="2052" name="Picture 4" descr="Differences in fractional anisotropy among normal controls, subjective ...">
+              <a:extLst>
+                <a:ext uri="{FF2B5EF4-FFF2-40B4-BE49-F238E27FC236}">
+                  <a16:creationId xmlns:a16="http://schemas.microsoft.com/office/drawing/2014/main" id="{AAD32096-7257-BED8-1C34-D6C058E995C1}"/>
+                </a:ext>
+              </a:extLst>
+            </p:cNvPr>
+            <p:cNvPicPr>
+              <a:picLocks noChangeAspect="1" noChangeArrowheads="1"/>
+            </p:cNvPicPr>
+            <p:nvPr/>
+          </p:nvPicPr>
+          <p:blipFill>
+            <a:blip r:embed="rId3">
+              <a:extLst>
+                <a:ext uri="{28A0092B-C50C-407E-A947-70E740481C1C}">
+                  <a14:useLocalDpi xmlns:a14="http://schemas.microsoft.com/office/drawing/2010/main" val="0"/>
+                </a:ext>
+              </a:extLst>
+            </a:blip>
+            <a:srcRect/>
+            <a:stretch>
+              <a:fillRect/>
+            </a:stretch>
+          </p:blipFill>
+          <p:spPr bwMode="auto">
+            <a:xfrm>
+              <a:off x="6946234" y="433387"/>
+              <a:ext cx="5010053" cy="5991225"/>
+            </a:xfrm>
+            <a:prstGeom prst="rect">
+              <a:avLst/>
+            </a:prstGeom>
+            <a:noFill/>
+            <a:extLst>
+              <a:ext uri="{909E8E84-426E-40DD-AFC4-6F175D3DCCD1}">
+                <a14:hiddenFill xmlns:a14="http://schemas.microsoft.com/office/drawing/2010/main">
+                  <a:solidFill>
+                    <a:srgbClr val="FFFFFF"/>
+                  </a:solidFill>
+                </a14:hiddenFill>
+              </a:ext>
+            </a:extLst>
+          </p:spPr>
+        </p:pic>
+        <p:sp>
+          <p:nvSpPr>
+            <p:cNvPr id="3" name="TextBox 2">
+              <a:extLst>
+                <a:ext uri="{FF2B5EF4-FFF2-40B4-BE49-F238E27FC236}">
+                  <a16:creationId xmlns:a16="http://schemas.microsoft.com/office/drawing/2014/main" id="{1D626227-0B4B-B96E-369B-1FFAB87E100C}"/>
+                </a:ext>
+              </a:extLst>
+            </p:cNvPr>
+            <p:cNvSpPr txBox="1"/>
+            <p:nvPr/>
+          </p:nvSpPr>
+          <p:spPr>
+            <a:xfrm>
+              <a:off x="6946234" y="6381780"/>
+              <a:ext cx="5530174" cy="261610"/>
+            </a:xfrm>
+            <a:prstGeom prst="rect">
+              <a:avLst/>
+            </a:prstGeom>
+            <a:noFill/>
+          </p:spPr>
+          <p:txBody>
+            <a:bodyPr wrap="square" rtlCol="0">
+              <a:spAutoFit/>
+            </a:bodyPr>
+            <a:lstStyle/>
+            <a:p>
+              <a:r>
+                <a:rPr lang="en-US" sz="1100" dirty="0">
+                  <a:solidFill>
+                    <a:schemeClr val="tx1"/>
+                  </a:solidFill>
+                </a:rPr>
+                <a:t>Source: Kiuchi, K., et al. (2014) </a:t>
+              </a:r>
+              <a:endParaRPr lang="en-AU" sz="1100" dirty="0">
+                <a:solidFill>
+                  <a:schemeClr val="tx1"/>
+                </a:solidFill>
+              </a:endParaRPr>
+            </a:p>
+          </p:txBody>
+        </p:sp>
+      </p:grpSp>
+    </p:spTree>
+    <p:extLst>
+      <p:ext uri="{BB962C8B-B14F-4D97-AF65-F5344CB8AC3E}">
+        <p14:creationId xmlns:p14="http://schemas.microsoft.com/office/powerpoint/2010/main" val="1536644854"/>
+      </p:ext>
+    </p:extLst>
+  </p:cSld>
+  <p:clrMapOvr>
+    <a:masterClrMapping/>
+  </p:clrMapOvr>
+</p:sld>
+</file>
+
+<file path=ppt/slides/slide5.xml><?xml version="1.0" encoding="utf-8"?>
 <p:sld xmlns:a="http://schemas.openxmlformats.org/drawingml/2006/main" xmlns:r="http://schemas.openxmlformats.org/officeDocument/2006/relationships" xmlns:p="http://schemas.openxmlformats.org/presentationml/2006/main">
   <p:cSld>
     <p:spTree>
@@ -16985,7 +18112,7 @@
 </p:sld>
 </file>
 
-<file path=ppt/slides/slide5.xml><?xml version="1.0" encoding="utf-8"?>
+<file path=ppt/slides/slide6.xml><?xml version="1.0" encoding="utf-8"?>
 <p:sld xmlns:a="http://schemas.openxmlformats.org/drawingml/2006/main" xmlns:r="http://schemas.openxmlformats.org/officeDocument/2006/relationships" xmlns:p="http://schemas.openxmlformats.org/presentationml/2006/main">
   <p:cSld>
     <p:spTree>
@@ -17056,7 +18183,7 @@
 </p:sld>
 </file>
 
-<file path=ppt/slides/slide6.xml><?xml version="1.0" encoding="utf-8"?>
+<file path=ppt/slides/slide7.xml><?xml version="1.0" encoding="utf-8"?>
 <p:sld xmlns:a="http://schemas.openxmlformats.org/drawingml/2006/main" xmlns:r="http://schemas.openxmlformats.org/officeDocument/2006/relationships" xmlns:p="http://schemas.openxmlformats.org/presentationml/2006/main">
   <p:cSld>
     <p:spTree>
@@ -17687,4 +18814,319 @@
   <a:objectDefaults/>
   <a:extraClrSchemeLst/>
 </a:theme>
+</file>
+
+<file path=ppt/theme/theme3.xml><?xml version="1.0" encoding="utf-8"?>
+<a:theme xmlns:a="http://schemas.openxmlformats.org/drawingml/2006/main" name="Office Theme">
+  <a:themeElements>
+    <a:clrScheme name="Office">
+      <a:dk1>
+        <a:sysClr val="windowText" lastClr="000000"/>
+      </a:dk1>
+      <a:lt1>
+        <a:sysClr val="window" lastClr="FFFFFF"/>
+      </a:lt1>
+      <a:dk2>
+        <a:srgbClr val="0E2841"/>
+      </a:dk2>
+      <a:lt2>
+        <a:srgbClr val="E8E8E8"/>
+      </a:lt2>
+      <a:accent1>
+        <a:srgbClr val="156082"/>
+      </a:accent1>
+      <a:accent2>
+        <a:srgbClr val="E97132"/>
+      </a:accent2>
+      <a:accent3>
+        <a:srgbClr val="196B24"/>
+      </a:accent3>
+      <a:accent4>
+        <a:srgbClr val="0F9ED5"/>
+      </a:accent4>
+      <a:accent5>
+        <a:srgbClr val="A02B93"/>
+      </a:accent5>
+      <a:accent6>
+        <a:srgbClr val="4EA72E"/>
+      </a:accent6>
+      <a:hlink>
+        <a:srgbClr val="467886"/>
+      </a:hlink>
+      <a:folHlink>
+        <a:srgbClr val="96607D"/>
+      </a:folHlink>
+    </a:clrScheme>
+    <a:fontScheme name="Office">
+      <a:majorFont>
+        <a:latin typeface="Aptos Display" panose="02110004020202020204"/>
+        <a:ea typeface=""/>
+        <a:cs typeface=""/>
+        <a:font script="Jpan" typeface="游ゴシック Light"/>
+        <a:font script="Hang" typeface="맑은 고딕"/>
+        <a:font script="Hans" typeface="等线 Light"/>
+        <a:font script="Hant" typeface="新細明體"/>
+        <a:font script="Arab" typeface="Times New Roman"/>
+        <a:font script="Hebr" typeface="Times New Roman"/>
+        <a:font script="Thai" typeface="Angsana New"/>
+        <a:font script="Ethi" typeface="Nyala"/>
+        <a:font script="Beng" typeface="Vrinda"/>
+        <a:font script="Gujr" typeface="Shruti"/>
+        <a:font script="Khmr" typeface="MoolBoran"/>
+        <a:font script="Knda" typeface="Tunga"/>
+        <a:font script="Guru" typeface="Raavi"/>
+        <a:font script="Cans" typeface="Euphemia"/>
+        <a:font script="Cher" typeface="Plantagenet Cherokee"/>
+        <a:font script="Yiii" typeface="Microsoft Yi Baiti"/>
+        <a:font script="Tibt" typeface="Microsoft Himalaya"/>
+        <a:font script="Thaa" typeface="MV Boli"/>
+        <a:font script="Deva" typeface="Mangal"/>
+        <a:font script="Telu" typeface="Gautami"/>
+        <a:font script="Taml" typeface="Latha"/>
+        <a:font script="Syrc" typeface="Estrangelo Edessa"/>
+        <a:font script="Orya" typeface="Kalinga"/>
+        <a:font script="Mlym" typeface="Kartika"/>
+        <a:font script="Laoo" typeface="DokChampa"/>
+        <a:font script="Sinh" typeface="Iskoola Pota"/>
+        <a:font script="Mong" typeface="Mongolian Baiti"/>
+        <a:font script="Viet" typeface="Times New Roman"/>
+        <a:font script="Uigh" typeface="Microsoft Uighur"/>
+        <a:font script="Geor" typeface="Sylfaen"/>
+        <a:font script="Armn" typeface="Arial"/>
+        <a:font script="Bugi" typeface="Leelawadee UI"/>
+        <a:font script="Bopo" typeface="Microsoft JhengHei"/>
+        <a:font script="Java" typeface="Javanese Text"/>
+        <a:font script="Lisu" typeface="Segoe UI"/>
+        <a:font script="Mymr" typeface="Myanmar Text"/>
+        <a:font script="Nkoo" typeface="Ebrima"/>
+        <a:font script="Olck" typeface="Nirmala UI"/>
+        <a:font script="Osma" typeface="Ebrima"/>
+        <a:font script="Phag" typeface="Phagspa"/>
+        <a:font script="Syrn" typeface="Estrangelo Edessa"/>
+        <a:font script="Syrj" typeface="Estrangelo Edessa"/>
+        <a:font script="Syre" typeface="Estrangelo Edessa"/>
+        <a:font script="Sora" typeface="Nirmala UI"/>
+        <a:font script="Tale" typeface="Microsoft Tai Le"/>
+        <a:font script="Talu" typeface="Microsoft New Tai Lue"/>
+        <a:font script="Tfng" typeface="Ebrima"/>
+      </a:majorFont>
+      <a:minorFont>
+        <a:latin typeface="Aptos" panose="02110004020202020204"/>
+        <a:ea typeface=""/>
+        <a:cs typeface=""/>
+        <a:font script="Jpan" typeface="游ゴシック"/>
+        <a:font script="Hang" typeface="맑은 고딕"/>
+        <a:font script="Hans" typeface="等线"/>
+        <a:font script="Hant" typeface="新細明體"/>
+        <a:font script="Arab" typeface="Arial"/>
+        <a:font script="Hebr" typeface="Arial"/>
+        <a:font script="Thai" typeface="Cordia New"/>
+        <a:font script="Ethi" typeface="Nyala"/>
+        <a:font script="Beng" typeface="Vrinda"/>
+        <a:font script="Gujr" typeface="Shruti"/>
+        <a:font script="Khmr" typeface="DaunPenh"/>
+        <a:font script="Knda" typeface="Tunga"/>
+        <a:font script="Guru" typeface="Raavi"/>
+        <a:font script="Cans" typeface="Euphemia"/>
+        <a:font script="Cher" typeface="Plantagenet Cherokee"/>
+        <a:font script="Yiii" typeface="Microsoft Yi Baiti"/>
+        <a:font script="Tibt" typeface="Microsoft Himalaya"/>
+        <a:font script="Thaa" typeface="MV Boli"/>
+        <a:font script="Deva" typeface="Mangal"/>
+        <a:font script="Telu" typeface="Gautami"/>
+        <a:font script="Taml" typeface="Latha"/>
+        <a:font script="Syrc" typeface="Estrangelo Edessa"/>
+        <a:font script="Orya" typeface="Kalinga"/>
+        <a:font script="Mlym" typeface="Kartika"/>
+        <a:font script="Laoo" typeface="DokChampa"/>
+        <a:font script="Sinh" typeface="Iskoola Pota"/>
+        <a:font script="Mong" typeface="Mongolian Baiti"/>
+        <a:font script="Viet" typeface="Arial"/>
+        <a:font script="Uigh" typeface="Microsoft Uighur"/>
+        <a:font script="Geor" typeface="Sylfaen"/>
+        <a:font script="Armn" typeface="Arial"/>
+        <a:font script="Bugi" typeface="Leelawadee UI"/>
+        <a:font script="Bopo" typeface="Microsoft JhengHei"/>
+        <a:font script="Java" typeface="Javanese Text"/>
+        <a:font script="Lisu" typeface="Segoe UI"/>
+        <a:font script="Mymr" typeface="Myanmar Text"/>
+        <a:font script="Nkoo" typeface="Ebrima"/>
+        <a:font script="Olck" typeface="Nirmala UI"/>
+        <a:font script="Osma" typeface="Ebrima"/>
+        <a:font script="Phag" typeface="Phagspa"/>
+        <a:font script="Syrn" typeface="Estrangelo Edessa"/>
+        <a:font script="Syrj" typeface="Estrangelo Edessa"/>
+        <a:font script="Syre" typeface="Estrangelo Edessa"/>
+        <a:font script="Sora" typeface="Nirmala UI"/>
+        <a:font script="Tale" typeface="Microsoft Tai Le"/>
+        <a:font script="Talu" typeface="Microsoft New Tai Lue"/>
+        <a:font script="Tfng" typeface="Ebrima"/>
+      </a:minorFont>
+    </a:fontScheme>
+    <a:fmtScheme name="Office">
+      <a:fillStyleLst>
+        <a:solidFill>
+          <a:schemeClr val="phClr"/>
+        </a:solidFill>
+        <a:gradFill rotWithShape="1">
+          <a:gsLst>
+            <a:gs pos="0">
+              <a:schemeClr val="phClr">
+                <a:lumMod val="110000"/>
+                <a:satMod val="105000"/>
+                <a:tint val="67000"/>
+              </a:schemeClr>
+            </a:gs>
+            <a:gs pos="50000">
+              <a:schemeClr val="phClr">
+                <a:lumMod val="105000"/>
+                <a:satMod val="103000"/>
+                <a:tint val="73000"/>
+              </a:schemeClr>
+            </a:gs>
+            <a:gs pos="100000">
+              <a:schemeClr val="phClr">
+                <a:lumMod val="105000"/>
+                <a:satMod val="109000"/>
+                <a:tint val="81000"/>
+              </a:schemeClr>
+            </a:gs>
+          </a:gsLst>
+          <a:lin ang="5400000" scaled="0"/>
+        </a:gradFill>
+        <a:gradFill rotWithShape="1">
+          <a:gsLst>
+            <a:gs pos="0">
+              <a:schemeClr val="phClr">
+                <a:satMod val="103000"/>
+                <a:lumMod val="102000"/>
+                <a:tint val="94000"/>
+              </a:schemeClr>
+            </a:gs>
+            <a:gs pos="50000">
+              <a:schemeClr val="phClr">
+                <a:satMod val="110000"/>
+                <a:lumMod val="100000"/>
+                <a:shade val="100000"/>
+              </a:schemeClr>
+            </a:gs>
+            <a:gs pos="100000">
+              <a:schemeClr val="phClr">
+                <a:lumMod val="99000"/>
+                <a:satMod val="120000"/>
+                <a:shade val="78000"/>
+              </a:schemeClr>
+            </a:gs>
+          </a:gsLst>
+          <a:lin ang="5400000" scaled="0"/>
+        </a:gradFill>
+      </a:fillStyleLst>
+      <a:lnStyleLst>
+        <a:ln w="12700" cap="flat" cmpd="sng" algn="ctr">
+          <a:solidFill>
+            <a:schemeClr val="phClr"/>
+          </a:solidFill>
+          <a:prstDash val="solid"/>
+          <a:miter lim="800000"/>
+        </a:ln>
+        <a:ln w="19050" cap="flat" cmpd="sng" algn="ctr">
+          <a:solidFill>
+            <a:schemeClr val="phClr"/>
+          </a:solidFill>
+          <a:prstDash val="solid"/>
+          <a:miter lim="800000"/>
+        </a:ln>
+        <a:ln w="25400" cap="flat" cmpd="sng" algn="ctr">
+          <a:solidFill>
+            <a:schemeClr val="phClr"/>
+          </a:solidFill>
+          <a:prstDash val="solid"/>
+          <a:miter lim="800000"/>
+        </a:ln>
+      </a:lnStyleLst>
+      <a:effectStyleLst>
+        <a:effectStyle>
+          <a:effectLst/>
+        </a:effectStyle>
+        <a:effectStyle>
+          <a:effectLst/>
+        </a:effectStyle>
+        <a:effectStyle>
+          <a:effectLst>
+            <a:outerShdw blurRad="57150" dist="19050" dir="5400000" algn="ctr" rotWithShape="0">
+              <a:srgbClr val="000000">
+                <a:alpha val="63000"/>
+              </a:srgbClr>
+            </a:outerShdw>
+          </a:effectLst>
+        </a:effectStyle>
+      </a:effectStyleLst>
+      <a:bgFillStyleLst>
+        <a:solidFill>
+          <a:schemeClr val="phClr"/>
+        </a:solidFill>
+        <a:solidFill>
+          <a:schemeClr val="phClr">
+            <a:tint val="95000"/>
+            <a:satMod val="170000"/>
+          </a:schemeClr>
+        </a:solidFill>
+        <a:gradFill rotWithShape="1">
+          <a:gsLst>
+            <a:gs pos="0">
+              <a:schemeClr val="phClr">
+                <a:tint val="93000"/>
+                <a:satMod val="150000"/>
+                <a:shade val="98000"/>
+                <a:lumMod val="102000"/>
+              </a:schemeClr>
+            </a:gs>
+            <a:gs pos="50000">
+              <a:schemeClr val="phClr">
+                <a:tint val="98000"/>
+                <a:satMod val="130000"/>
+                <a:shade val="90000"/>
+                <a:lumMod val="103000"/>
+              </a:schemeClr>
+            </a:gs>
+            <a:gs pos="100000">
+              <a:schemeClr val="phClr">
+                <a:shade val="63000"/>
+                <a:satMod val="120000"/>
+              </a:schemeClr>
+            </a:gs>
+          </a:gsLst>
+          <a:lin ang="5400000" scaled="0"/>
+        </a:gradFill>
+      </a:bgFillStyleLst>
+    </a:fmtScheme>
+  </a:themeElements>
+  <a:objectDefaults>
+    <a:lnDef>
+      <a:spPr/>
+      <a:bodyPr/>
+      <a:lstStyle/>
+      <a:style>
+        <a:lnRef idx="2">
+          <a:schemeClr val="accent1"/>
+        </a:lnRef>
+        <a:fillRef idx="0">
+          <a:schemeClr val="accent1"/>
+        </a:fillRef>
+        <a:effectRef idx="1">
+          <a:schemeClr val="accent1"/>
+        </a:effectRef>
+        <a:fontRef idx="minor">
+          <a:schemeClr val="tx1"/>
+        </a:fontRef>
+      </a:style>
+    </a:lnDef>
+  </a:objectDefaults>
+  <a:extraClrSchemeLst/>
+  <a:extLst>
+    <a:ext uri="{05A4C25C-085E-4340-85A3-A5531E510DB2}">
+      <thm15:themeFamily xmlns:thm15="http://schemas.microsoft.com/office/thememl/2012/main" name="Office Theme" id="{2E142A2C-CD16-42D6-873A-C26D2A0506FA}" vid="{1BDDFF52-6CD6-40A5-AB3C-68EB2F1E4D0A}"/>
+    </a:ext>
+  </a:extLst>
+</a:theme>
 </file>
</xml_diff>

<commit_message>
Added Part I problem presentation slides
</commit_message>
<xml_diff>
--- a/Report/Presentation.pptx
+++ b/Report/Presentation.pptx
@@ -352,7 +352,7 @@
           <a:p>
             <a:fld id="{56630FE1-2033-45DF-940A-B39C033298BC}" type="datetimeFigureOut">
               <a:rPr lang="en-AU" smtClean="0"/>
-              <a:t>29/05/2025</a:t>
+              <a:t>30/5/2025</a:t>
             </a:fld>
             <a:endParaRPr lang="en-AU"/>
           </a:p>
@@ -943,6 +943,90 @@
           <a:bodyPr/>
           <a:lstStyle/>
           <a:p>
+            <a:endParaRPr lang="en-US" dirty="0"/>
+          </a:p>
+        </p:txBody>
+      </p:sp>
+      <p:sp>
+        <p:nvSpPr>
+          <p:cNvPr id="4" name="Slide Number Placeholder 3"/>
+          <p:cNvSpPr>
+            <a:spLocks noGrp="1"/>
+          </p:cNvSpPr>
+          <p:nvPr>
+            <p:ph type="sldNum" sz="quarter" idx="5"/>
+          </p:nvPr>
+        </p:nvSpPr>
+        <p:spPr/>
+        <p:txBody>
+          <a:bodyPr/>
+          <a:lstStyle/>
+          <a:p>
+            <a:fld id="{5089F5C8-CD77-4CFA-B6B5-FFE806853977}" type="slidenum">
+              <a:rPr lang="en-AU" smtClean="0"/>
+              <a:t>5</a:t>
+            </a:fld>
+            <a:endParaRPr lang="en-AU"/>
+          </a:p>
+        </p:txBody>
+      </p:sp>
+    </p:spTree>
+    <p:extLst>
+      <p:ext uri="{BB962C8B-B14F-4D97-AF65-F5344CB8AC3E}">
+        <p14:creationId xmlns:p14="http://schemas.microsoft.com/office/powerpoint/2010/main" val="1565954537"/>
+      </p:ext>
+    </p:extLst>
+  </p:cSld>
+  <p:clrMapOvr>
+    <a:masterClrMapping/>
+  </p:clrMapOvr>
+</p:notes>
+</file>
+
+<file path=ppt/notesSlides/notesSlide5.xml><?xml version="1.0" encoding="utf-8"?>
+<p:notes xmlns:a="http://schemas.openxmlformats.org/drawingml/2006/main" xmlns:r="http://schemas.openxmlformats.org/officeDocument/2006/relationships" xmlns:p="http://schemas.openxmlformats.org/presentationml/2006/main">
+  <p:cSld>
+    <p:spTree>
+      <p:nvGrpSpPr>
+        <p:cNvPr id="1" name=""/>
+        <p:cNvGrpSpPr/>
+        <p:nvPr/>
+      </p:nvGrpSpPr>
+      <p:grpSpPr>
+        <a:xfrm>
+          <a:off x="0" y="0"/>
+          <a:ext cx="0" cy="0"/>
+          <a:chOff x="0" y="0"/>
+          <a:chExt cx="0" cy="0"/>
+        </a:xfrm>
+      </p:grpSpPr>
+      <p:sp>
+        <p:nvSpPr>
+          <p:cNvPr id="2" name="Slide Image Placeholder 1"/>
+          <p:cNvSpPr>
+            <a:spLocks noGrp="1" noRot="1" noChangeAspect="1"/>
+          </p:cNvSpPr>
+          <p:nvPr>
+            <p:ph type="sldImg"/>
+          </p:nvPr>
+        </p:nvSpPr>
+        <p:spPr/>
+      </p:sp>
+      <p:sp>
+        <p:nvSpPr>
+          <p:cNvPr id="3" name="Notes Placeholder 2"/>
+          <p:cNvSpPr>
+            <a:spLocks noGrp="1"/>
+          </p:cNvSpPr>
+          <p:nvPr>
+            <p:ph type="body" idx="1"/>
+          </p:nvPr>
+        </p:nvSpPr>
+        <p:spPr/>
+        <p:txBody>
+          <a:bodyPr/>
+          <a:lstStyle/>
+          <a:p>
             <a:endParaRPr lang="en-AU"/>
           </a:p>
         </p:txBody>
@@ -974,6 +1058,90 @@
     <p:extLst>
       <p:ext uri="{BB962C8B-B14F-4D97-AF65-F5344CB8AC3E}">
         <p14:creationId xmlns:p14="http://schemas.microsoft.com/office/powerpoint/2010/main" val="952066843"/>
+      </p:ext>
+    </p:extLst>
+  </p:cSld>
+  <p:clrMapOvr>
+    <a:masterClrMapping/>
+  </p:clrMapOvr>
+</p:notes>
+</file>
+
+<file path=ppt/notesSlides/notesSlide6.xml><?xml version="1.0" encoding="utf-8"?>
+<p:notes xmlns:a="http://schemas.openxmlformats.org/drawingml/2006/main" xmlns:r="http://schemas.openxmlformats.org/officeDocument/2006/relationships" xmlns:p="http://schemas.openxmlformats.org/presentationml/2006/main">
+  <p:cSld>
+    <p:spTree>
+      <p:nvGrpSpPr>
+        <p:cNvPr id="1" name=""/>
+        <p:cNvGrpSpPr/>
+        <p:nvPr/>
+      </p:nvGrpSpPr>
+      <p:grpSpPr>
+        <a:xfrm>
+          <a:off x="0" y="0"/>
+          <a:ext cx="0" cy="0"/>
+          <a:chOff x="0" y="0"/>
+          <a:chExt cx="0" cy="0"/>
+        </a:xfrm>
+      </p:grpSpPr>
+      <p:sp>
+        <p:nvSpPr>
+          <p:cNvPr id="2" name="Slide Image Placeholder 1"/>
+          <p:cNvSpPr>
+            <a:spLocks noGrp="1" noRot="1" noChangeAspect="1"/>
+          </p:cNvSpPr>
+          <p:nvPr>
+            <p:ph type="sldImg"/>
+          </p:nvPr>
+        </p:nvSpPr>
+        <p:spPr/>
+      </p:sp>
+      <p:sp>
+        <p:nvSpPr>
+          <p:cNvPr id="3" name="Notes Placeholder 2"/>
+          <p:cNvSpPr>
+            <a:spLocks noGrp="1"/>
+          </p:cNvSpPr>
+          <p:nvPr>
+            <p:ph type="body" idx="1"/>
+          </p:nvPr>
+        </p:nvSpPr>
+        <p:spPr/>
+        <p:txBody>
+          <a:bodyPr/>
+          <a:lstStyle/>
+          <a:p>
+            <a:endParaRPr lang="en-US"/>
+          </a:p>
+        </p:txBody>
+      </p:sp>
+      <p:sp>
+        <p:nvSpPr>
+          <p:cNvPr id="4" name="Slide Number Placeholder 3"/>
+          <p:cNvSpPr>
+            <a:spLocks noGrp="1"/>
+          </p:cNvSpPr>
+          <p:nvPr>
+            <p:ph type="sldNum" sz="quarter" idx="5"/>
+          </p:nvPr>
+        </p:nvSpPr>
+        <p:spPr/>
+        <p:txBody>
+          <a:bodyPr/>
+          <a:lstStyle/>
+          <a:p>
+            <a:fld id="{5089F5C8-CD77-4CFA-B6B5-FFE806853977}" type="slidenum">
+              <a:rPr lang="en-AU" smtClean="0"/>
+              <a:t>7</a:t>
+            </a:fld>
+            <a:endParaRPr lang="en-AU"/>
+          </a:p>
+        </p:txBody>
+      </p:sp>
+    </p:spTree>
+    <p:extLst>
+      <p:ext uri="{BB962C8B-B14F-4D97-AF65-F5344CB8AC3E}">
+        <p14:creationId xmlns:p14="http://schemas.microsoft.com/office/powerpoint/2010/main" val="479452980"/>
       </p:ext>
     </p:extLst>
   </p:cSld>
@@ -18127,16 +18295,12 @@
               <a:buChar char="•"/>
             </a:pPr>
             <a:r>
-              <a:rPr lang="en-AU" sz="2400" dirty="0" err="1">
+              <a:rPr lang="en-AU" sz="2400" dirty="0">
                 <a:latin typeface="Segoe UI Light" panose="020B0502040204020203" pitchFamily="34" charset="0"/>
                 <a:cs typeface="Segoe UI Light" panose="020B0502040204020203" pitchFamily="34" charset="0"/>
               </a:rPr>
-              <a:t>Tumors</a:t>
+              <a:t>Tumours</a:t>
             </a:r>
-            <a:endParaRPr lang="en-AU" sz="2400" dirty="0">
-              <a:latin typeface="Segoe UI Light" panose="020B0502040204020203" pitchFamily="34" charset="0"/>
-              <a:cs typeface="Segoe UI Light" panose="020B0502040204020203" pitchFamily="34" charset="0"/>
-            </a:endParaRPr>
           </a:p>
           <a:p>
             <a:pPr marL="1066800" lvl="1" indent="-457200" algn="l">
@@ -18994,8 +19158,8 @@
         </p:nvSpPr>
         <p:spPr>
           <a:xfrm>
-            <a:off x="625702" y="483712"/>
-            <a:ext cx="4555897" cy="1010791"/>
+            <a:off x="325495" y="185638"/>
+            <a:ext cx="6526853" cy="1010791"/>
           </a:xfrm>
         </p:spPr>
         <p:txBody>
@@ -19006,14 +19170,659 @@
               <a:rPr lang="en-US" sz="4000" dirty="0">
                 <a:latin typeface="Tw Cen MT Bold" panose="020B0802020104020603" pitchFamily="34" charset="0"/>
               </a:rPr>
-              <a:t>PART I: </a:t>
+              <a:t>Deriving Meaning from Weighted Signals</a:t>
             </a:r>
+            <a:endParaRPr lang="en-US" sz="4000" b="0" i="1" dirty="0">
+              <a:latin typeface="Tw Cen MT" panose="020B0602020104020603" pitchFamily="34" charset="0"/>
+            </a:endParaRPr>
+          </a:p>
+        </p:txBody>
+      </p:sp>
+      <p:sp>
+        <p:nvSpPr>
+          <p:cNvPr id="5" name="Subtitle 4">
+            <a:extLst>
+              <a:ext uri="{FF2B5EF4-FFF2-40B4-BE49-F238E27FC236}">
+                <a16:creationId xmlns:a16="http://schemas.microsoft.com/office/drawing/2014/main" id="{02838F14-9139-CD06-0EC3-98D0F24F83AB}"/>
+              </a:ext>
+            </a:extLst>
+          </p:cNvPr>
+          <p:cNvSpPr txBox="1">
+            <a:spLocks/>
+          </p:cNvSpPr>
+          <p:nvPr/>
+        </p:nvSpPr>
+        <p:spPr>
+          <a:xfrm>
+            <a:off x="177899" y="1586987"/>
+            <a:ext cx="6256421" cy="5102569"/>
+          </a:xfrm>
+          <a:prstGeom prst="rect">
+            <a:avLst/>
+          </a:prstGeom>
+          <a:noFill/>
+          <a:ln>
+            <a:noFill/>
+          </a:ln>
+        </p:spPr>
+        <p:txBody>
+          <a:bodyPr spcFirstLastPara="1" wrap="square" lIns="91425" tIns="91425" rIns="91425" bIns="91425" anchor="t" anchorCtr="0">
+            <a:noAutofit/>
+          </a:bodyPr>
+          <a:lstStyle>
+            <a:defPPr marR="0" lvl="0" algn="l" rtl="0">
+              <a:lnSpc>
+                <a:spcPct val="100000"/>
+              </a:lnSpc>
+              <a:spcBef>
+                <a:spcPts val="0"/>
+              </a:spcBef>
+              <a:spcAft>
+                <a:spcPts val="0"/>
+              </a:spcAft>
+            </a:defPPr>
+            <a:lvl1pPr marL="457200" marR="0" lvl="0" indent="-304800" algn="l" rtl="0" eaLnBrk="1" hangingPunct="1">
+              <a:lnSpc>
+                <a:spcPct val="100000"/>
+              </a:lnSpc>
+              <a:spcBef>
+                <a:spcPts val="0"/>
+              </a:spcBef>
+              <a:spcAft>
+                <a:spcPts val="0"/>
+              </a:spcAft>
+              <a:buClr>
+                <a:schemeClr val="dk1"/>
+              </a:buClr>
+              <a:buSzPts val="1200"/>
+              <a:buFont typeface="Albert Sans"/>
+              <a:buNone/>
+              <a:defRPr sz="1200" b="0" i="0" u="none" strike="noStrike" cap="none">
+                <a:solidFill>
+                  <a:schemeClr val="dk1"/>
+                </a:solidFill>
+                <a:latin typeface="Albert Sans"/>
+                <a:ea typeface="Albert Sans"/>
+                <a:cs typeface="Albert Sans"/>
+                <a:sym typeface="Albert Sans"/>
+              </a:defRPr>
+            </a:lvl1pPr>
+            <a:lvl2pPr marL="914400" marR="0" lvl="1" indent="-304800" algn="ctr" rtl="0" eaLnBrk="1" hangingPunct="1">
+              <a:lnSpc>
+                <a:spcPct val="100000"/>
+              </a:lnSpc>
+              <a:spcBef>
+                <a:spcPts val="0"/>
+              </a:spcBef>
+              <a:spcAft>
+                <a:spcPts val="0"/>
+              </a:spcAft>
+              <a:buClr>
+                <a:schemeClr val="dk1"/>
+              </a:buClr>
+              <a:buSzPts val="1200"/>
+              <a:buFont typeface="Albert Sans"/>
+              <a:buNone/>
+              <a:defRPr sz="1200" b="0" i="0" u="none" strike="noStrike" cap="none">
+                <a:solidFill>
+                  <a:schemeClr val="dk1"/>
+                </a:solidFill>
+                <a:latin typeface="Albert Sans"/>
+                <a:ea typeface="Albert Sans"/>
+                <a:cs typeface="Albert Sans"/>
+                <a:sym typeface="Albert Sans"/>
+              </a:defRPr>
+            </a:lvl2pPr>
+            <a:lvl3pPr marL="1371600" marR="0" lvl="2" indent="-304800" algn="ctr" rtl="0" eaLnBrk="1" hangingPunct="1">
+              <a:lnSpc>
+                <a:spcPct val="100000"/>
+              </a:lnSpc>
+              <a:spcBef>
+                <a:spcPts val="0"/>
+              </a:spcBef>
+              <a:spcAft>
+                <a:spcPts val="0"/>
+              </a:spcAft>
+              <a:buClr>
+                <a:schemeClr val="dk1"/>
+              </a:buClr>
+              <a:buSzPts val="1200"/>
+              <a:buFont typeface="Albert Sans"/>
+              <a:buNone/>
+              <a:defRPr sz="1200" b="0" i="0" u="none" strike="noStrike" cap="none">
+                <a:solidFill>
+                  <a:schemeClr val="dk1"/>
+                </a:solidFill>
+                <a:latin typeface="Albert Sans"/>
+                <a:ea typeface="Albert Sans"/>
+                <a:cs typeface="Albert Sans"/>
+                <a:sym typeface="Albert Sans"/>
+              </a:defRPr>
+            </a:lvl3pPr>
+            <a:lvl4pPr marL="1828800" marR="0" lvl="3" indent="-304800" algn="ctr" rtl="0" eaLnBrk="1" hangingPunct="1">
+              <a:lnSpc>
+                <a:spcPct val="100000"/>
+              </a:lnSpc>
+              <a:spcBef>
+                <a:spcPts val="0"/>
+              </a:spcBef>
+              <a:spcAft>
+                <a:spcPts val="0"/>
+              </a:spcAft>
+              <a:buClr>
+                <a:schemeClr val="dk1"/>
+              </a:buClr>
+              <a:buSzPts val="1200"/>
+              <a:buFont typeface="Albert Sans"/>
+              <a:buNone/>
+              <a:defRPr sz="1200" b="0" i="0" u="none" strike="noStrike" cap="none">
+                <a:solidFill>
+                  <a:schemeClr val="dk1"/>
+                </a:solidFill>
+                <a:latin typeface="Albert Sans"/>
+                <a:ea typeface="Albert Sans"/>
+                <a:cs typeface="Albert Sans"/>
+                <a:sym typeface="Albert Sans"/>
+              </a:defRPr>
+            </a:lvl4pPr>
+            <a:lvl5pPr marL="2286000" marR="0" lvl="4" indent="-304800" algn="ctr" rtl="0" eaLnBrk="1" hangingPunct="1">
+              <a:lnSpc>
+                <a:spcPct val="100000"/>
+              </a:lnSpc>
+              <a:spcBef>
+                <a:spcPts val="0"/>
+              </a:spcBef>
+              <a:spcAft>
+                <a:spcPts val="0"/>
+              </a:spcAft>
+              <a:buClr>
+                <a:schemeClr val="dk1"/>
+              </a:buClr>
+              <a:buSzPts val="1200"/>
+              <a:buFont typeface="Albert Sans"/>
+              <a:buNone/>
+              <a:defRPr sz="1200" b="0" i="0" u="none" strike="noStrike" cap="none">
+                <a:solidFill>
+                  <a:schemeClr val="dk1"/>
+                </a:solidFill>
+                <a:latin typeface="Albert Sans"/>
+                <a:ea typeface="Albert Sans"/>
+                <a:cs typeface="Albert Sans"/>
+                <a:sym typeface="Albert Sans"/>
+              </a:defRPr>
+            </a:lvl5pPr>
+            <a:lvl6pPr marL="2743200" marR="0" lvl="5" indent="-304800" algn="ctr" rtl="0" eaLnBrk="1" hangingPunct="1">
+              <a:lnSpc>
+                <a:spcPct val="100000"/>
+              </a:lnSpc>
+              <a:spcBef>
+                <a:spcPts val="0"/>
+              </a:spcBef>
+              <a:spcAft>
+                <a:spcPts val="0"/>
+              </a:spcAft>
+              <a:buClr>
+                <a:schemeClr val="dk1"/>
+              </a:buClr>
+              <a:buSzPts val="1200"/>
+              <a:buFont typeface="Albert Sans"/>
+              <a:buNone/>
+              <a:defRPr sz="1200" b="0" i="0" u="none" strike="noStrike" cap="none">
+                <a:solidFill>
+                  <a:schemeClr val="dk1"/>
+                </a:solidFill>
+                <a:latin typeface="Albert Sans"/>
+                <a:ea typeface="Albert Sans"/>
+                <a:cs typeface="Albert Sans"/>
+                <a:sym typeface="Albert Sans"/>
+              </a:defRPr>
+            </a:lvl6pPr>
+            <a:lvl7pPr marL="3200400" marR="0" lvl="6" indent="-304800" algn="ctr" rtl="0" eaLnBrk="1" hangingPunct="1">
+              <a:lnSpc>
+                <a:spcPct val="100000"/>
+              </a:lnSpc>
+              <a:spcBef>
+                <a:spcPts val="0"/>
+              </a:spcBef>
+              <a:spcAft>
+                <a:spcPts val="0"/>
+              </a:spcAft>
+              <a:buClr>
+                <a:schemeClr val="dk1"/>
+              </a:buClr>
+              <a:buSzPts val="1200"/>
+              <a:buFont typeface="Albert Sans"/>
+              <a:buNone/>
+              <a:defRPr sz="1200" b="0" i="0" u="none" strike="noStrike" cap="none">
+                <a:solidFill>
+                  <a:schemeClr val="dk1"/>
+                </a:solidFill>
+                <a:latin typeface="Albert Sans"/>
+                <a:ea typeface="Albert Sans"/>
+                <a:cs typeface="Albert Sans"/>
+                <a:sym typeface="Albert Sans"/>
+              </a:defRPr>
+            </a:lvl7pPr>
+            <a:lvl8pPr marL="3657600" marR="0" lvl="7" indent="-304800" algn="ctr" rtl="0" eaLnBrk="1" hangingPunct="1">
+              <a:lnSpc>
+                <a:spcPct val="100000"/>
+              </a:lnSpc>
+              <a:spcBef>
+                <a:spcPts val="0"/>
+              </a:spcBef>
+              <a:spcAft>
+                <a:spcPts val="0"/>
+              </a:spcAft>
+              <a:buClr>
+                <a:schemeClr val="dk1"/>
+              </a:buClr>
+              <a:buSzPts val="1200"/>
+              <a:buFont typeface="Albert Sans"/>
+              <a:buNone/>
+              <a:defRPr sz="1200" b="0" i="0" u="none" strike="noStrike" cap="none">
+                <a:solidFill>
+                  <a:schemeClr val="dk1"/>
+                </a:solidFill>
+                <a:latin typeface="Albert Sans"/>
+                <a:ea typeface="Albert Sans"/>
+                <a:cs typeface="Albert Sans"/>
+                <a:sym typeface="Albert Sans"/>
+              </a:defRPr>
+            </a:lvl8pPr>
+            <a:lvl9pPr marL="4114800" marR="0" lvl="8" indent="-304800" algn="ctr" rtl="0" eaLnBrk="1" hangingPunct="1">
+              <a:lnSpc>
+                <a:spcPct val="100000"/>
+              </a:lnSpc>
+              <a:spcBef>
+                <a:spcPts val="0"/>
+              </a:spcBef>
+              <a:spcAft>
+                <a:spcPts val="0"/>
+              </a:spcAft>
+              <a:buClr>
+                <a:schemeClr val="dk1"/>
+              </a:buClr>
+              <a:buSzPts val="1200"/>
+              <a:buFont typeface="Albert Sans"/>
+              <a:buNone/>
+              <a:defRPr sz="1200" b="0" i="0" u="none" strike="noStrike" cap="none">
+                <a:solidFill>
+                  <a:schemeClr val="dk1"/>
+                </a:solidFill>
+                <a:latin typeface="Albert Sans"/>
+                <a:ea typeface="Albert Sans"/>
+                <a:cs typeface="Albert Sans"/>
+                <a:sym typeface="Albert Sans"/>
+              </a:defRPr>
+            </a:lvl9pPr>
+          </a:lstStyle>
+          <a:p>
+            <a:pPr marL="152400" indent="0">
+              <a:lnSpc>
+                <a:spcPct val="150000"/>
+              </a:lnSpc>
+            </a:pPr>
             <a:r>
-              <a:rPr lang="en-US" sz="4000" b="0" i="1" dirty="0">
-                <a:latin typeface="Tw Cen MT" panose="020B0602020104020603" pitchFamily="34" charset="0"/>
+              <a:rPr lang="en-US" sz="2400" dirty="0">
+                <a:latin typeface="Segoe UI Light" panose="020B0502040204020203" pitchFamily="34" charset="0"/>
+                <a:cs typeface="Segoe UI Light" panose="020B0502040204020203" pitchFamily="34" charset="0"/>
               </a:rPr>
-              <a:t>The Solution</a:t>
+              <a:t>Compare all 6 directional ‘shoves’ to baseline. </a:t>
             </a:r>
+          </a:p>
+          <a:p>
+            <a:pPr marL="609600" indent="-457200">
+              <a:lnSpc>
+                <a:spcPct val="150000"/>
+              </a:lnSpc>
+              <a:buFont typeface="Arial" panose="020B0604020202020204" pitchFamily="34" charset="0"/>
+              <a:buChar char="•"/>
+            </a:pPr>
+            <a:r>
+              <a:rPr lang="en-US" sz="2400" dirty="0">
+                <a:latin typeface="Segoe UI Light" panose="020B0502040204020203" pitchFamily="34" charset="0"/>
+                <a:cs typeface="Segoe UI Light" panose="020B0502040204020203" pitchFamily="34" charset="0"/>
+              </a:rPr>
+              <a:t>If water moves, the material is known to allow high diffusion.</a:t>
+            </a:r>
+          </a:p>
+          <a:p>
+            <a:pPr marL="609600" indent="-457200">
+              <a:lnSpc>
+                <a:spcPct val="150000"/>
+              </a:lnSpc>
+              <a:buFont typeface="Arial" panose="020B0604020202020204" pitchFamily="34" charset="0"/>
+              <a:buChar char="•"/>
+            </a:pPr>
+            <a:r>
+              <a:rPr lang="en-US" sz="2400" dirty="0">
+                <a:latin typeface="Segoe UI Light" panose="020B0502040204020203" pitchFamily="34" charset="0"/>
+                <a:cs typeface="Segoe UI Light" panose="020B0502040204020203" pitchFamily="34" charset="0"/>
+              </a:rPr>
+              <a:t>If water can’t move, the material is known cause low diffusion.</a:t>
+            </a:r>
+          </a:p>
+          <a:p>
+            <a:pPr marL="152400" indent="0">
+              <a:lnSpc>
+                <a:spcPct val="150000"/>
+              </a:lnSpc>
+            </a:pPr>
+            <a:r>
+              <a:rPr lang="en-US" sz="2400" dirty="0">
+                <a:latin typeface="Segoe UI Light" panose="020B0502040204020203" pitchFamily="34" charset="0"/>
+                <a:cs typeface="Segoe UI Light" panose="020B0502040204020203" pitchFamily="34" charset="0"/>
+              </a:rPr>
+              <a:t>Based on how water diffuses in an area, physicians can quickly identify what tissue types are present.</a:t>
+            </a:r>
+          </a:p>
+          <a:p>
+            <a:pPr marL="152400" indent="0">
+              <a:lnSpc>
+                <a:spcPct val="150000"/>
+              </a:lnSpc>
+            </a:pPr>
+            <a:endParaRPr lang="en-US" sz="2400" dirty="0">
+              <a:latin typeface="Segoe UI Light" panose="020B0502040204020203" pitchFamily="34" charset="0"/>
+              <a:cs typeface="Segoe UI Light" panose="020B0502040204020203" pitchFamily="34" charset="0"/>
+            </a:endParaRPr>
+          </a:p>
+          <a:p>
+            <a:pPr marL="609600" indent="-457200">
+              <a:lnSpc>
+                <a:spcPct val="150000"/>
+              </a:lnSpc>
+              <a:buFont typeface="Arial" panose="020B0604020202020204" pitchFamily="34" charset="0"/>
+              <a:buChar char="•"/>
+            </a:pPr>
+            <a:endParaRPr lang="en-US" sz="2400" dirty="0">
+              <a:latin typeface="Segoe UI Light" panose="020B0502040204020203" pitchFamily="34" charset="0"/>
+              <a:cs typeface="Segoe UI Light" panose="020B0502040204020203" pitchFamily="34" charset="0"/>
+            </a:endParaRPr>
+          </a:p>
+          <a:p>
+            <a:pPr marL="609600" indent="-457200">
+              <a:lnSpc>
+                <a:spcPct val="150000"/>
+              </a:lnSpc>
+              <a:buFont typeface="Arial" panose="020B0604020202020204" pitchFamily="34" charset="0"/>
+              <a:buChar char="•"/>
+            </a:pPr>
+            <a:endParaRPr lang="en-US" sz="2400" dirty="0">
+              <a:latin typeface="Segoe UI Light" panose="020B0502040204020203" pitchFamily="34" charset="0"/>
+              <a:cs typeface="Segoe UI Light" panose="020B0502040204020203" pitchFamily="34" charset="0"/>
+            </a:endParaRPr>
+          </a:p>
+          <a:p>
+            <a:pPr marL="609600" indent="-457200">
+              <a:lnSpc>
+                <a:spcPct val="150000"/>
+              </a:lnSpc>
+              <a:buFont typeface="Arial" panose="020B0604020202020204" pitchFamily="34" charset="0"/>
+              <a:buChar char="•"/>
+            </a:pPr>
+            <a:endParaRPr lang="en-US" sz="2400" dirty="0">
+              <a:latin typeface="Segoe UI Light" panose="020B0502040204020203" pitchFamily="34" charset="0"/>
+              <a:cs typeface="Segoe UI Light" panose="020B0502040204020203" pitchFamily="34" charset="0"/>
+            </a:endParaRPr>
+          </a:p>
+        </p:txBody>
+      </p:sp>
+      <p:pic>
+        <p:nvPicPr>
+          <p:cNvPr id="9" name="Picture 8">
+            <a:extLst>
+              <a:ext uri="{FF2B5EF4-FFF2-40B4-BE49-F238E27FC236}">
+                <a16:creationId xmlns:a16="http://schemas.microsoft.com/office/drawing/2014/main" id="{154ABF7C-E459-BEEB-AEC5-67B57DC46580}"/>
+              </a:ext>
+            </a:extLst>
+          </p:cNvPr>
+          <p:cNvPicPr>
+            <a:picLocks noChangeAspect="1"/>
+          </p:cNvPicPr>
+          <p:nvPr/>
+        </p:nvPicPr>
+        <p:blipFill>
+          <a:blip r:embed="rId3"/>
+          <a:stretch>
+            <a:fillRect/>
+          </a:stretch>
+        </p:blipFill>
+        <p:spPr>
+          <a:xfrm>
+            <a:off x="6559826" y="340051"/>
+            <a:ext cx="5282720" cy="2493873"/>
+          </a:xfrm>
+          <a:prstGeom prst="rect">
+            <a:avLst/>
+          </a:prstGeom>
+          <a:solidFill>
+            <a:srgbClr val="FFFFFF">
+              <a:shade val="85000"/>
+            </a:srgbClr>
+          </a:solidFill>
+          <a:ln w="88900" cap="sq">
+            <a:solidFill>
+              <a:schemeClr val="bg1">
+                <a:lumMod val="50000"/>
+              </a:schemeClr>
+            </a:solidFill>
+            <a:miter lim="800000"/>
+          </a:ln>
+          <a:effectLst>
+            <a:outerShdw blurRad="55000" dist="18000" dir="5400000" algn="tl" rotWithShape="0">
+              <a:srgbClr val="000000">
+                <a:alpha val="40000"/>
+              </a:srgbClr>
+            </a:outerShdw>
+          </a:effectLst>
+          <a:scene3d>
+            <a:camera prst="orthographicFront"/>
+            <a:lightRig rig="twoPt" dir="t">
+              <a:rot lat="0" lon="0" rev="7200000"/>
+            </a:lightRig>
+          </a:scene3d>
+          <a:sp3d>
+            <a:bevelT w="25400" h="19050"/>
+            <a:contourClr>
+              <a:srgbClr val="FFFFFF"/>
+            </a:contourClr>
+          </a:sp3d>
+        </p:spPr>
+      </p:pic>
+      <p:pic>
+        <p:nvPicPr>
+          <p:cNvPr id="12" name="Picture 11">
+            <a:extLst>
+              <a:ext uri="{FF2B5EF4-FFF2-40B4-BE49-F238E27FC236}">
+                <a16:creationId xmlns:a16="http://schemas.microsoft.com/office/drawing/2014/main" id="{37517F39-5120-BA84-35AC-86E1CA1CFEC5}"/>
+              </a:ext>
+            </a:extLst>
+          </p:cNvPr>
+          <p:cNvPicPr>
+            <a:picLocks noChangeAspect="1"/>
+          </p:cNvPicPr>
+          <p:nvPr/>
+        </p:nvPicPr>
+        <p:blipFill>
+          <a:blip r:embed="rId4"/>
+          <a:srcRect l="2048" r="8220"/>
+          <a:stretch>
+            <a:fillRect/>
+          </a:stretch>
+        </p:blipFill>
+        <p:spPr>
+          <a:xfrm>
+            <a:off x="6559826" y="2833924"/>
+            <a:ext cx="5282720" cy="2959679"/>
+          </a:xfrm>
+          <a:prstGeom prst="rect">
+            <a:avLst/>
+          </a:prstGeom>
+          <a:solidFill>
+            <a:srgbClr val="FFFFFF">
+              <a:shade val="85000"/>
+            </a:srgbClr>
+          </a:solidFill>
+          <a:ln w="88900" cap="sq">
+            <a:solidFill>
+              <a:schemeClr val="bg1">
+                <a:lumMod val="50000"/>
+              </a:schemeClr>
+            </a:solidFill>
+            <a:miter lim="800000"/>
+          </a:ln>
+          <a:effectLst>
+            <a:outerShdw blurRad="55000" dist="18000" dir="5400000" algn="tl" rotWithShape="0">
+              <a:srgbClr val="000000">
+                <a:alpha val="40000"/>
+              </a:srgbClr>
+            </a:outerShdw>
+          </a:effectLst>
+          <a:scene3d>
+            <a:camera prst="orthographicFront"/>
+            <a:lightRig rig="twoPt" dir="t">
+              <a:rot lat="0" lon="0" rev="7200000"/>
+            </a:lightRig>
+          </a:scene3d>
+          <a:sp3d>
+            <a:bevelT w="25400" h="19050"/>
+            <a:contourClr>
+              <a:srgbClr val="FFFFFF"/>
+            </a:contourClr>
+          </a:sp3d>
+        </p:spPr>
+      </p:pic>
+      <p:sp>
+        <p:nvSpPr>
+          <p:cNvPr id="13" name="TextBox 12">
+            <a:extLst>
+              <a:ext uri="{FF2B5EF4-FFF2-40B4-BE49-F238E27FC236}">
+                <a16:creationId xmlns:a16="http://schemas.microsoft.com/office/drawing/2014/main" id="{03BBDF48-22C0-AF0C-F349-F4C8EADCE4A2}"/>
+              </a:ext>
+            </a:extLst>
+          </p:cNvPr>
+          <p:cNvSpPr txBox="1"/>
+          <p:nvPr/>
+        </p:nvSpPr>
+        <p:spPr>
+          <a:xfrm>
+            <a:off x="6559826" y="2520891"/>
+            <a:ext cx="314510" cy="307777"/>
+          </a:xfrm>
+          <a:prstGeom prst="rect">
+            <a:avLst/>
+          </a:prstGeom>
+          <a:noFill/>
+        </p:spPr>
+        <p:txBody>
+          <a:bodyPr wrap="none" rtlCol="0">
+            <a:spAutoFit/>
+          </a:bodyPr>
+          <a:lstStyle/>
+          <a:p>
+            <a:r>
+              <a:rPr lang="en-US" b="1" dirty="0"/>
+              <a:t>A</a:t>
+            </a:r>
+          </a:p>
+        </p:txBody>
+      </p:sp>
+      <p:sp>
+        <p:nvSpPr>
+          <p:cNvPr id="14" name="TextBox 13">
+            <a:extLst>
+              <a:ext uri="{FF2B5EF4-FFF2-40B4-BE49-F238E27FC236}">
+                <a16:creationId xmlns:a16="http://schemas.microsoft.com/office/drawing/2014/main" id="{91412515-F9E5-01FB-D9FA-B053A26803BA}"/>
+              </a:ext>
+            </a:extLst>
+          </p:cNvPr>
+          <p:cNvSpPr txBox="1"/>
+          <p:nvPr/>
+        </p:nvSpPr>
+        <p:spPr>
+          <a:xfrm>
+            <a:off x="6559826" y="5485826"/>
+            <a:ext cx="314510" cy="307777"/>
+          </a:xfrm>
+          <a:prstGeom prst="rect">
+            <a:avLst/>
+          </a:prstGeom>
+          <a:noFill/>
+        </p:spPr>
+        <p:txBody>
+          <a:bodyPr wrap="none" rtlCol="0">
+            <a:spAutoFit/>
+          </a:bodyPr>
+          <a:lstStyle/>
+          <a:p>
+            <a:r>
+              <a:rPr lang="en-US" b="1" dirty="0"/>
+              <a:t>B</a:t>
+            </a:r>
+          </a:p>
+        </p:txBody>
+      </p:sp>
+      <p:sp>
+        <p:nvSpPr>
+          <p:cNvPr id="15" name="TextBox 14">
+            <a:extLst>
+              <a:ext uri="{FF2B5EF4-FFF2-40B4-BE49-F238E27FC236}">
+                <a16:creationId xmlns:a16="http://schemas.microsoft.com/office/drawing/2014/main" id="{0CCF820E-FCBC-AAAE-E184-CC68CCAF6B5F}"/>
+              </a:ext>
+            </a:extLst>
+          </p:cNvPr>
+          <p:cNvSpPr txBox="1"/>
+          <p:nvPr/>
+        </p:nvSpPr>
+        <p:spPr>
+          <a:xfrm>
+            <a:off x="6559826" y="5793603"/>
+            <a:ext cx="5632174" cy="1015663"/>
+          </a:xfrm>
+          <a:prstGeom prst="rect">
+            <a:avLst/>
+          </a:prstGeom>
+          <a:noFill/>
+        </p:spPr>
+        <p:txBody>
+          <a:bodyPr wrap="square" rtlCol="0">
+            <a:spAutoFit/>
+          </a:bodyPr>
+          <a:lstStyle/>
+          <a:p>
+            <a:r>
+              <a:rPr lang="en-US" sz="1200" dirty="0">
+                <a:solidFill>
+                  <a:schemeClr val="accent6"/>
+                </a:solidFill>
+              </a:rPr>
+              <a:t>A. Comparison of weighted-signal (left) and baseline (right) measurements (McMahon et al., 2011)</a:t>
+            </a:r>
+          </a:p>
+          <a:p>
+            <a:endParaRPr lang="en-US" sz="1200" dirty="0">
+              <a:solidFill>
+                <a:schemeClr val="accent6"/>
+              </a:solidFill>
+            </a:endParaRPr>
+          </a:p>
+          <a:p>
+            <a:r>
+              <a:rPr lang="en-US" sz="1200" dirty="0">
+                <a:solidFill>
+                  <a:schemeClr val="accent6"/>
+                </a:solidFill>
+              </a:rPr>
+              <a:t>B. Diagram of low-diffusivity and high-diffusivity materials (Abdulla, 2019).</a:t>
+            </a:r>
+          </a:p>
+          <a:p>
+            <a:endParaRPr lang="en-US" sz="1200" dirty="0">
+              <a:solidFill>
+                <a:schemeClr val="accent6"/>
+              </a:solidFill>
+            </a:endParaRPr>
           </a:p>
         </p:txBody>
       </p:sp>
@@ -19027,6 +19836,280 @@
   <p:clrMapOvr>
     <a:masterClrMapping/>
   </p:clrMapOvr>
+  <p:timing>
+    <p:tnLst>
+      <p:par>
+        <p:cTn id="1" dur="indefinite" restart="never" nodeType="tmRoot">
+          <p:childTnLst>
+            <p:seq concurrent="1" nextAc="seek">
+              <p:cTn id="2" dur="indefinite" nodeType="mainSeq">
+                <p:childTnLst>
+                  <p:par>
+                    <p:cTn id="3" fill="hold">
+                      <p:stCondLst>
+                        <p:cond delay="indefinite"/>
+                      </p:stCondLst>
+                      <p:childTnLst>
+                        <p:par>
+                          <p:cTn id="4" fill="hold">
+                            <p:stCondLst>
+                              <p:cond delay="0"/>
+                            </p:stCondLst>
+                            <p:childTnLst>
+                              <p:par>
+                                <p:cTn id="5" presetID="10" presetClass="entr" presetSubtype="0" fill="hold" nodeType="clickEffect">
+                                  <p:stCondLst>
+                                    <p:cond delay="0"/>
+                                  </p:stCondLst>
+                                  <p:childTnLst>
+                                    <p:set>
+                                      <p:cBhvr>
+                                        <p:cTn id="6" dur="1" fill="hold">
+                                          <p:stCondLst>
+                                            <p:cond delay="0"/>
+                                          </p:stCondLst>
+                                        </p:cTn>
+                                        <p:tgtEl>
+                                          <p:spTgt spid="5">
+                                            <p:txEl>
+                                              <p:pRg st="0" end="0"/>
+                                            </p:txEl>
+                                          </p:spTgt>
+                                        </p:tgtEl>
+                                        <p:attrNameLst>
+                                          <p:attrName>style.visibility</p:attrName>
+                                        </p:attrNameLst>
+                                      </p:cBhvr>
+                                      <p:to>
+                                        <p:strVal val="visible"/>
+                                      </p:to>
+                                    </p:set>
+                                    <p:animEffect transition="in" filter="fade">
+                                      <p:cBhvr>
+                                        <p:cTn id="7" dur="500"/>
+                                        <p:tgtEl>
+                                          <p:spTgt spid="5">
+                                            <p:txEl>
+                                              <p:pRg st="0" end="0"/>
+                                            </p:txEl>
+                                          </p:spTgt>
+                                        </p:tgtEl>
+                                      </p:cBhvr>
+                                    </p:animEffect>
+                                  </p:childTnLst>
+                                </p:cTn>
+                              </p:par>
+                            </p:childTnLst>
+                          </p:cTn>
+                        </p:par>
+                      </p:childTnLst>
+                    </p:cTn>
+                  </p:par>
+                  <p:par>
+                    <p:cTn id="8" fill="hold">
+                      <p:stCondLst>
+                        <p:cond delay="indefinite"/>
+                      </p:stCondLst>
+                      <p:childTnLst>
+                        <p:par>
+                          <p:cTn id="9" fill="hold">
+                            <p:stCondLst>
+                              <p:cond delay="0"/>
+                            </p:stCondLst>
+                            <p:childTnLst>
+                              <p:par>
+                                <p:cTn id="10" presetID="10" presetClass="entr" presetSubtype="0" fill="hold" nodeType="clickEffect">
+                                  <p:stCondLst>
+                                    <p:cond delay="0"/>
+                                  </p:stCondLst>
+                                  <p:childTnLst>
+                                    <p:set>
+                                      <p:cBhvr>
+                                        <p:cTn id="11" dur="1" fill="hold">
+                                          <p:stCondLst>
+                                            <p:cond delay="0"/>
+                                          </p:stCondLst>
+                                        </p:cTn>
+                                        <p:tgtEl>
+                                          <p:spTgt spid="5">
+                                            <p:txEl>
+                                              <p:pRg st="1" end="1"/>
+                                            </p:txEl>
+                                          </p:spTgt>
+                                        </p:tgtEl>
+                                        <p:attrNameLst>
+                                          <p:attrName>style.visibility</p:attrName>
+                                        </p:attrNameLst>
+                                      </p:cBhvr>
+                                      <p:to>
+                                        <p:strVal val="visible"/>
+                                      </p:to>
+                                    </p:set>
+                                    <p:animEffect transition="in" filter="fade">
+                                      <p:cBhvr>
+                                        <p:cTn id="12" dur="500"/>
+                                        <p:tgtEl>
+                                          <p:spTgt spid="5">
+                                            <p:txEl>
+                                              <p:pRg st="1" end="1"/>
+                                            </p:txEl>
+                                          </p:spTgt>
+                                        </p:tgtEl>
+                                      </p:cBhvr>
+                                    </p:animEffect>
+                                  </p:childTnLst>
+                                </p:cTn>
+                              </p:par>
+                            </p:childTnLst>
+                          </p:cTn>
+                        </p:par>
+                      </p:childTnLst>
+                    </p:cTn>
+                  </p:par>
+                  <p:par>
+                    <p:cTn id="13" fill="hold">
+                      <p:stCondLst>
+                        <p:cond delay="indefinite"/>
+                      </p:stCondLst>
+                      <p:childTnLst>
+                        <p:par>
+                          <p:cTn id="14" fill="hold">
+                            <p:stCondLst>
+                              <p:cond delay="0"/>
+                            </p:stCondLst>
+                            <p:childTnLst>
+                              <p:par>
+                                <p:cTn id="15" presetID="10" presetClass="entr" presetSubtype="0" fill="hold" nodeType="clickEffect">
+                                  <p:stCondLst>
+                                    <p:cond delay="0"/>
+                                  </p:stCondLst>
+                                  <p:childTnLst>
+                                    <p:set>
+                                      <p:cBhvr>
+                                        <p:cTn id="16" dur="1" fill="hold">
+                                          <p:stCondLst>
+                                            <p:cond delay="0"/>
+                                          </p:stCondLst>
+                                        </p:cTn>
+                                        <p:tgtEl>
+                                          <p:spTgt spid="5">
+                                            <p:txEl>
+                                              <p:pRg st="2" end="2"/>
+                                            </p:txEl>
+                                          </p:spTgt>
+                                        </p:tgtEl>
+                                        <p:attrNameLst>
+                                          <p:attrName>style.visibility</p:attrName>
+                                        </p:attrNameLst>
+                                      </p:cBhvr>
+                                      <p:to>
+                                        <p:strVal val="visible"/>
+                                      </p:to>
+                                    </p:set>
+                                    <p:animEffect transition="in" filter="fade">
+                                      <p:cBhvr>
+                                        <p:cTn id="17" dur="500"/>
+                                        <p:tgtEl>
+                                          <p:spTgt spid="5">
+                                            <p:txEl>
+                                              <p:pRg st="2" end="2"/>
+                                            </p:txEl>
+                                          </p:spTgt>
+                                        </p:tgtEl>
+                                      </p:cBhvr>
+                                    </p:animEffect>
+                                  </p:childTnLst>
+                                </p:cTn>
+                              </p:par>
+                            </p:childTnLst>
+                          </p:cTn>
+                        </p:par>
+                      </p:childTnLst>
+                    </p:cTn>
+                  </p:par>
+                  <p:par>
+                    <p:cTn id="18" fill="hold">
+                      <p:stCondLst>
+                        <p:cond delay="indefinite"/>
+                      </p:stCondLst>
+                      <p:childTnLst>
+                        <p:par>
+                          <p:cTn id="19" fill="hold">
+                            <p:stCondLst>
+                              <p:cond delay="0"/>
+                            </p:stCondLst>
+                            <p:childTnLst>
+                              <p:par>
+                                <p:cTn id="20" presetID="10" presetClass="entr" presetSubtype="0" fill="hold" nodeType="clickEffect">
+                                  <p:stCondLst>
+                                    <p:cond delay="0"/>
+                                  </p:stCondLst>
+                                  <p:childTnLst>
+                                    <p:set>
+                                      <p:cBhvr>
+                                        <p:cTn id="21" dur="1" fill="hold">
+                                          <p:stCondLst>
+                                            <p:cond delay="0"/>
+                                          </p:stCondLst>
+                                        </p:cTn>
+                                        <p:tgtEl>
+                                          <p:spTgt spid="5">
+                                            <p:txEl>
+                                              <p:pRg st="3" end="3"/>
+                                            </p:txEl>
+                                          </p:spTgt>
+                                        </p:tgtEl>
+                                        <p:attrNameLst>
+                                          <p:attrName>style.visibility</p:attrName>
+                                        </p:attrNameLst>
+                                      </p:cBhvr>
+                                      <p:to>
+                                        <p:strVal val="visible"/>
+                                      </p:to>
+                                    </p:set>
+                                    <p:animEffect transition="in" filter="fade">
+                                      <p:cBhvr>
+                                        <p:cTn id="22" dur="500"/>
+                                        <p:tgtEl>
+                                          <p:spTgt spid="5">
+                                            <p:txEl>
+                                              <p:pRg st="3" end="3"/>
+                                            </p:txEl>
+                                          </p:spTgt>
+                                        </p:tgtEl>
+                                      </p:cBhvr>
+                                    </p:animEffect>
+                                  </p:childTnLst>
+                                </p:cTn>
+                              </p:par>
+                            </p:childTnLst>
+                          </p:cTn>
+                        </p:par>
+                      </p:childTnLst>
+                    </p:cTn>
+                  </p:par>
+                </p:childTnLst>
+              </p:cTn>
+              <p:prevCondLst>
+                <p:cond evt="onPrev" delay="0">
+                  <p:tgtEl>
+                    <p:sldTgt/>
+                  </p:tgtEl>
+                </p:cond>
+              </p:prevCondLst>
+              <p:nextCondLst>
+                <p:cond evt="onNext" delay="0">
+                  <p:tgtEl>
+                    <p:sldTgt/>
+                  </p:tgtEl>
+                </p:cond>
+              </p:nextCondLst>
+            </p:seq>
+          </p:childTnLst>
+        </p:cTn>
+      </p:par>
+    </p:tnLst>
+  </p:timing>
 </p:sld>
 </file>
 
@@ -19066,7 +20149,7 @@
         <p:spPr>
           <a:xfrm>
             <a:off x="625702" y="483712"/>
-            <a:ext cx="4555897" cy="1010791"/>
+            <a:ext cx="6262778" cy="1010791"/>
           </a:xfrm>
         </p:spPr>
         <p:txBody>
@@ -19074,16 +20157,482 @@
           <a:lstStyle/>
           <a:p>
             <a:r>
-              <a:rPr lang="en-US" sz="4000">
+              <a:rPr lang="en-US" sz="4000" dirty="0">
                 <a:latin typeface="Tw Cen MT Bold" panose="020B0802020104020603" pitchFamily="34" charset="0"/>
               </a:rPr>
-              <a:t>PART II: </a:t>
+              <a:t>Different </a:t>
             </a:r>
             <a:r>
-              <a:rPr lang="en-US" sz="4000" i="1">
-                <a:latin typeface="Tw Cen MT" panose="020B0602020104020603" pitchFamily="34" charset="0"/>
+              <a:rPr lang="en-US" sz="4000" dirty="0" err="1">
+                <a:latin typeface="Tw Cen MT Bold" panose="020B0802020104020603" pitchFamily="34" charset="0"/>
               </a:rPr>
-              <a:t>The Problem</a:t>
+              <a:t>Visualisations</a:t>
+            </a:r>
+            <a:endParaRPr lang="en-US" sz="4000" i="1" dirty="0">
+              <a:latin typeface="Tw Cen MT" panose="020B0602020104020603" pitchFamily="34" charset="0"/>
+            </a:endParaRPr>
+          </a:p>
+        </p:txBody>
+      </p:sp>
+      <p:pic>
+        <p:nvPicPr>
+          <p:cNvPr id="3" name="Picture 2">
+            <a:extLst>
+              <a:ext uri="{FF2B5EF4-FFF2-40B4-BE49-F238E27FC236}">
+                <a16:creationId xmlns:a16="http://schemas.microsoft.com/office/drawing/2014/main" id="{B72D3FBE-681E-13C2-F6B2-B5512EB1EA20}"/>
+              </a:ext>
+            </a:extLst>
+          </p:cNvPr>
+          <p:cNvPicPr>
+            <a:picLocks noChangeAspect="1"/>
+          </p:cNvPicPr>
+          <p:nvPr/>
+        </p:nvPicPr>
+        <p:blipFill>
+          <a:blip r:embed="rId3"/>
+          <a:stretch>
+            <a:fillRect/>
+          </a:stretch>
+        </p:blipFill>
+        <p:spPr>
+          <a:xfrm>
+            <a:off x="780551" y="1494503"/>
+            <a:ext cx="3523010" cy="4089648"/>
+          </a:xfrm>
+          <a:prstGeom prst="rect">
+            <a:avLst/>
+          </a:prstGeom>
+          <a:solidFill>
+            <a:srgbClr val="FFFFFF">
+              <a:shade val="85000"/>
+            </a:srgbClr>
+          </a:solidFill>
+          <a:ln w="88900" cap="sq">
+            <a:solidFill>
+              <a:srgbClr val="FFFFFF"/>
+            </a:solidFill>
+            <a:miter lim="800000"/>
+          </a:ln>
+          <a:effectLst>
+            <a:outerShdw blurRad="55000" dist="18000" dir="5400000" algn="tl" rotWithShape="0">
+              <a:srgbClr val="000000">
+                <a:alpha val="40000"/>
+              </a:srgbClr>
+            </a:outerShdw>
+          </a:effectLst>
+          <a:scene3d>
+            <a:camera prst="orthographicFront"/>
+            <a:lightRig rig="twoPt" dir="t">
+              <a:rot lat="0" lon="0" rev="7200000"/>
+            </a:lightRig>
+          </a:scene3d>
+          <a:sp3d>
+            <a:bevelT w="25400" h="19050"/>
+            <a:contourClr>
+              <a:srgbClr val="FFFFFF"/>
+            </a:contourClr>
+          </a:sp3d>
+        </p:spPr>
+      </p:pic>
+      <p:pic>
+        <p:nvPicPr>
+          <p:cNvPr id="4" name="Picture 3">
+            <a:extLst>
+              <a:ext uri="{FF2B5EF4-FFF2-40B4-BE49-F238E27FC236}">
+                <a16:creationId xmlns:a16="http://schemas.microsoft.com/office/drawing/2014/main" id="{D96CC71A-4602-5468-E86C-43683D02762F}"/>
+              </a:ext>
+            </a:extLst>
+          </p:cNvPr>
+          <p:cNvPicPr>
+            <a:picLocks noChangeAspect="1"/>
+          </p:cNvPicPr>
+          <p:nvPr/>
+        </p:nvPicPr>
+        <p:blipFill>
+          <a:blip r:embed="rId4"/>
+          <a:stretch>
+            <a:fillRect/>
+          </a:stretch>
+        </p:blipFill>
+        <p:spPr>
+          <a:xfrm>
+            <a:off x="4389089" y="1494503"/>
+            <a:ext cx="3481070" cy="4089648"/>
+          </a:xfrm>
+          <a:prstGeom prst="rect">
+            <a:avLst/>
+          </a:prstGeom>
+          <a:solidFill>
+            <a:srgbClr val="FFFFFF">
+              <a:shade val="85000"/>
+            </a:srgbClr>
+          </a:solidFill>
+          <a:ln w="88900" cap="sq">
+            <a:solidFill>
+              <a:srgbClr val="FFFFFF"/>
+            </a:solidFill>
+            <a:miter lim="800000"/>
+          </a:ln>
+          <a:effectLst>
+            <a:outerShdw blurRad="55000" dist="18000" dir="5400000" algn="tl" rotWithShape="0">
+              <a:srgbClr val="000000">
+                <a:alpha val="40000"/>
+              </a:srgbClr>
+            </a:outerShdw>
+          </a:effectLst>
+          <a:scene3d>
+            <a:camera prst="orthographicFront"/>
+            <a:lightRig rig="twoPt" dir="t">
+              <a:rot lat="0" lon="0" rev="7200000"/>
+            </a:lightRig>
+          </a:scene3d>
+          <a:sp3d>
+            <a:bevelT w="25400" h="19050"/>
+            <a:contourClr>
+              <a:srgbClr val="FFFFFF"/>
+            </a:contourClr>
+          </a:sp3d>
+        </p:spPr>
+      </p:pic>
+      <p:pic>
+        <p:nvPicPr>
+          <p:cNvPr id="5" name="Picture 4">
+            <a:extLst>
+              <a:ext uri="{FF2B5EF4-FFF2-40B4-BE49-F238E27FC236}">
+                <a16:creationId xmlns:a16="http://schemas.microsoft.com/office/drawing/2014/main" id="{98D094E9-E6C8-5EE1-8AFA-A848D83A4957}"/>
+              </a:ext>
+            </a:extLst>
+          </p:cNvPr>
+          <p:cNvPicPr>
+            <a:picLocks noChangeAspect="1"/>
+          </p:cNvPicPr>
+          <p:nvPr/>
+        </p:nvPicPr>
+        <p:blipFill>
+          <a:blip r:embed="rId5"/>
+          <a:srcRect/>
+          <a:stretch>
+            <a:fillRect/>
+          </a:stretch>
+        </p:blipFill>
+        <p:spPr>
+          <a:xfrm>
+            <a:off x="7955687" y="1494503"/>
+            <a:ext cx="3523010" cy="4089648"/>
+          </a:xfrm>
+          <a:prstGeom prst="rect">
+            <a:avLst/>
+          </a:prstGeom>
+          <a:solidFill>
+            <a:srgbClr val="FFFFFF">
+              <a:shade val="85000"/>
+            </a:srgbClr>
+          </a:solidFill>
+          <a:ln w="88900" cap="sq">
+            <a:solidFill>
+              <a:srgbClr val="FFFFFF"/>
+            </a:solidFill>
+            <a:miter lim="800000"/>
+          </a:ln>
+          <a:effectLst>
+            <a:outerShdw blurRad="55000" dist="18000" dir="5400000" algn="tl" rotWithShape="0">
+              <a:srgbClr val="000000">
+                <a:alpha val="40000"/>
+              </a:srgbClr>
+            </a:outerShdw>
+          </a:effectLst>
+          <a:scene3d>
+            <a:camera prst="orthographicFront"/>
+            <a:lightRig rig="twoPt" dir="t">
+              <a:rot lat="0" lon="0" rev="7200000"/>
+            </a:lightRig>
+          </a:scene3d>
+          <a:sp3d>
+            <a:bevelT w="25400" h="19050"/>
+            <a:contourClr>
+              <a:srgbClr val="FFFFFF"/>
+            </a:contourClr>
+          </a:sp3d>
+        </p:spPr>
+      </p:pic>
+      <p:sp>
+        <p:nvSpPr>
+          <p:cNvPr id="8" name="TextBox 7">
+            <a:extLst>
+              <a:ext uri="{FF2B5EF4-FFF2-40B4-BE49-F238E27FC236}">
+                <a16:creationId xmlns:a16="http://schemas.microsoft.com/office/drawing/2014/main" id="{61CAD33C-19B1-5177-26BA-24B31261141B}"/>
+              </a:ext>
+            </a:extLst>
+          </p:cNvPr>
+          <p:cNvSpPr txBox="1"/>
+          <p:nvPr/>
+        </p:nvSpPr>
+        <p:spPr>
+          <a:xfrm>
+            <a:off x="918971" y="1579168"/>
+            <a:ext cx="314510" cy="307777"/>
+          </a:xfrm>
+          <a:prstGeom prst="rect">
+            <a:avLst/>
+          </a:prstGeom>
+          <a:noFill/>
+        </p:spPr>
+        <p:txBody>
+          <a:bodyPr wrap="square" rtlCol="0">
+            <a:spAutoFit/>
+          </a:bodyPr>
+          <a:lstStyle/>
+          <a:p>
+            <a:r>
+              <a:rPr lang="en-US" b="1" dirty="0">
+                <a:solidFill>
+                  <a:schemeClr val="accent6"/>
+                </a:solidFill>
+              </a:rPr>
+              <a:t>A</a:t>
+            </a:r>
+          </a:p>
+        </p:txBody>
+      </p:sp>
+      <p:sp>
+        <p:nvSpPr>
+          <p:cNvPr id="9" name="TextBox 8">
+            <a:extLst>
+              <a:ext uri="{FF2B5EF4-FFF2-40B4-BE49-F238E27FC236}">
+                <a16:creationId xmlns:a16="http://schemas.microsoft.com/office/drawing/2014/main" id="{1E3C3FAD-57AA-935F-AA57-5536DF6DDFA1}"/>
+              </a:ext>
+            </a:extLst>
+          </p:cNvPr>
+          <p:cNvSpPr txBox="1"/>
+          <p:nvPr/>
+        </p:nvSpPr>
+        <p:spPr>
+          <a:xfrm>
+            <a:off x="4561972" y="1588069"/>
+            <a:ext cx="314510" cy="307777"/>
+          </a:xfrm>
+          <a:prstGeom prst="rect">
+            <a:avLst/>
+          </a:prstGeom>
+          <a:noFill/>
+        </p:spPr>
+        <p:txBody>
+          <a:bodyPr wrap="square" rtlCol="0">
+            <a:spAutoFit/>
+          </a:bodyPr>
+          <a:lstStyle/>
+          <a:p>
+            <a:r>
+              <a:rPr lang="en-US" b="1" dirty="0">
+                <a:solidFill>
+                  <a:schemeClr val="accent6"/>
+                </a:solidFill>
+              </a:rPr>
+              <a:t>B</a:t>
+            </a:r>
+          </a:p>
+        </p:txBody>
+      </p:sp>
+      <p:sp>
+        <p:nvSpPr>
+          <p:cNvPr id="10" name="TextBox 9">
+            <a:extLst>
+              <a:ext uri="{FF2B5EF4-FFF2-40B4-BE49-F238E27FC236}">
+                <a16:creationId xmlns:a16="http://schemas.microsoft.com/office/drawing/2014/main" id="{C4CF2359-73B6-D5D7-26B2-442CDA0AE27D}"/>
+              </a:ext>
+            </a:extLst>
+          </p:cNvPr>
+          <p:cNvSpPr txBox="1"/>
+          <p:nvPr/>
+        </p:nvSpPr>
+        <p:spPr>
+          <a:xfrm>
+            <a:off x="8059378" y="1605001"/>
+            <a:ext cx="314510" cy="307777"/>
+          </a:xfrm>
+          <a:prstGeom prst="rect">
+            <a:avLst/>
+          </a:prstGeom>
+          <a:noFill/>
+        </p:spPr>
+        <p:txBody>
+          <a:bodyPr wrap="square" rtlCol="0">
+            <a:spAutoFit/>
+          </a:bodyPr>
+          <a:lstStyle/>
+          <a:p>
+            <a:r>
+              <a:rPr lang="en-US" b="1" dirty="0">
+                <a:solidFill>
+                  <a:schemeClr val="accent6"/>
+                </a:solidFill>
+              </a:rPr>
+              <a:t>C</a:t>
+            </a:r>
+          </a:p>
+        </p:txBody>
+      </p:sp>
+      <p:sp>
+        <p:nvSpPr>
+          <p:cNvPr id="11" name="TextBox 10">
+            <a:extLst>
+              <a:ext uri="{FF2B5EF4-FFF2-40B4-BE49-F238E27FC236}">
+                <a16:creationId xmlns:a16="http://schemas.microsoft.com/office/drawing/2014/main" id="{57B9E4CF-9347-D313-51B3-56FA78E2530B}"/>
+              </a:ext>
+            </a:extLst>
+          </p:cNvPr>
+          <p:cNvSpPr txBox="1"/>
+          <p:nvPr/>
+        </p:nvSpPr>
+        <p:spPr>
+          <a:xfrm>
+            <a:off x="742028" y="5744418"/>
+            <a:ext cx="3677859" cy="461665"/>
+          </a:xfrm>
+          <a:prstGeom prst="rect">
+            <a:avLst/>
+          </a:prstGeom>
+          <a:noFill/>
+        </p:spPr>
+        <p:txBody>
+          <a:bodyPr wrap="square" rtlCol="0">
+            <a:spAutoFit/>
+          </a:bodyPr>
+          <a:lstStyle/>
+          <a:p>
+            <a:r>
+              <a:rPr lang="en-US" sz="1200" dirty="0">
+                <a:solidFill>
+                  <a:schemeClr val="accent6"/>
+                </a:solidFill>
+              </a:rPr>
+              <a:t>A. Mean diffusion map retrieved by </a:t>
+            </a:r>
+            <a:r>
+              <a:rPr lang="en-US" sz="1200" dirty="0" err="1">
+                <a:solidFill>
+                  <a:schemeClr val="accent6"/>
+                </a:solidFill>
+              </a:rPr>
+              <a:t>visualising</a:t>
+            </a:r>
+            <a:r>
+              <a:rPr lang="en-US" sz="1200" dirty="0">
+                <a:solidFill>
+                  <a:schemeClr val="accent6"/>
+                </a:solidFill>
+              </a:rPr>
+              <a:t> average diffusion (Schwartzman, 2019).</a:t>
+            </a:r>
+          </a:p>
+        </p:txBody>
+      </p:sp>
+      <p:sp>
+        <p:nvSpPr>
+          <p:cNvPr id="12" name="TextBox 11">
+            <a:extLst>
+              <a:ext uri="{FF2B5EF4-FFF2-40B4-BE49-F238E27FC236}">
+                <a16:creationId xmlns:a16="http://schemas.microsoft.com/office/drawing/2014/main" id="{54145DBC-E516-3A84-9110-1B77C4A02375}"/>
+              </a:ext>
+            </a:extLst>
+          </p:cNvPr>
+          <p:cNvSpPr txBox="1"/>
+          <p:nvPr/>
+        </p:nvSpPr>
+        <p:spPr>
+          <a:xfrm>
+            <a:off x="4333459" y="5744419"/>
+            <a:ext cx="3677859" cy="461665"/>
+          </a:xfrm>
+          <a:prstGeom prst="rect">
+            <a:avLst/>
+          </a:prstGeom>
+          <a:noFill/>
+        </p:spPr>
+        <p:txBody>
+          <a:bodyPr wrap="square" rtlCol="0">
+            <a:spAutoFit/>
+          </a:bodyPr>
+          <a:lstStyle/>
+          <a:p>
+            <a:r>
+              <a:rPr lang="en-US" sz="1200" dirty="0">
+                <a:solidFill>
+                  <a:schemeClr val="accent6"/>
+                </a:solidFill>
+              </a:rPr>
+              <a:t>B. Fractional anisotropy retrieved by visualizing primary diffusion direction (Schwartzman, 2019).</a:t>
+            </a:r>
+          </a:p>
+        </p:txBody>
+      </p:sp>
+      <p:sp>
+        <p:nvSpPr>
+          <p:cNvPr id="13" name="TextBox 12">
+            <a:extLst>
+              <a:ext uri="{FF2B5EF4-FFF2-40B4-BE49-F238E27FC236}">
+                <a16:creationId xmlns:a16="http://schemas.microsoft.com/office/drawing/2014/main" id="{00EBCCED-DDEF-91C4-8F22-2FB0BA2D5871}"/>
+              </a:ext>
+            </a:extLst>
+          </p:cNvPr>
+          <p:cNvSpPr txBox="1"/>
+          <p:nvPr/>
+        </p:nvSpPr>
+        <p:spPr>
+          <a:xfrm>
+            <a:off x="7955687" y="5694649"/>
+            <a:ext cx="3677859" cy="646331"/>
+          </a:xfrm>
+          <a:prstGeom prst="rect">
+            <a:avLst/>
+          </a:prstGeom>
+          <a:noFill/>
+        </p:spPr>
+        <p:txBody>
+          <a:bodyPr wrap="square" rtlCol="0">
+            <a:spAutoFit/>
+          </a:bodyPr>
+          <a:lstStyle/>
+          <a:p>
+            <a:r>
+              <a:rPr lang="en-US" sz="1200" dirty="0">
+                <a:solidFill>
+                  <a:schemeClr val="accent6"/>
+                </a:solidFill>
+              </a:rPr>
+              <a:t>C. </a:t>
+            </a:r>
+            <a:r>
+              <a:rPr lang="en-AU" sz="1200" dirty="0">
+                <a:solidFill>
+                  <a:schemeClr val="accent6"/>
+                </a:solidFill>
+              </a:rPr>
+              <a:t>Principal diffusion direction </a:t>
+            </a:r>
+            <a:r>
+              <a:rPr lang="en-US" sz="1200" dirty="0">
+                <a:solidFill>
+                  <a:schemeClr val="accent6"/>
+                </a:solidFill>
+              </a:rPr>
+              <a:t>retrieved by assigning </a:t>
+            </a:r>
+            <a:r>
+              <a:rPr lang="en-US" sz="1200" dirty="0" err="1">
+                <a:solidFill>
+                  <a:schemeClr val="accent6"/>
+                </a:solidFill>
+              </a:rPr>
+              <a:t>colours</a:t>
+            </a:r>
+            <a:r>
+              <a:rPr lang="en-US" sz="1200" dirty="0">
+                <a:solidFill>
+                  <a:schemeClr val="accent6"/>
+                </a:solidFill>
+              </a:rPr>
+              <a:t> (red, green, blue) to direction of diffusion (Schwartzman, 2019).</a:t>
             </a:r>
           </a:p>
         </p:txBody>
@@ -19136,7 +20685,7 @@
         </p:nvSpPr>
         <p:spPr>
           <a:xfrm>
-            <a:off x="448718" y="483712"/>
+            <a:off x="411395" y="297100"/>
             <a:ext cx="4555897" cy="1010791"/>
           </a:xfrm>
         </p:spPr>
@@ -19144,21 +20693,506 @@
           <a:bodyPr/>
           <a:lstStyle/>
           <a:p>
+            <a:pPr algn="l"/>
             <a:r>
-              <a:rPr lang="en-US" sz="4000">
+              <a:rPr lang="en-US" sz="4000" dirty="0">
                 <a:latin typeface="Tw Cen MT Bold" panose="020B0802020104020603" pitchFamily="34" charset="0"/>
               </a:rPr>
-              <a:t>PART II: </a:t>
+              <a:t>Error Correction</a:t>
             </a:r>
-            <a:r>
-              <a:rPr lang="en-US" sz="4000" b="0" i="1">
-                <a:latin typeface="Tw Cen MT" panose="020B0602020104020603" pitchFamily="34" charset="0"/>
+            <a:br>
+              <a:rPr lang="en-US" sz="4000" dirty="0">
+                <a:latin typeface="Tw Cen MT Bold" panose="020B0802020104020603" pitchFamily="34" charset="0"/>
               </a:rPr>
-              <a:t>The Solution</a:t>
-            </a:r>
+            </a:br>
+            <a:br>
+              <a:rPr lang="en-US" sz="4000" dirty="0">
+                <a:latin typeface="Tw Cen MT Bold" panose="020B0802020104020603" pitchFamily="34" charset="0"/>
+              </a:rPr>
+            </a:br>
+            <a:endParaRPr lang="en-US" sz="4000" b="0" i="1" dirty="0">
+              <a:latin typeface="Tw Cen MT" panose="020B0602020104020603" pitchFamily="34" charset="0"/>
+            </a:endParaRPr>
           </a:p>
         </p:txBody>
       </p:sp>
+      <p:pic>
+        <p:nvPicPr>
+          <p:cNvPr id="4" name="Picture 3" descr="A close-up of a mri&#10;&#10;AI-generated content may be incorrect.">
+            <a:extLst>
+              <a:ext uri="{FF2B5EF4-FFF2-40B4-BE49-F238E27FC236}">
+                <a16:creationId xmlns:a16="http://schemas.microsoft.com/office/drawing/2014/main" id="{DBB13A78-2D9F-2DD8-80CC-F2FAB844B7DE}"/>
+              </a:ext>
+            </a:extLst>
+          </p:cNvPr>
+          <p:cNvPicPr>
+            <a:picLocks noChangeAspect="1"/>
+          </p:cNvPicPr>
+          <p:nvPr/>
+        </p:nvPicPr>
+        <p:blipFill>
+          <a:blip r:embed="rId3">
+            <a:extLst>
+              <a:ext uri="{28A0092B-C50C-407E-A947-70E740481C1C}">
+                <a14:useLocalDpi xmlns:a14="http://schemas.microsoft.com/office/drawing/2010/main" val="0"/>
+              </a:ext>
+            </a:extLst>
+          </a:blip>
+          <a:stretch>
+            <a:fillRect/>
+          </a:stretch>
+        </p:blipFill>
+        <p:spPr>
+          <a:xfrm>
+            <a:off x="5862405" y="539750"/>
+            <a:ext cx="5918200" cy="5778500"/>
+          </a:xfrm>
+          <a:prstGeom prst="rect">
+            <a:avLst/>
+          </a:prstGeom>
+        </p:spPr>
+      </p:pic>
+      <p:sp>
+        <p:nvSpPr>
+          <p:cNvPr id="7" name="Subtitle 4">
+            <a:extLst>
+              <a:ext uri="{FF2B5EF4-FFF2-40B4-BE49-F238E27FC236}">
+                <a16:creationId xmlns:a16="http://schemas.microsoft.com/office/drawing/2014/main" id="{F02760FA-599D-9688-361E-1F035D8DD462}"/>
+              </a:ext>
+            </a:extLst>
+          </p:cNvPr>
+          <p:cNvSpPr txBox="1">
+            <a:spLocks/>
+          </p:cNvSpPr>
+          <p:nvPr/>
+        </p:nvSpPr>
+        <p:spPr>
+          <a:xfrm>
+            <a:off x="144032" y="1028187"/>
+            <a:ext cx="5718373" cy="5102569"/>
+          </a:xfrm>
+          <a:prstGeom prst="rect">
+            <a:avLst/>
+          </a:prstGeom>
+          <a:noFill/>
+          <a:ln>
+            <a:noFill/>
+          </a:ln>
+        </p:spPr>
+        <p:txBody>
+          <a:bodyPr spcFirstLastPara="1" wrap="square" lIns="91425" tIns="91425" rIns="91425" bIns="91425" anchor="t" anchorCtr="0">
+            <a:noAutofit/>
+          </a:bodyPr>
+          <a:lstStyle>
+            <a:defPPr marR="0" lvl="0" algn="l" rtl="0">
+              <a:lnSpc>
+                <a:spcPct val="100000"/>
+              </a:lnSpc>
+              <a:spcBef>
+                <a:spcPts val="0"/>
+              </a:spcBef>
+              <a:spcAft>
+                <a:spcPts val="0"/>
+              </a:spcAft>
+            </a:defPPr>
+            <a:lvl1pPr marL="457200" marR="0" lvl="0" indent="-304800" algn="l" rtl="0" eaLnBrk="1" hangingPunct="1">
+              <a:lnSpc>
+                <a:spcPct val="100000"/>
+              </a:lnSpc>
+              <a:spcBef>
+                <a:spcPts val="0"/>
+              </a:spcBef>
+              <a:spcAft>
+                <a:spcPts val="0"/>
+              </a:spcAft>
+              <a:buClr>
+                <a:schemeClr val="dk1"/>
+              </a:buClr>
+              <a:buSzPts val="1200"/>
+              <a:buFont typeface="Albert Sans"/>
+              <a:buNone/>
+              <a:defRPr sz="1200" b="0" i="0" u="none" strike="noStrike" cap="none">
+                <a:solidFill>
+                  <a:schemeClr val="dk1"/>
+                </a:solidFill>
+                <a:latin typeface="Albert Sans"/>
+                <a:ea typeface="Albert Sans"/>
+                <a:cs typeface="Albert Sans"/>
+                <a:sym typeface="Albert Sans"/>
+              </a:defRPr>
+            </a:lvl1pPr>
+            <a:lvl2pPr marL="914400" marR="0" lvl="1" indent="-304800" algn="ctr" rtl="0" eaLnBrk="1" hangingPunct="1">
+              <a:lnSpc>
+                <a:spcPct val="100000"/>
+              </a:lnSpc>
+              <a:spcBef>
+                <a:spcPts val="0"/>
+              </a:spcBef>
+              <a:spcAft>
+                <a:spcPts val="0"/>
+              </a:spcAft>
+              <a:buClr>
+                <a:schemeClr val="dk1"/>
+              </a:buClr>
+              <a:buSzPts val="1200"/>
+              <a:buFont typeface="Albert Sans"/>
+              <a:buNone/>
+              <a:defRPr sz="1200" b="0" i="0" u="none" strike="noStrike" cap="none">
+                <a:solidFill>
+                  <a:schemeClr val="dk1"/>
+                </a:solidFill>
+                <a:latin typeface="Albert Sans"/>
+                <a:ea typeface="Albert Sans"/>
+                <a:cs typeface="Albert Sans"/>
+                <a:sym typeface="Albert Sans"/>
+              </a:defRPr>
+            </a:lvl2pPr>
+            <a:lvl3pPr marL="1371600" marR="0" lvl="2" indent="-304800" algn="ctr" rtl="0" eaLnBrk="1" hangingPunct="1">
+              <a:lnSpc>
+                <a:spcPct val="100000"/>
+              </a:lnSpc>
+              <a:spcBef>
+                <a:spcPts val="0"/>
+              </a:spcBef>
+              <a:spcAft>
+                <a:spcPts val="0"/>
+              </a:spcAft>
+              <a:buClr>
+                <a:schemeClr val="dk1"/>
+              </a:buClr>
+              <a:buSzPts val="1200"/>
+              <a:buFont typeface="Albert Sans"/>
+              <a:buNone/>
+              <a:defRPr sz="1200" b="0" i="0" u="none" strike="noStrike" cap="none">
+                <a:solidFill>
+                  <a:schemeClr val="dk1"/>
+                </a:solidFill>
+                <a:latin typeface="Albert Sans"/>
+                <a:ea typeface="Albert Sans"/>
+                <a:cs typeface="Albert Sans"/>
+                <a:sym typeface="Albert Sans"/>
+              </a:defRPr>
+            </a:lvl3pPr>
+            <a:lvl4pPr marL="1828800" marR="0" lvl="3" indent="-304800" algn="ctr" rtl="0" eaLnBrk="1" hangingPunct="1">
+              <a:lnSpc>
+                <a:spcPct val="100000"/>
+              </a:lnSpc>
+              <a:spcBef>
+                <a:spcPts val="0"/>
+              </a:spcBef>
+              <a:spcAft>
+                <a:spcPts val="0"/>
+              </a:spcAft>
+              <a:buClr>
+                <a:schemeClr val="dk1"/>
+              </a:buClr>
+              <a:buSzPts val="1200"/>
+              <a:buFont typeface="Albert Sans"/>
+              <a:buNone/>
+              <a:defRPr sz="1200" b="0" i="0" u="none" strike="noStrike" cap="none">
+                <a:solidFill>
+                  <a:schemeClr val="dk1"/>
+                </a:solidFill>
+                <a:latin typeface="Albert Sans"/>
+                <a:ea typeface="Albert Sans"/>
+                <a:cs typeface="Albert Sans"/>
+                <a:sym typeface="Albert Sans"/>
+              </a:defRPr>
+            </a:lvl4pPr>
+            <a:lvl5pPr marL="2286000" marR="0" lvl="4" indent="-304800" algn="ctr" rtl="0" eaLnBrk="1" hangingPunct="1">
+              <a:lnSpc>
+                <a:spcPct val="100000"/>
+              </a:lnSpc>
+              <a:spcBef>
+                <a:spcPts val="0"/>
+              </a:spcBef>
+              <a:spcAft>
+                <a:spcPts val="0"/>
+              </a:spcAft>
+              <a:buClr>
+                <a:schemeClr val="dk1"/>
+              </a:buClr>
+              <a:buSzPts val="1200"/>
+              <a:buFont typeface="Albert Sans"/>
+              <a:buNone/>
+              <a:defRPr sz="1200" b="0" i="0" u="none" strike="noStrike" cap="none">
+                <a:solidFill>
+                  <a:schemeClr val="dk1"/>
+                </a:solidFill>
+                <a:latin typeface="Albert Sans"/>
+                <a:ea typeface="Albert Sans"/>
+                <a:cs typeface="Albert Sans"/>
+                <a:sym typeface="Albert Sans"/>
+              </a:defRPr>
+            </a:lvl5pPr>
+            <a:lvl6pPr marL="2743200" marR="0" lvl="5" indent="-304800" algn="ctr" rtl="0" eaLnBrk="1" hangingPunct="1">
+              <a:lnSpc>
+                <a:spcPct val="100000"/>
+              </a:lnSpc>
+              <a:spcBef>
+                <a:spcPts val="0"/>
+              </a:spcBef>
+              <a:spcAft>
+                <a:spcPts val="0"/>
+              </a:spcAft>
+              <a:buClr>
+                <a:schemeClr val="dk1"/>
+              </a:buClr>
+              <a:buSzPts val="1200"/>
+              <a:buFont typeface="Albert Sans"/>
+              <a:buNone/>
+              <a:defRPr sz="1200" b="0" i="0" u="none" strike="noStrike" cap="none">
+                <a:solidFill>
+                  <a:schemeClr val="dk1"/>
+                </a:solidFill>
+                <a:latin typeface="Albert Sans"/>
+                <a:ea typeface="Albert Sans"/>
+                <a:cs typeface="Albert Sans"/>
+                <a:sym typeface="Albert Sans"/>
+              </a:defRPr>
+            </a:lvl6pPr>
+            <a:lvl7pPr marL="3200400" marR="0" lvl="6" indent="-304800" algn="ctr" rtl="0" eaLnBrk="1" hangingPunct="1">
+              <a:lnSpc>
+                <a:spcPct val="100000"/>
+              </a:lnSpc>
+              <a:spcBef>
+                <a:spcPts val="0"/>
+              </a:spcBef>
+              <a:spcAft>
+                <a:spcPts val="0"/>
+              </a:spcAft>
+              <a:buClr>
+                <a:schemeClr val="dk1"/>
+              </a:buClr>
+              <a:buSzPts val="1200"/>
+              <a:buFont typeface="Albert Sans"/>
+              <a:buNone/>
+              <a:defRPr sz="1200" b="0" i="0" u="none" strike="noStrike" cap="none">
+                <a:solidFill>
+                  <a:schemeClr val="dk1"/>
+                </a:solidFill>
+                <a:latin typeface="Albert Sans"/>
+                <a:ea typeface="Albert Sans"/>
+                <a:cs typeface="Albert Sans"/>
+                <a:sym typeface="Albert Sans"/>
+              </a:defRPr>
+            </a:lvl7pPr>
+            <a:lvl8pPr marL="3657600" marR="0" lvl="7" indent="-304800" algn="ctr" rtl="0" eaLnBrk="1" hangingPunct="1">
+              <a:lnSpc>
+                <a:spcPct val="100000"/>
+              </a:lnSpc>
+              <a:spcBef>
+                <a:spcPts val="0"/>
+              </a:spcBef>
+              <a:spcAft>
+                <a:spcPts val="0"/>
+              </a:spcAft>
+              <a:buClr>
+                <a:schemeClr val="dk1"/>
+              </a:buClr>
+              <a:buSzPts val="1200"/>
+              <a:buFont typeface="Albert Sans"/>
+              <a:buNone/>
+              <a:defRPr sz="1200" b="0" i="0" u="none" strike="noStrike" cap="none">
+                <a:solidFill>
+                  <a:schemeClr val="dk1"/>
+                </a:solidFill>
+                <a:latin typeface="Albert Sans"/>
+                <a:ea typeface="Albert Sans"/>
+                <a:cs typeface="Albert Sans"/>
+                <a:sym typeface="Albert Sans"/>
+              </a:defRPr>
+            </a:lvl8pPr>
+            <a:lvl9pPr marL="4114800" marR="0" lvl="8" indent="-304800" algn="ctr" rtl="0" eaLnBrk="1" hangingPunct="1">
+              <a:lnSpc>
+                <a:spcPct val="100000"/>
+              </a:lnSpc>
+              <a:spcBef>
+                <a:spcPts val="0"/>
+              </a:spcBef>
+              <a:spcAft>
+                <a:spcPts val="0"/>
+              </a:spcAft>
+              <a:buClr>
+                <a:schemeClr val="dk1"/>
+              </a:buClr>
+              <a:buSzPts val="1200"/>
+              <a:buFont typeface="Albert Sans"/>
+              <a:buNone/>
+              <a:defRPr sz="1200" b="0" i="0" u="none" strike="noStrike" cap="none">
+                <a:solidFill>
+                  <a:schemeClr val="dk1"/>
+                </a:solidFill>
+                <a:latin typeface="Albert Sans"/>
+                <a:ea typeface="Albert Sans"/>
+                <a:cs typeface="Albert Sans"/>
+                <a:sym typeface="Albert Sans"/>
+              </a:defRPr>
+            </a:lvl9pPr>
+          </a:lstStyle>
+          <a:p>
+            <a:pPr marL="152400" indent="0">
+              <a:lnSpc>
+                <a:spcPct val="150000"/>
+              </a:lnSpc>
+            </a:pPr>
+            <a:r>
+              <a:rPr lang="en-US" sz="2400" dirty="0">
+                <a:latin typeface="Segoe UI Light" panose="020B0502040204020203" pitchFamily="34" charset="0"/>
+                <a:cs typeface="Segoe UI Light" panose="020B0502040204020203" pitchFamily="34" charset="0"/>
+              </a:rPr>
+              <a:t>Diffusion can also inform us of noise in the dataset.</a:t>
+            </a:r>
+          </a:p>
+          <a:p>
+            <a:pPr marL="609600" indent="-457200">
+              <a:lnSpc>
+                <a:spcPct val="150000"/>
+              </a:lnSpc>
+              <a:buFont typeface="Arial" panose="020B0604020202020204" pitchFamily="34" charset="0"/>
+              <a:buChar char="•"/>
+            </a:pPr>
+            <a:r>
+              <a:rPr lang="en-US" sz="2400" dirty="0">
+                <a:latin typeface="Segoe UI Light" panose="020B0502040204020203" pitchFamily="34" charset="0"/>
+                <a:cs typeface="Segoe UI Light" panose="020B0502040204020203" pitchFamily="34" charset="0"/>
+              </a:rPr>
+              <a:t>Water diffusion occurring outside the scan area from noise or </a:t>
+            </a:r>
+            <a:r>
+              <a:rPr lang="en-US" sz="2400" dirty="0" err="1">
+                <a:latin typeface="Segoe UI Light" panose="020B0502040204020203" pitchFamily="34" charset="0"/>
+                <a:cs typeface="Segoe UI Light" panose="020B0502040204020203" pitchFamily="34" charset="0"/>
+              </a:rPr>
+              <a:t>artifacting</a:t>
+            </a:r>
+            <a:r>
+              <a:rPr lang="en-US" sz="2400" dirty="0">
+                <a:latin typeface="Segoe UI Light" panose="020B0502040204020203" pitchFamily="34" charset="0"/>
+                <a:cs typeface="Segoe UI Light" panose="020B0502040204020203" pitchFamily="34" charset="0"/>
+              </a:rPr>
+              <a:t>.</a:t>
+            </a:r>
+          </a:p>
+          <a:p>
+            <a:pPr marL="609600" indent="-457200">
+              <a:lnSpc>
+                <a:spcPct val="150000"/>
+              </a:lnSpc>
+              <a:buFont typeface="Arial" panose="020B0604020202020204" pitchFamily="34" charset="0"/>
+              <a:buChar char="•"/>
+            </a:pPr>
+            <a:r>
+              <a:rPr lang="en-US" sz="2400" dirty="0">
+                <a:latin typeface="Segoe UI Light" panose="020B0502040204020203" pitchFamily="34" charset="0"/>
+                <a:cs typeface="Segoe UI Light" panose="020B0502040204020203" pitchFamily="34" charset="0"/>
+              </a:rPr>
+              <a:t>Negative diffusion of water is impossible.</a:t>
+            </a:r>
+          </a:p>
+          <a:p>
+            <a:pPr marL="152400" indent="0">
+              <a:lnSpc>
+                <a:spcPct val="150000"/>
+              </a:lnSpc>
+            </a:pPr>
+            <a:r>
+              <a:rPr lang="en-US" sz="2400" dirty="0">
+                <a:latin typeface="Segoe UI Light" panose="020B0502040204020203" pitchFamily="34" charset="0"/>
+                <a:cs typeface="Segoe UI Light" panose="020B0502040204020203" pitchFamily="34" charset="0"/>
+              </a:rPr>
+              <a:t>Using this knowledge, we can safely discard incorrect data before generating the image.</a:t>
+            </a:r>
+          </a:p>
+          <a:p>
+            <a:pPr marL="609600" indent="-457200">
+              <a:lnSpc>
+                <a:spcPct val="150000"/>
+              </a:lnSpc>
+              <a:buFont typeface="Arial" panose="020B0604020202020204" pitchFamily="34" charset="0"/>
+              <a:buChar char="•"/>
+            </a:pPr>
+            <a:endParaRPr lang="en-US" sz="2400" dirty="0">
+              <a:latin typeface="Segoe UI Light" panose="020B0502040204020203" pitchFamily="34" charset="0"/>
+              <a:cs typeface="Segoe UI Light" panose="020B0502040204020203" pitchFamily="34" charset="0"/>
+            </a:endParaRPr>
+          </a:p>
+        </p:txBody>
+      </p:sp>
+      <p:sp>
+        <p:nvSpPr>
+          <p:cNvPr id="12" name="TextBox 11">
+            <a:extLst>
+              <a:ext uri="{FF2B5EF4-FFF2-40B4-BE49-F238E27FC236}">
+                <a16:creationId xmlns:a16="http://schemas.microsoft.com/office/drawing/2014/main" id="{F9433694-E9AE-DAF4-545E-BDCEA12584C2}"/>
+              </a:ext>
+            </a:extLst>
+          </p:cNvPr>
+          <p:cNvSpPr txBox="1"/>
+          <p:nvPr/>
+        </p:nvSpPr>
+        <p:spPr>
+          <a:xfrm>
+            <a:off x="5862405" y="6211669"/>
+            <a:ext cx="5746509" cy="646331"/>
+          </a:xfrm>
+          <a:prstGeom prst="rect">
+            <a:avLst/>
+          </a:prstGeom>
+          <a:noFill/>
+        </p:spPr>
+        <p:txBody>
+          <a:bodyPr wrap="square" rtlCol="0">
+            <a:spAutoFit/>
+          </a:bodyPr>
+          <a:lstStyle/>
+          <a:p>
+            <a:r>
+              <a:rPr lang="en-AU" sz="1200" dirty="0">
+                <a:solidFill>
+                  <a:schemeClr val="accent6"/>
+                </a:solidFill>
+              </a:rPr>
+              <a:t>Constructive interference of MRI signals causing improper diffusivity measurements, which may result in negative values (Oncology Medical Physics, n.d.).</a:t>
+            </a:r>
+            <a:endParaRPr lang="en-US" sz="1200" dirty="0">
+              <a:solidFill>
+                <a:schemeClr val="accent6"/>
+              </a:solidFill>
+            </a:endParaRPr>
+          </a:p>
+        </p:txBody>
+      </p:sp>
+      <p:pic>
+        <p:nvPicPr>
+          <p:cNvPr id="14" name="Picture 13">
+            <a:extLst>
+              <a:ext uri="{FF2B5EF4-FFF2-40B4-BE49-F238E27FC236}">
+                <a16:creationId xmlns:a16="http://schemas.microsoft.com/office/drawing/2014/main" id="{17D6C066-1D83-B5FD-A61B-8C23CAC71183}"/>
+              </a:ext>
+            </a:extLst>
+          </p:cNvPr>
+          <p:cNvPicPr>
+            <a:picLocks noChangeAspect="1"/>
+          </p:cNvPicPr>
+          <p:nvPr/>
+        </p:nvPicPr>
+        <p:blipFill>
+          <a:blip r:embed="rId4"/>
+          <a:stretch>
+            <a:fillRect/>
+          </a:stretch>
+        </p:blipFill>
+        <p:spPr>
+          <a:xfrm>
+            <a:off x="6010725" y="674367"/>
+            <a:ext cx="5612257" cy="5498594"/>
+          </a:xfrm>
+          <a:prstGeom prst="rect">
+            <a:avLst/>
+          </a:prstGeom>
+        </p:spPr>
+      </p:pic>
     </p:spTree>
     <p:extLst>
       <p:ext uri="{BB962C8B-B14F-4D97-AF65-F5344CB8AC3E}">
@@ -19169,6 +21203,280 @@
   <p:clrMapOvr>
     <a:masterClrMapping/>
   </p:clrMapOvr>
+  <p:timing>
+    <p:tnLst>
+      <p:par>
+        <p:cTn id="1" dur="indefinite" restart="never" nodeType="tmRoot">
+          <p:childTnLst>
+            <p:seq concurrent="1" nextAc="seek">
+              <p:cTn id="2" dur="indefinite" nodeType="mainSeq">
+                <p:childTnLst>
+                  <p:par>
+                    <p:cTn id="3" fill="hold">
+                      <p:stCondLst>
+                        <p:cond delay="indefinite"/>
+                      </p:stCondLst>
+                      <p:childTnLst>
+                        <p:par>
+                          <p:cTn id="4" fill="hold">
+                            <p:stCondLst>
+                              <p:cond delay="0"/>
+                            </p:stCondLst>
+                            <p:childTnLst>
+                              <p:par>
+                                <p:cTn id="5" presetID="10" presetClass="entr" presetSubtype="0" fill="hold" nodeType="clickEffect">
+                                  <p:stCondLst>
+                                    <p:cond delay="0"/>
+                                  </p:stCondLst>
+                                  <p:childTnLst>
+                                    <p:set>
+                                      <p:cBhvr>
+                                        <p:cTn id="6" dur="1" fill="hold">
+                                          <p:stCondLst>
+                                            <p:cond delay="0"/>
+                                          </p:stCondLst>
+                                        </p:cTn>
+                                        <p:tgtEl>
+                                          <p:spTgt spid="7">
+                                            <p:txEl>
+                                              <p:pRg st="0" end="0"/>
+                                            </p:txEl>
+                                          </p:spTgt>
+                                        </p:tgtEl>
+                                        <p:attrNameLst>
+                                          <p:attrName>style.visibility</p:attrName>
+                                        </p:attrNameLst>
+                                      </p:cBhvr>
+                                      <p:to>
+                                        <p:strVal val="visible"/>
+                                      </p:to>
+                                    </p:set>
+                                    <p:animEffect transition="in" filter="fade">
+                                      <p:cBhvr>
+                                        <p:cTn id="7" dur="500"/>
+                                        <p:tgtEl>
+                                          <p:spTgt spid="7">
+                                            <p:txEl>
+                                              <p:pRg st="0" end="0"/>
+                                            </p:txEl>
+                                          </p:spTgt>
+                                        </p:tgtEl>
+                                      </p:cBhvr>
+                                    </p:animEffect>
+                                  </p:childTnLst>
+                                </p:cTn>
+                              </p:par>
+                            </p:childTnLst>
+                          </p:cTn>
+                        </p:par>
+                      </p:childTnLst>
+                    </p:cTn>
+                  </p:par>
+                  <p:par>
+                    <p:cTn id="8" fill="hold">
+                      <p:stCondLst>
+                        <p:cond delay="indefinite"/>
+                      </p:stCondLst>
+                      <p:childTnLst>
+                        <p:par>
+                          <p:cTn id="9" fill="hold">
+                            <p:stCondLst>
+                              <p:cond delay="0"/>
+                            </p:stCondLst>
+                            <p:childTnLst>
+                              <p:par>
+                                <p:cTn id="10" presetID="10" presetClass="entr" presetSubtype="0" fill="hold" nodeType="clickEffect">
+                                  <p:stCondLst>
+                                    <p:cond delay="0"/>
+                                  </p:stCondLst>
+                                  <p:childTnLst>
+                                    <p:set>
+                                      <p:cBhvr>
+                                        <p:cTn id="11" dur="1" fill="hold">
+                                          <p:stCondLst>
+                                            <p:cond delay="0"/>
+                                          </p:stCondLst>
+                                        </p:cTn>
+                                        <p:tgtEl>
+                                          <p:spTgt spid="7">
+                                            <p:txEl>
+                                              <p:pRg st="1" end="1"/>
+                                            </p:txEl>
+                                          </p:spTgt>
+                                        </p:tgtEl>
+                                        <p:attrNameLst>
+                                          <p:attrName>style.visibility</p:attrName>
+                                        </p:attrNameLst>
+                                      </p:cBhvr>
+                                      <p:to>
+                                        <p:strVal val="visible"/>
+                                      </p:to>
+                                    </p:set>
+                                    <p:animEffect transition="in" filter="fade">
+                                      <p:cBhvr>
+                                        <p:cTn id="12" dur="500"/>
+                                        <p:tgtEl>
+                                          <p:spTgt spid="7">
+                                            <p:txEl>
+                                              <p:pRg st="1" end="1"/>
+                                            </p:txEl>
+                                          </p:spTgt>
+                                        </p:tgtEl>
+                                      </p:cBhvr>
+                                    </p:animEffect>
+                                  </p:childTnLst>
+                                </p:cTn>
+                              </p:par>
+                            </p:childTnLst>
+                          </p:cTn>
+                        </p:par>
+                      </p:childTnLst>
+                    </p:cTn>
+                  </p:par>
+                  <p:par>
+                    <p:cTn id="13" fill="hold">
+                      <p:stCondLst>
+                        <p:cond delay="indefinite"/>
+                      </p:stCondLst>
+                      <p:childTnLst>
+                        <p:par>
+                          <p:cTn id="14" fill="hold">
+                            <p:stCondLst>
+                              <p:cond delay="0"/>
+                            </p:stCondLst>
+                            <p:childTnLst>
+                              <p:par>
+                                <p:cTn id="15" presetID="10" presetClass="entr" presetSubtype="0" fill="hold" nodeType="clickEffect">
+                                  <p:stCondLst>
+                                    <p:cond delay="0"/>
+                                  </p:stCondLst>
+                                  <p:childTnLst>
+                                    <p:set>
+                                      <p:cBhvr>
+                                        <p:cTn id="16" dur="1" fill="hold">
+                                          <p:stCondLst>
+                                            <p:cond delay="0"/>
+                                          </p:stCondLst>
+                                        </p:cTn>
+                                        <p:tgtEl>
+                                          <p:spTgt spid="7">
+                                            <p:txEl>
+                                              <p:pRg st="2" end="2"/>
+                                            </p:txEl>
+                                          </p:spTgt>
+                                        </p:tgtEl>
+                                        <p:attrNameLst>
+                                          <p:attrName>style.visibility</p:attrName>
+                                        </p:attrNameLst>
+                                      </p:cBhvr>
+                                      <p:to>
+                                        <p:strVal val="visible"/>
+                                      </p:to>
+                                    </p:set>
+                                    <p:animEffect transition="in" filter="fade">
+                                      <p:cBhvr>
+                                        <p:cTn id="17" dur="500"/>
+                                        <p:tgtEl>
+                                          <p:spTgt spid="7">
+                                            <p:txEl>
+                                              <p:pRg st="2" end="2"/>
+                                            </p:txEl>
+                                          </p:spTgt>
+                                        </p:tgtEl>
+                                      </p:cBhvr>
+                                    </p:animEffect>
+                                  </p:childTnLst>
+                                </p:cTn>
+                              </p:par>
+                            </p:childTnLst>
+                          </p:cTn>
+                        </p:par>
+                      </p:childTnLst>
+                    </p:cTn>
+                  </p:par>
+                  <p:par>
+                    <p:cTn id="18" fill="hold">
+                      <p:stCondLst>
+                        <p:cond delay="indefinite"/>
+                      </p:stCondLst>
+                      <p:childTnLst>
+                        <p:par>
+                          <p:cTn id="19" fill="hold">
+                            <p:stCondLst>
+                              <p:cond delay="0"/>
+                            </p:stCondLst>
+                            <p:childTnLst>
+                              <p:par>
+                                <p:cTn id="20" presetID="10" presetClass="entr" presetSubtype="0" fill="hold" nodeType="clickEffect">
+                                  <p:stCondLst>
+                                    <p:cond delay="0"/>
+                                  </p:stCondLst>
+                                  <p:childTnLst>
+                                    <p:set>
+                                      <p:cBhvr>
+                                        <p:cTn id="21" dur="1" fill="hold">
+                                          <p:stCondLst>
+                                            <p:cond delay="0"/>
+                                          </p:stCondLst>
+                                        </p:cTn>
+                                        <p:tgtEl>
+                                          <p:spTgt spid="7">
+                                            <p:txEl>
+                                              <p:pRg st="3" end="3"/>
+                                            </p:txEl>
+                                          </p:spTgt>
+                                        </p:tgtEl>
+                                        <p:attrNameLst>
+                                          <p:attrName>style.visibility</p:attrName>
+                                        </p:attrNameLst>
+                                      </p:cBhvr>
+                                      <p:to>
+                                        <p:strVal val="visible"/>
+                                      </p:to>
+                                    </p:set>
+                                    <p:animEffect transition="in" filter="fade">
+                                      <p:cBhvr>
+                                        <p:cTn id="22" dur="500"/>
+                                        <p:tgtEl>
+                                          <p:spTgt spid="7">
+                                            <p:txEl>
+                                              <p:pRg st="3" end="3"/>
+                                            </p:txEl>
+                                          </p:spTgt>
+                                        </p:tgtEl>
+                                      </p:cBhvr>
+                                    </p:animEffect>
+                                  </p:childTnLst>
+                                </p:cTn>
+                              </p:par>
+                            </p:childTnLst>
+                          </p:cTn>
+                        </p:par>
+                      </p:childTnLst>
+                    </p:cTn>
+                  </p:par>
+                </p:childTnLst>
+              </p:cTn>
+              <p:prevCondLst>
+                <p:cond evt="onPrev" delay="0">
+                  <p:tgtEl>
+                    <p:sldTgt/>
+                  </p:tgtEl>
+                </p:cond>
+              </p:prevCondLst>
+              <p:nextCondLst>
+                <p:cond evt="onNext" delay="0">
+                  <p:tgtEl>
+                    <p:sldTgt/>
+                  </p:tgtEl>
+                </p:cond>
+              </p:nextCondLst>
+            </p:seq>
+          </p:childTnLst>
+        </p:cTn>
+      </p:par>
+    </p:tnLst>
+  </p:timing>
 </p:sld>
 </file>
 

</xml_diff>

<commit_message>
Finalised script for part II problem Added coresponding powerpoint slide
</commit_message>
<xml_diff>
--- a/Report/Presentation.pptx
+++ b/Report/Presentation.pptx
@@ -6,7 +6,7 @@
     <p:sldMasterId id="2147483696" r:id="rId2"/>
   </p:sldMasterIdLst>
   <p:notesMasterIdLst>
-    <p:notesMasterId r:id="rId10"/>
+    <p:notesMasterId r:id="rId11"/>
   </p:notesMasterIdLst>
   <p:sldIdLst>
     <p:sldId id="256" r:id="rId3"/>
@@ -16,6 +16,7 @@
     <p:sldId id="263" r:id="rId7"/>
     <p:sldId id="258" r:id="rId8"/>
     <p:sldId id="259" r:id="rId9"/>
+    <p:sldId id="266" r:id="rId10"/>
   </p:sldIdLst>
   <p:sldSz cx="12192000" cy="6858000"/>
   <p:notesSz cx="6858000" cy="9144000"/>
@@ -352,7 +353,7 @@
           <a:p>
             <a:fld id="{56630FE1-2033-45DF-940A-B39C033298BC}" type="datetimeFigureOut">
               <a:rPr lang="en-AU" smtClean="0"/>
-              <a:t>31/05/2025</a:t>
+              <a:t>1/6/2025</a:t>
             </a:fld>
             <a:endParaRPr lang="en-AU"/>
           </a:p>
@@ -1142,6 +1143,142 @@
     <p:extLst>
       <p:ext uri="{BB962C8B-B14F-4D97-AF65-F5344CB8AC3E}">
         <p14:creationId xmlns:p14="http://schemas.microsoft.com/office/powerpoint/2010/main" val="479452980"/>
+      </p:ext>
+    </p:extLst>
+  </p:cSld>
+  <p:clrMapOvr>
+    <a:masterClrMapping/>
+  </p:clrMapOvr>
+</p:notes>
+</file>
+
+<file path=ppt/notesSlides/notesSlide7.xml><?xml version="1.0" encoding="utf-8"?>
+<p:notes xmlns:a="http://schemas.openxmlformats.org/drawingml/2006/main" xmlns:r="http://schemas.openxmlformats.org/officeDocument/2006/relationships" xmlns:p="http://schemas.openxmlformats.org/presentationml/2006/main">
+  <p:cSld>
+    <p:spTree>
+      <p:nvGrpSpPr>
+        <p:cNvPr id="1" name="">
+          <a:extLst>
+            <a:ext uri="{FF2B5EF4-FFF2-40B4-BE49-F238E27FC236}">
+              <a16:creationId xmlns:a16="http://schemas.microsoft.com/office/drawing/2014/main" id="{506625A7-B2B8-4705-C5EF-4E934A65DB41}"/>
+            </a:ext>
+          </a:extLst>
+        </p:cNvPr>
+        <p:cNvGrpSpPr/>
+        <p:nvPr/>
+      </p:nvGrpSpPr>
+      <p:grpSpPr>
+        <a:xfrm>
+          <a:off x="0" y="0"/>
+          <a:ext cx="0" cy="0"/>
+          <a:chOff x="0" y="0"/>
+          <a:chExt cx="0" cy="0"/>
+        </a:xfrm>
+      </p:grpSpPr>
+      <p:sp>
+        <p:nvSpPr>
+          <p:cNvPr id="2" name="Slide Image Placeholder 1">
+            <a:extLst>
+              <a:ext uri="{FF2B5EF4-FFF2-40B4-BE49-F238E27FC236}">
+                <a16:creationId xmlns:a16="http://schemas.microsoft.com/office/drawing/2014/main" id="{27522C7C-9190-50E2-8B4A-007224DC0652}"/>
+              </a:ext>
+            </a:extLst>
+          </p:cNvPr>
+          <p:cNvSpPr>
+            <a:spLocks noGrp="1" noRot="1" noChangeAspect="1"/>
+          </p:cNvSpPr>
+          <p:nvPr>
+            <p:ph type="sldImg"/>
+          </p:nvPr>
+        </p:nvSpPr>
+        <p:spPr/>
+      </p:sp>
+      <p:sp>
+        <p:nvSpPr>
+          <p:cNvPr id="3" name="Notes Placeholder 2">
+            <a:extLst>
+              <a:ext uri="{FF2B5EF4-FFF2-40B4-BE49-F238E27FC236}">
+                <a16:creationId xmlns:a16="http://schemas.microsoft.com/office/drawing/2014/main" id="{A3728CE4-960D-30B8-2E6D-715D99799866}"/>
+              </a:ext>
+            </a:extLst>
+          </p:cNvPr>
+          <p:cNvSpPr>
+            <a:spLocks noGrp="1"/>
+          </p:cNvSpPr>
+          <p:nvPr>
+            <p:ph type="body" idx="1"/>
+          </p:nvPr>
+        </p:nvSpPr>
+        <p:spPr/>
+        <p:txBody>
+          <a:bodyPr/>
+          <a:lstStyle/>
+          <a:p>
+            <a:r>
+              <a:rPr lang="en-AU" sz="1200" kern="1200" dirty="0">
+                <a:solidFill>
+                  <a:schemeClr val="tx1"/>
+                </a:solidFill>
+                <a:effectLst/>
+                <a:latin typeface="+mn-lt"/>
+                <a:ea typeface="+mn-ea"/>
+                <a:cs typeface="+mn-cs"/>
+              </a:rPr>
+              <a:t>A significant use case for MRI is the identification of neurodegenerative diseases and/or tumours within the brain. MRI scans produce enormous amounts of data which can be extremely difficult to analyse manually. As such, a combination of mathematical and machine learning techniques are often employed in conjunction with one another to aid such analysis. As a group we used a mathematical technique common in this field to create a model that can detect moustaches within images of faces with a high degree of accuracy. This was done as a demonstrative proxy for the use of this technique in the identification of tumours and/or biomarkers of disease within MRI brain scans. In a real implementation, machine learning would most likely be used in conjunction with the mathematical technique, however since we are mainly focusing on the mathematics, our detector did not rely on any machine learning techniques. It should be noted that although our chosen proxy is two dimensional while MRI data is three dimensional, extending the maths to three dimensions is extremely simple.</a:t>
+            </a:r>
+          </a:p>
+          <a:p>
+            <a:r>
+              <a:rPr lang="en-AU" sz="1200" kern="1200">
+                <a:solidFill>
+                  <a:schemeClr val="tx1"/>
+                </a:solidFill>
+                <a:effectLst/>
+                <a:latin typeface="+mn-lt"/>
+                <a:ea typeface="+mn-ea"/>
+                <a:cs typeface="+mn-cs"/>
+              </a:rPr>
+              <a:t> </a:t>
+            </a:r>
+          </a:p>
+          <a:p>
+            <a:endParaRPr lang="en-AU" dirty="0"/>
+          </a:p>
+        </p:txBody>
+      </p:sp>
+      <p:sp>
+        <p:nvSpPr>
+          <p:cNvPr id="4" name="Slide Number Placeholder 3">
+            <a:extLst>
+              <a:ext uri="{FF2B5EF4-FFF2-40B4-BE49-F238E27FC236}">
+                <a16:creationId xmlns:a16="http://schemas.microsoft.com/office/drawing/2014/main" id="{BE6CEAB5-AEF7-F64B-60D4-4F90F72108EB}"/>
+              </a:ext>
+            </a:extLst>
+          </p:cNvPr>
+          <p:cNvSpPr>
+            <a:spLocks noGrp="1"/>
+          </p:cNvSpPr>
+          <p:nvPr>
+            <p:ph type="sldNum" sz="quarter" idx="5"/>
+          </p:nvPr>
+        </p:nvSpPr>
+        <p:spPr/>
+        <p:txBody>
+          <a:bodyPr/>
+          <a:lstStyle/>
+          <a:p>
+            <a:fld id="{5089F5C8-CD77-4CFA-B6B5-FFE806853977}" type="slidenum">
+              <a:rPr lang="en-AU" smtClean="0"/>
+              <a:t>8</a:t>
+            </a:fld>
+            <a:endParaRPr lang="en-AU"/>
+          </a:p>
+        </p:txBody>
+      </p:sp>
+    </p:spTree>
+    <p:extLst>
+      <p:ext uri="{BB962C8B-B14F-4D97-AF65-F5344CB8AC3E}">
+        <p14:creationId xmlns:p14="http://schemas.microsoft.com/office/powerpoint/2010/main" val="2716022461"/>
       </p:ext>
     </p:extLst>
   </p:cSld>
@@ -21569,6 +21706,819 @@
 </p:sld>
 </file>
 
+<file path=ppt/slides/slide8.xml><?xml version="1.0" encoding="utf-8"?>
+<p:sld xmlns:a="http://schemas.openxmlformats.org/drawingml/2006/main" xmlns:r="http://schemas.openxmlformats.org/officeDocument/2006/relationships" xmlns:p="http://schemas.openxmlformats.org/presentationml/2006/main">
+  <p:cSld>
+    <p:spTree>
+      <p:nvGrpSpPr>
+        <p:cNvPr id="1" name="">
+          <a:extLst>
+            <a:ext uri="{FF2B5EF4-FFF2-40B4-BE49-F238E27FC236}">
+              <a16:creationId xmlns:a16="http://schemas.microsoft.com/office/drawing/2014/main" id="{BB0C63B5-0CD0-D221-BECF-576431C9FEF6}"/>
+            </a:ext>
+          </a:extLst>
+        </p:cNvPr>
+        <p:cNvGrpSpPr/>
+        <p:nvPr/>
+      </p:nvGrpSpPr>
+      <p:grpSpPr>
+        <a:xfrm>
+          <a:off x="0" y="0"/>
+          <a:ext cx="0" cy="0"/>
+          <a:chOff x="0" y="0"/>
+          <a:chExt cx="0" cy="0"/>
+        </a:xfrm>
+      </p:grpSpPr>
+      <p:sp>
+        <p:nvSpPr>
+          <p:cNvPr id="7" name="TextBox 6">
+            <a:extLst>
+              <a:ext uri="{FF2B5EF4-FFF2-40B4-BE49-F238E27FC236}">
+                <a16:creationId xmlns:a16="http://schemas.microsoft.com/office/drawing/2014/main" id="{742C76CD-E1D1-A2CB-DE26-B27A379CC881}"/>
+              </a:ext>
+            </a:extLst>
+          </p:cNvPr>
+          <p:cNvSpPr txBox="1"/>
+          <p:nvPr/>
+        </p:nvSpPr>
+        <p:spPr>
+          <a:xfrm>
+            <a:off x="971721" y="516309"/>
+            <a:ext cx="9789280" cy="1323439"/>
+          </a:xfrm>
+          <a:prstGeom prst="rect">
+            <a:avLst/>
+          </a:prstGeom>
+          <a:noFill/>
+        </p:spPr>
+        <p:txBody>
+          <a:bodyPr wrap="square" rtlCol="0">
+            <a:spAutoFit/>
+          </a:bodyPr>
+          <a:lstStyle/>
+          <a:p>
+            <a:r>
+              <a:rPr lang="en-US" sz="4000" b="1" dirty="0">
+                <a:solidFill>
+                  <a:schemeClr val="tx1"/>
+                </a:solidFill>
+                <a:latin typeface="Tw Cen MT Bold" panose="020B0802020104020603" pitchFamily="34" charset="0"/>
+              </a:rPr>
+              <a:t>PART II: Interpreting MRI Demonstrated Through Facial Analysis</a:t>
+            </a:r>
+            <a:endParaRPr lang="en-AU" sz="4000" dirty="0">
+              <a:solidFill>
+                <a:schemeClr val="tx1"/>
+              </a:solidFill>
+              <a:latin typeface="Tw Cen MT" panose="020B0602020104020603" pitchFamily="34" charset="0"/>
+            </a:endParaRPr>
+          </a:p>
+        </p:txBody>
+      </p:sp>
+      <p:sp>
+        <p:nvSpPr>
+          <p:cNvPr id="4" name="Subtitle 4">
+            <a:extLst>
+              <a:ext uri="{FF2B5EF4-FFF2-40B4-BE49-F238E27FC236}">
+                <a16:creationId xmlns:a16="http://schemas.microsoft.com/office/drawing/2014/main" id="{8A2016FA-69CD-0632-D837-4ED22A91FCFB}"/>
+              </a:ext>
+            </a:extLst>
+          </p:cNvPr>
+          <p:cNvSpPr txBox="1">
+            <a:spLocks/>
+          </p:cNvSpPr>
+          <p:nvPr/>
+        </p:nvSpPr>
+        <p:spPr>
+          <a:xfrm>
+            <a:off x="429541" y="2024836"/>
+            <a:ext cx="5666459" cy="4290014"/>
+          </a:xfrm>
+          <a:prstGeom prst="rect">
+            <a:avLst/>
+          </a:prstGeom>
+          <a:noFill/>
+          <a:ln>
+            <a:noFill/>
+          </a:ln>
+        </p:spPr>
+        <p:txBody>
+          <a:bodyPr spcFirstLastPara="1" wrap="square" lIns="91425" tIns="91425" rIns="91425" bIns="91425" anchor="t" anchorCtr="0">
+            <a:noAutofit/>
+          </a:bodyPr>
+          <a:lstStyle>
+            <a:defPPr marR="0" lvl="0" algn="l" rtl="0">
+              <a:lnSpc>
+                <a:spcPct val="100000"/>
+              </a:lnSpc>
+              <a:spcBef>
+                <a:spcPts val="0"/>
+              </a:spcBef>
+              <a:spcAft>
+                <a:spcPts val="0"/>
+              </a:spcAft>
+            </a:defPPr>
+            <a:lvl1pPr marL="457200" marR="0" lvl="0" indent="-304800" algn="l" rtl="0" eaLnBrk="1" hangingPunct="1">
+              <a:lnSpc>
+                <a:spcPct val="100000"/>
+              </a:lnSpc>
+              <a:spcBef>
+                <a:spcPts val="0"/>
+              </a:spcBef>
+              <a:spcAft>
+                <a:spcPts val="0"/>
+              </a:spcAft>
+              <a:buClr>
+                <a:schemeClr val="dk1"/>
+              </a:buClr>
+              <a:buSzPts val="1200"/>
+              <a:buFont typeface="Albert Sans"/>
+              <a:buNone/>
+              <a:defRPr sz="1200" b="0" i="0" u="none" strike="noStrike" cap="none">
+                <a:solidFill>
+                  <a:schemeClr val="dk1"/>
+                </a:solidFill>
+                <a:latin typeface="Albert Sans"/>
+                <a:ea typeface="Albert Sans"/>
+                <a:cs typeface="Albert Sans"/>
+                <a:sym typeface="Albert Sans"/>
+              </a:defRPr>
+            </a:lvl1pPr>
+            <a:lvl2pPr marL="914400" marR="0" lvl="1" indent="-304800" algn="ctr" rtl="0" eaLnBrk="1" hangingPunct="1">
+              <a:lnSpc>
+                <a:spcPct val="100000"/>
+              </a:lnSpc>
+              <a:spcBef>
+                <a:spcPts val="0"/>
+              </a:spcBef>
+              <a:spcAft>
+                <a:spcPts val="0"/>
+              </a:spcAft>
+              <a:buClr>
+                <a:schemeClr val="dk1"/>
+              </a:buClr>
+              <a:buSzPts val="1200"/>
+              <a:buFont typeface="Albert Sans"/>
+              <a:buNone/>
+              <a:defRPr sz="1200" b="0" i="0" u="none" strike="noStrike" cap="none">
+                <a:solidFill>
+                  <a:schemeClr val="dk1"/>
+                </a:solidFill>
+                <a:latin typeface="Albert Sans"/>
+                <a:ea typeface="Albert Sans"/>
+                <a:cs typeface="Albert Sans"/>
+                <a:sym typeface="Albert Sans"/>
+              </a:defRPr>
+            </a:lvl2pPr>
+            <a:lvl3pPr marL="1371600" marR="0" lvl="2" indent="-304800" algn="ctr" rtl="0" eaLnBrk="1" hangingPunct="1">
+              <a:lnSpc>
+                <a:spcPct val="100000"/>
+              </a:lnSpc>
+              <a:spcBef>
+                <a:spcPts val="0"/>
+              </a:spcBef>
+              <a:spcAft>
+                <a:spcPts val="0"/>
+              </a:spcAft>
+              <a:buClr>
+                <a:schemeClr val="dk1"/>
+              </a:buClr>
+              <a:buSzPts val="1200"/>
+              <a:buFont typeface="Albert Sans"/>
+              <a:buNone/>
+              <a:defRPr sz="1200" b="0" i="0" u="none" strike="noStrike" cap="none">
+                <a:solidFill>
+                  <a:schemeClr val="dk1"/>
+                </a:solidFill>
+                <a:latin typeface="Albert Sans"/>
+                <a:ea typeface="Albert Sans"/>
+                <a:cs typeface="Albert Sans"/>
+                <a:sym typeface="Albert Sans"/>
+              </a:defRPr>
+            </a:lvl3pPr>
+            <a:lvl4pPr marL="1828800" marR="0" lvl="3" indent="-304800" algn="ctr" rtl="0" eaLnBrk="1" hangingPunct="1">
+              <a:lnSpc>
+                <a:spcPct val="100000"/>
+              </a:lnSpc>
+              <a:spcBef>
+                <a:spcPts val="0"/>
+              </a:spcBef>
+              <a:spcAft>
+                <a:spcPts val="0"/>
+              </a:spcAft>
+              <a:buClr>
+                <a:schemeClr val="dk1"/>
+              </a:buClr>
+              <a:buSzPts val="1200"/>
+              <a:buFont typeface="Albert Sans"/>
+              <a:buNone/>
+              <a:defRPr sz="1200" b="0" i="0" u="none" strike="noStrike" cap="none">
+                <a:solidFill>
+                  <a:schemeClr val="dk1"/>
+                </a:solidFill>
+                <a:latin typeface="Albert Sans"/>
+                <a:ea typeface="Albert Sans"/>
+                <a:cs typeface="Albert Sans"/>
+                <a:sym typeface="Albert Sans"/>
+              </a:defRPr>
+            </a:lvl4pPr>
+            <a:lvl5pPr marL="2286000" marR="0" lvl="4" indent="-304800" algn="ctr" rtl="0" eaLnBrk="1" hangingPunct="1">
+              <a:lnSpc>
+                <a:spcPct val="100000"/>
+              </a:lnSpc>
+              <a:spcBef>
+                <a:spcPts val="0"/>
+              </a:spcBef>
+              <a:spcAft>
+                <a:spcPts val="0"/>
+              </a:spcAft>
+              <a:buClr>
+                <a:schemeClr val="dk1"/>
+              </a:buClr>
+              <a:buSzPts val="1200"/>
+              <a:buFont typeface="Albert Sans"/>
+              <a:buNone/>
+              <a:defRPr sz="1200" b="0" i="0" u="none" strike="noStrike" cap="none">
+                <a:solidFill>
+                  <a:schemeClr val="dk1"/>
+                </a:solidFill>
+                <a:latin typeface="Albert Sans"/>
+                <a:ea typeface="Albert Sans"/>
+                <a:cs typeface="Albert Sans"/>
+                <a:sym typeface="Albert Sans"/>
+              </a:defRPr>
+            </a:lvl5pPr>
+            <a:lvl6pPr marL="2743200" marR="0" lvl="5" indent="-304800" algn="ctr" rtl="0" eaLnBrk="1" hangingPunct="1">
+              <a:lnSpc>
+                <a:spcPct val="100000"/>
+              </a:lnSpc>
+              <a:spcBef>
+                <a:spcPts val="0"/>
+              </a:spcBef>
+              <a:spcAft>
+                <a:spcPts val="0"/>
+              </a:spcAft>
+              <a:buClr>
+                <a:schemeClr val="dk1"/>
+              </a:buClr>
+              <a:buSzPts val="1200"/>
+              <a:buFont typeface="Albert Sans"/>
+              <a:buNone/>
+              <a:defRPr sz="1200" b="0" i="0" u="none" strike="noStrike" cap="none">
+                <a:solidFill>
+                  <a:schemeClr val="dk1"/>
+                </a:solidFill>
+                <a:latin typeface="Albert Sans"/>
+                <a:ea typeface="Albert Sans"/>
+                <a:cs typeface="Albert Sans"/>
+                <a:sym typeface="Albert Sans"/>
+              </a:defRPr>
+            </a:lvl6pPr>
+            <a:lvl7pPr marL="3200400" marR="0" lvl="6" indent="-304800" algn="ctr" rtl="0" eaLnBrk="1" hangingPunct="1">
+              <a:lnSpc>
+                <a:spcPct val="100000"/>
+              </a:lnSpc>
+              <a:spcBef>
+                <a:spcPts val="0"/>
+              </a:spcBef>
+              <a:spcAft>
+                <a:spcPts val="0"/>
+              </a:spcAft>
+              <a:buClr>
+                <a:schemeClr val="dk1"/>
+              </a:buClr>
+              <a:buSzPts val="1200"/>
+              <a:buFont typeface="Albert Sans"/>
+              <a:buNone/>
+              <a:defRPr sz="1200" b="0" i="0" u="none" strike="noStrike" cap="none">
+                <a:solidFill>
+                  <a:schemeClr val="dk1"/>
+                </a:solidFill>
+                <a:latin typeface="Albert Sans"/>
+                <a:ea typeface="Albert Sans"/>
+                <a:cs typeface="Albert Sans"/>
+                <a:sym typeface="Albert Sans"/>
+              </a:defRPr>
+            </a:lvl7pPr>
+            <a:lvl8pPr marL="3657600" marR="0" lvl="7" indent="-304800" algn="ctr" rtl="0" eaLnBrk="1" hangingPunct="1">
+              <a:lnSpc>
+                <a:spcPct val="100000"/>
+              </a:lnSpc>
+              <a:spcBef>
+                <a:spcPts val="0"/>
+              </a:spcBef>
+              <a:spcAft>
+                <a:spcPts val="0"/>
+              </a:spcAft>
+              <a:buClr>
+                <a:schemeClr val="dk1"/>
+              </a:buClr>
+              <a:buSzPts val="1200"/>
+              <a:buFont typeface="Albert Sans"/>
+              <a:buNone/>
+              <a:defRPr sz="1200" b="0" i="0" u="none" strike="noStrike" cap="none">
+                <a:solidFill>
+                  <a:schemeClr val="dk1"/>
+                </a:solidFill>
+                <a:latin typeface="Albert Sans"/>
+                <a:ea typeface="Albert Sans"/>
+                <a:cs typeface="Albert Sans"/>
+                <a:sym typeface="Albert Sans"/>
+              </a:defRPr>
+            </a:lvl8pPr>
+            <a:lvl9pPr marL="4114800" marR="0" lvl="8" indent="-304800" algn="ctr" rtl="0" eaLnBrk="1" hangingPunct="1">
+              <a:lnSpc>
+                <a:spcPct val="100000"/>
+              </a:lnSpc>
+              <a:spcBef>
+                <a:spcPts val="0"/>
+              </a:spcBef>
+              <a:spcAft>
+                <a:spcPts val="0"/>
+              </a:spcAft>
+              <a:buClr>
+                <a:schemeClr val="dk1"/>
+              </a:buClr>
+              <a:buSzPts val="1200"/>
+              <a:buFont typeface="Albert Sans"/>
+              <a:buNone/>
+              <a:defRPr sz="1200" b="0" i="0" u="none" strike="noStrike" cap="none">
+                <a:solidFill>
+                  <a:schemeClr val="dk1"/>
+                </a:solidFill>
+                <a:latin typeface="Albert Sans"/>
+                <a:ea typeface="Albert Sans"/>
+                <a:cs typeface="Albert Sans"/>
+                <a:sym typeface="Albert Sans"/>
+              </a:defRPr>
+            </a:lvl9pPr>
+          </a:lstStyle>
+          <a:p>
+            <a:pPr marL="609600" indent="-457200">
+              <a:lnSpc>
+                <a:spcPct val="150000"/>
+              </a:lnSpc>
+              <a:buFont typeface="Arial" panose="020B0604020202020204" pitchFamily="34" charset="0"/>
+              <a:buChar char="•"/>
+            </a:pPr>
+            <a:r>
+              <a:rPr lang="en-AU" sz="2000" dirty="0">
+                <a:latin typeface="Segoe UI Light" panose="020B0502040204020203" pitchFamily="34" charset="0"/>
+                <a:cs typeface="Segoe UI Light" panose="020B0502040204020203" pitchFamily="34" charset="0"/>
+              </a:rPr>
+              <a:t>MRI can be used to search for diseases within the brain.</a:t>
+            </a:r>
+          </a:p>
+          <a:p>
+            <a:pPr marL="609600" indent="-457200">
+              <a:lnSpc>
+                <a:spcPct val="150000"/>
+              </a:lnSpc>
+              <a:buFont typeface="Arial" panose="020B0604020202020204" pitchFamily="34" charset="0"/>
+              <a:buChar char="•"/>
+            </a:pPr>
+            <a:r>
+              <a:rPr lang="en-AU" sz="2000" dirty="0">
+                <a:latin typeface="Segoe UI Light" panose="020B0502040204020203" pitchFamily="34" charset="0"/>
+                <a:cs typeface="Segoe UI Light" panose="020B0502040204020203" pitchFamily="34" charset="0"/>
+              </a:rPr>
+              <a:t>Manual MRI analysis is often impractical.</a:t>
+            </a:r>
+          </a:p>
+          <a:p>
+            <a:pPr marL="609600" indent="-457200">
+              <a:lnSpc>
+                <a:spcPct val="150000"/>
+              </a:lnSpc>
+              <a:buFont typeface="Arial" panose="020B0604020202020204" pitchFamily="34" charset="0"/>
+              <a:buChar char="•"/>
+            </a:pPr>
+            <a:r>
+              <a:rPr lang="en-AU" sz="2000" dirty="0">
+                <a:latin typeface="Segoe UI Light" panose="020B0502040204020203" pitchFamily="34" charset="0"/>
+                <a:cs typeface="Segoe UI Light" panose="020B0502040204020203" pitchFamily="34" charset="0"/>
+              </a:rPr>
+              <a:t>Mathematical techniques can be used to extract key features from large datasets.</a:t>
+            </a:r>
+          </a:p>
+          <a:p>
+            <a:pPr marL="609600" indent="-457200">
+              <a:lnSpc>
+                <a:spcPct val="150000"/>
+              </a:lnSpc>
+              <a:buFont typeface="Arial" panose="020B0604020202020204" pitchFamily="34" charset="0"/>
+              <a:buChar char="•"/>
+            </a:pPr>
+            <a:r>
+              <a:rPr lang="en-AU" sz="2000" dirty="0">
+                <a:latin typeface="Segoe UI Light" panose="020B0502040204020203" pitchFamily="34" charset="0"/>
+                <a:cs typeface="Segoe UI Light" panose="020B0502040204020203" pitchFamily="34" charset="0"/>
+              </a:rPr>
+              <a:t>Our group created a moustache detector as a 2D proxy for an MRI disease flagger.</a:t>
+            </a:r>
+          </a:p>
+          <a:p>
+            <a:pPr marL="609600" indent="-457200">
+              <a:lnSpc>
+                <a:spcPct val="150000"/>
+              </a:lnSpc>
+              <a:buFont typeface="Arial" panose="020B0604020202020204" pitchFamily="34" charset="0"/>
+              <a:buChar char="•"/>
+            </a:pPr>
+            <a:r>
+              <a:rPr lang="en-AU" sz="2000" dirty="0">
+                <a:latin typeface="Segoe UI Light" panose="020B0502040204020203" pitchFamily="34" charset="0"/>
+                <a:cs typeface="Segoe UI Light" panose="020B0502040204020203" pitchFamily="34" charset="0"/>
+              </a:rPr>
+              <a:t>The extension to three dimensions is mathematically straight forward.</a:t>
+            </a:r>
+          </a:p>
+        </p:txBody>
+      </p:sp>
+      <p:pic>
+        <p:nvPicPr>
+          <p:cNvPr id="3" name="Picture 2" descr="A collage of different facial expressions&#10;&#10;AI-generated content may be incorrect.">
+            <a:extLst>
+              <a:ext uri="{FF2B5EF4-FFF2-40B4-BE49-F238E27FC236}">
+                <a16:creationId xmlns:a16="http://schemas.microsoft.com/office/drawing/2014/main" id="{AEF378F8-3CC3-0897-6806-1883FC2F9825}"/>
+              </a:ext>
+            </a:extLst>
+          </p:cNvPr>
+          <p:cNvPicPr>
+            <a:picLocks noChangeAspect="1"/>
+          </p:cNvPicPr>
+          <p:nvPr/>
+        </p:nvPicPr>
+        <p:blipFill>
+          <a:blip r:embed="rId3">
+            <a:extLst>
+              <a:ext uri="{28A0092B-C50C-407E-A947-70E740481C1C}">
+                <a14:useLocalDpi xmlns:a14="http://schemas.microsoft.com/office/drawing/2010/main" val="0"/>
+              </a:ext>
+            </a:extLst>
+          </a:blip>
+          <a:stretch>
+            <a:fillRect/>
+          </a:stretch>
+        </p:blipFill>
+        <p:spPr>
+          <a:xfrm>
+            <a:off x="6304547" y="2024837"/>
+            <a:ext cx="5515992" cy="4129114"/>
+          </a:xfrm>
+          <a:prstGeom prst="rect">
+            <a:avLst/>
+          </a:prstGeom>
+        </p:spPr>
+      </p:pic>
+    </p:spTree>
+    <p:extLst>
+      <p:ext uri="{BB962C8B-B14F-4D97-AF65-F5344CB8AC3E}">
+        <p14:creationId xmlns:p14="http://schemas.microsoft.com/office/powerpoint/2010/main" val="2242268055"/>
+      </p:ext>
+    </p:extLst>
+  </p:cSld>
+  <p:clrMapOvr>
+    <a:masterClrMapping/>
+  </p:clrMapOvr>
+  <p:timing>
+    <p:tnLst>
+      <p:par>
+        <p:cTn id="1" dur="indefinite" restart="never" nodeType="tmRoot">
+          <p:childTnLst>
+            <p:seq concurrent="1" nextAc="seek">
+              <p:cTn id="2" dur="indefinite" nodeType="mainSeq">
+                <p:childTnLst>
+                  <p:par>
+                    <p:cTn id="3" fill="hold">
+                      <p:stCondLst>
+                        <p:cond delay="indefinite"/>
+                      </p:stCondLst>
+                      <p:childTnLst>
+                        <p:par>
+                          <p:cTn id="4" fill="hold">
+                            <p:stCondLst>
+                              <p:cond delay="0"/>
+                            </p:stCondLst>
+                            <p:childTnLst>
+                              <p:par>
+                                <p:cTn id="5" presetID="10" presetClass="entr" presetSubtype="0" fill="hold" nodeType="clickEffect">
+                                  <p:stCondLst>
+                                    <p:cond delay="0"/>
+                                  </p:stCondLst>
+                                  <p:childTnLst>
+                                    <p:set>
+                                      <p:cBhvr>
+                                        <p:cTn id="6" dur="1" fill="hold">
+                                          <p:stCondLst>
+                                            <p:cond delay="0"/>
+                                          </p:stCondLst>
+                                        </p:cTn>
+                                        <p:tgtEl>
+                                          <p:spTgt spid="4">
+                                            <p:txEl>
+                                              <p:pRg st="0" end="0"/>
+                                            </p:txEl>
+                                          </p:spTgt>
+                                        </p:tgtEl>
+                                        <p:attrNameLst>
+                                          <p:attrName>style.visibility</p:attrName>
+                                        </p:attrNameLst>
+                                      </p:cBhvr>
+                                      <p:to>
+                                        <p:strVal val="visible"/>
+                                      </p:to>
+                                    </p:set>
+                                    <p:animEffect transition="in" filter="fade">
+                                      <p:cBhvr>
+                                        <p:cTn id="7" dur="500"/>
+                                        <p:tgtEl>
+                                          <p:spTgt spid="4">
+                                            <p:txEl>
+                                              <p:pRg st="0" end="0"/>
+                                            </p:txEl>
+                                          </p:spTgt>
+                                        </p:tgtEl>
+                                      </p:cBhvr>
+                                    </p:animEffect>
+                                  </p:childTnLst>
+                                </p:cTn>
+                              </p:par>
+                            </p:childTnLst>
+                          </p:cTn>
+                        </p:par>
+                      </p:childTnLst>
+                    </p:cTn>
+                  </p:par>
+                  <p:par>
+                    <p:cTn id="8" fill="hold">
+                      <p:stCondLst>
+                        <p:cond delay="indefinite"/>
+                      </p:stCondLst>
+                      <p:childTnLst>
+                        <p:par>
+                          <p:cTn id="9" fill="hold">
+                            <p:stCondLst>
+                              <p:cond delay="0"/>
+                            </p:stCondLst>
+                            <p:childTnLst>
+                              <p:par>
+                                <p:cTn id="10" presetID="10" presetClass="entr" presetSubtype="0" fill="hold" nodeType="clickEffect">
+                                  <p:stCondLst>
+                                    <p:cond delay="0"/>
+                                  </p:stCondLst>
+                                  <p:childTnLst>
+                                    <p:set>
+                                      <p:cBhvr>
+                                        <p:cTn id="11" dur="1" fill="hold">
+                                          <p:stCondLst>
+                                            <p:cond delay="0"/>
+                                          </p:stCondLst>
+                                        </p:cTn>
+                                        <p:tgtEl>
+                                          <p:spTgt spid="4">
+                                            <p:txEl>
+                                              <p:pRg st="1" end="1"/>
+                                            </p:txEl>
+                                          </p:spTgt>
+                                        </p:tgtEl>
+                                        <p:attrNameLst>
+                                          <p:attrName>style.visibility</p:attrName>
+                                        </p:attrNameLst>
+                                      </p:cBhvr>
+                                      <p:to>
+                                        <p:strVal val="visible"/>
+                                      </p:to>
+                                    </p:set>
+                                    <p:animEffect transition="in" filter="fade">
+                                      <p:cBhvr>
+                                        <p:cTn id="12" dur="500"/>
+                                        <p:tgtEl>
+                                          <p:spTgt spid="4">
+                                            <p:txEl>
+                                              <p:pRg st="1" end="1"/>
+                                            </p:txEl>
+                                          </p:spTgt>
+                                        </p:tgtEl>
+                                      </p:cBhvr>
+                                    </p:animEffect>
+                                  </p:childTnLst>
+                                </p:cTn>
+                              </p:par>
+                            </p:childTnLst>
+                          </p:cTn>
+                        </p:par>
+                      </p:childTnLst>
+                    </p:cTn>
+                  </p:par>
+                  <p:par>
+                    <p:cTn id="13" fill="hold">
+                      <p:stCondLst>
+                        <p:cond delay="indefinite"/>
+                      </p:stCondLst>
+                      <p:childTnLst>
+                        <p:par>
+                          <p:cTn id="14" fill="hold">
+                            <p:stCondLst>
+                              <p:cond delay="0"/>
+                            </p:stCondLst>
+                            <p:childTnLst>
+                              <p:par>
+                                <p:cTn id="15" presetID="10" presetClass="entr" presetSubtype="0" fill="hold" nodeType="clickEffect">
+                                  <p:stCondLst>
+                                    <p:cond delay="0"/>
+                                  </p:stCondLst>
+                                  <p:childTnLst>
+                                    <p:set>
+                                      <p:cBhvr>
+                                        <p:cTn id="16" dur="1" fill="hold">
+                                          <p:stCondLst>
+                                            <p:cond delay="0"/>
+                                          </p:stCondLst>
+                                        </p:cTn>
+                                        <p:tgtEl>
+                                          <p:spTgt spid="4">
+                                            <p:txEl>
+                                              <p:pRg st="2" end="2"/>
+                                            </p:txEl>
+                                          </p:spTgt>
+                                        </p:tgtEl>
+                                        <p:attrNameLst>
+                                          <p:attrName>style.visibility</p:attrName>
+                                        </p:attrNameLst>
+                                      </p:cBhvr>
+                                      <p:to>
+                                        <p:strVal val="visible"/>
+                                      </p:to>
+                                    </p:set>
+                                    <p:animEffect transition="in" filter="fade">
+                                      <p:cBhvr>
+                                        <p:cTn id="17" dur="500"/>
+                                        <p:tgtEl>
+                                          <p:spTgt spid="4">
+                                            <p:txEl>
+                                              <p:pRg st="2" end="2"/>
+                                            </p:txEl>
+                                          </p:spTgt>
+                                        </p:tgtEl>
+                                      </p:cBhvr>
+                                    </p:animEffect>
+                                  </p:childTnLst>
+                                </p:cTn>
+                              </p:par>
+                            </p:childTnLst>
+                          </p:cTn>
+                        </p:par>
+                      </p:childTnLst>
+                    </p:cTn>
+                  </p:par>
+                  <p:par>
+                    <p:cTn id="18" fill="hold">
+                      <p:stCondLst>
+                        <p:cond delay="indefinite"/>
+                      </p:stCondLst>
+                      <p:childTnLst>
+                        <p:par>
+                          <p:cTn id="19" fill="hold">
+                            <p:stCondLst>
+                              <p:cond delay="0"/>
+                            </p:stCondLst>
+                            <p:childTnLst>
+                              <p:par>
+                                <p:cTn id="20" presetID="10" presetClass="entr" presetSubtype="0" fill="hold" nodeType="clickEffect">
+                                  <p:stCondLst>
+                                    <p:cond delay="0"/>
+                                  </p:stCondLst>
+                                  <p:childTnLst>
+                                    <p:set>
+                                      <p:cBhvr>
+                                        <p:cTn id="21" dur="1" fill="hold">
+                                          <p:stCondLst>
+                                            <p:cond delay="0"/>
+                                          </p:stCondLst>
+                                        </p:cTn>
+                                        <p:tgtEl>
+                                          <p:spTgt spid="4">
+                                            <p:txEl>
+                                              <p:pRg st="3" end="3"/>
+                                            </p:txEl>
+                                          </p:spTgt>
+                                        </p:tgtEl>
+                                        <p:attrNameLst>
+                                          <p:attrName>style.visibility</p:attrName>
+                                        </p:attrNameLst>
+                                      </p:cBhvr>
+                                      <p:to>
+                                        <p:strVal val="visible"/>
+                                      </p:to>
+                                    </p:set>
+                                    <p:animEffect transition="in" filter="fade">
+                                      <p:cBhvr>
+                                        <p:cTn id="22" dur="500"/>
+                                        <p:tgtEl>
+                                          <p:spTgt spid="4">
+                                            <p:txEl>
+                                              <p:pRg st="3" end="3"/>
+                                            </p:txEl>
+                                          </p:spTgt>
+                                        </p:tgtEl>
+                                      </p:cBhvr>
+                                    </p:animEffect>
+                                  </p:childTnLst>
+                                </p:cTn>
+                              </p:par>
+                            </p:childTnLst>
+                          </p:cTn>
+                        </p:par>
+                      </p:childTnLst>
+                    </p:cTn>
+                  </p:par>
+                  <p:par>
+                    <p:cTn id="23" fill="hold">
+                      <p:stCondLst>
+                        <p:cond delay="indefinite"/>
+                      </p:stCondLst>
+                      <p:childTnLst>
+                        <p:par>
+                          <p:cTn id="24" fill="hold">
+                            <p:stCondLst>
+                              <p:cond delay="0"/>
+                            </p:stCondLst>
+                            <p:childTnLst>
+                              <p:par>
+                                <p:cTn id="25" presetID="10" presetClass="entr" presetSubtype="0" fill="hold" nodeType="clickEffect">
+                                  <p:stCondLst>
+                                    <p:cond delay="0"/>
+                                  </p:stCondLst>
+                                  <p:childTnLst>
+                                    <p:set>
+                                      <p:cBhvr>
+                                        <p:cTn id="26" dur="1" fill="hold">
+                                          <p:stCondLst>
+                                            <p:cond delay="0"/>
+                                          </p:stCondLst>
+                                        </p:cTn>
+                                        <p:tgtEl>
+                                          <p:spTgt spid="4">
+                                            <p:txEl>
+                                              <p:pRg st="4" end="4"/>
+                                            </p:txEl>
+                                          </p:spTgt>
+                                        </p:tgtEl>
+                                        <p:attrNameLst>
+                                          <p:attrName>style.visibility</p:attrName>
+                                        </p:attrNameLst>
+                                      </p:cBhvr>
+                                      <p:to>
+                                        <p:strVal val="visible"/>
+                                      </p:to>
+                                    </p:set>
+                                    <p:animEffect transition="in" filter="fade">
+                                      <p:cBhvr>
+                                        <p:cTn id="27" dur="500"/>
+                                        <p:tgtEl>
+                                          <p:spTgt spid="4">
+                                            <p:txEl>
+                                              <p:pRg st="4" end="4"/>
+                                            </p:txEl>
+                                          </p:spTgt>
+                                        </p:tgtEl>
+                                      </p:cBhvr>
+                                    </p:animEffect>
+                                  </p:childTnLst>
+                                </p:cTn>
+                              </p:par>
+                            </p:childTnLst>
+                          </p:cTn>
+                        </p:par>
+                      </p:childTnLst>
+                    </p:cTn>
+                  </p:par>
+                </p:childTnLst>
+              </p:cTn>
+              <p:prevCondLst>
+                <p:cond evt="onPrev" delay="0">
+                  <p:tgtEl>
+                    <p:sldTgt/>
+                  </p:tgtEl>
+                </p:cond>
+              </p:prevCondLst>
+              <p:nextCondLst>
+                <p:cond evt="onNext" delay="0">
+                  <p:tgtEl>
+                    <p:sldTgt/>
+                  </p:tgtEl>
+                </p:cond>
+              </p:nextCondLst>
+            </p:seq>
+          </p:childTnLst>
+        </p:cTn>
+      </p:par>
+    </p:tnLst>
+  </p:timing>
+</p:sld>
+</file>
+
 <file path=ppt/theme/theme1.xml><?xml version="1.0" encoding="utf-8"?>
 <a:theme xmlns:a="http://schemas.openxmlformats.org/drawingml/2006/main" name="Tech Startup by Slidesgo">
   <a:themeElements>

</xml_diff>

<commit_message>
Shortened script to fit to time.
</commit_message>
<xml_diff>
--- a/Report/Presentation.pptx
+++ b/Report/Presentation.pptx
@@ -1224,10 +1224,8 @@
                 <a:ea typeface="+mn-ea"/>
                 <a:cs typeface="+mn-cs"/>
               </a:rPr>
-              <a:t>A significant use case for MRI is the identification of neurodegenerative diseases and/or tumours within the brain. MRI scans produce enormous amounts of data which can be extremely difficult to analyse manually. As such, a combination of mathematical and machine learning techniques are often employed in conjunction with one another to aid such analysis. As a group we used a mathematical technique common in this field to create a model that can detect moustaches within images of faces with a high degree of accuracy. This was done as a demonstrative proxy for the use of this technique in the identification of tumours and/or biomarkers of disease within MRI brain scans. In a real implementation, machine learning would most likely be used in conjunction with the mathematical technique, however since we are mainly focusing on the mathematics, our detector did not rely on any machine learning techniques. It should be noted that although our chosen proxy is two dimensional while MRI data is three dimensional, extending the maths to three dimensions is extremely simple.</a:t>
+              <a:t>A significant use case for MRI is the identification of neurodegenerative diseases and/or tumours within the brain. MRI scans produce enormous amounts of data which can be extremely difficult to analyse manually. As such, a combination of mathematical and machine learning techniques are often employed in conjunction with one another to aid such analysis. As a group we used a mathematical technique common in this field to create a model that can detect moustaches within images of faces. This was done as a demonstrative proxy for the use of this technique in the identification of tumours and/or biomarkers of disease within MRI brain scans. </a:t>
             </a:r>
-          </a:p>
-          <a:p>
             <a:r>
               <a:rPr lang="en-AU" sz="1200" kern="1200">
                 <a:solidFill>
@@ -1238,11 +1236,8 @@
                 <a:ea typeface="+mn-ea"/>
                 <a:cs typeface="+mn-cs"/>
               </a:rPr>
-              <a:t> </a:t>
+              <a:t>It should be noted that although our chosen proxy is two dimensional while MRI data is three dimensional, extending the maths to three dimensions is extremely simple.</a:t>
             </a:r>
-          </a:p>
-          <a:p>
-            <a:endParaRPr lang="en-AU" dirty="0"/>
           </a:p>
         </p:txBody>
       </p:sp>
@@ -22167,6 +22162,47 @@
             <a:ext cx="5515992" cy="4129114"/>
           </a:xfrm>
           <a:prstGeom prst="rect">
+            <a:avLst/>
+          </a:prstGeom>
+        </p:spPr>
+      </p:pic>
+      <p:pic>
+        <p:nvPicPr>
+          <p:cNvPr id="6" name="Video 5">
+            <a:extLst>
+              <a:ext uri="{FF2B5EF4-FFF2-40B4-BE49-F238E27FC236}">
+                <a16:creationId xmlns:a16="http://schemas.microsoft.com/office/drawing/2014/main" id="{14DAE32C-CD57-D821-DAB8-BBE52668CEE0}"/>
+              </a:ext>
+            </a:extLst>
+          </p:cNvPr>
+          <p:cNvPicPr>
+            <a:extLst>
+              <a:ext uri="{51228E76-BA90-4043-B771-695A4F85340A}">
+                <alf:liveFeedProps xmlns:alf="http://schemas.microsoft.com/office/drawing/2021/livefeed"/>
+              </a:ext>
+            </a:extLst>
+          </p:cNvPicPr>
+          <p:nvPr/>
+        </p:nvPicPr>
+        <p:blipFill>
+          <a:blip r:embed="rId4">
+            <a:extLst>
+              <a:ext uri="{96DAC541-7B7A-43D3-8B79-37D633B846F1}">
+                <asvg:svgBlip xmlns:asvg="http://schemas.microsoft.com/office/drawing/2016/SVG/main" r:embed="rId5"/>
+              </a:ext>
+            </a:extLst>
+          </a:blip>
+          <a:srcRect l="21875" r="21875"/>
+          <a:stretch>
+            <a:fillRect/>
+          </a:stretch>
+        </p:blipFill>
+        <p:spPr>
+          <a:xfrm>
+            <a:off x="10052304" y="4718304"/>
+            <a:ext cx="2057400" cy="2057400"/>
+          </a:xfrm>
+          <a:prstGeom prst="ellipse">
             <a:avLst/>
           </a:prstGeom>
         </p:spPr>

</xml_diff>

<commit_message>
Changed locaton of face for recording
</commit_message>
<xml_diff>
--- a/Report/Presentation.pptx
+++ b/Report/Presentation.pptx
@@ -1224,19 +1224,7 @@
                 <a:ea typeface="+mn-ea"/>
                 <a:cs typeface="+mn-cs"/>
               </a:rPr>
-              <a:t>A significant use case for MRI is the identification of neurodegenerative diseases and/or tumours within the brain. MRI scans produce enormous amounts of data which can be extremely difficult to analyse manually. As such, a combination of mathematical and machine learning techniques are often employed in conjunction with one another to aid such analysis. As a group we used a mathematical technique common in this field to create a model that can detect moustaches within images of faces. This was done as a demonstrative proxy for the use of this technique in the identification of tumours and/or biomarkers of disease within MRI brain scans. </a:t>
-            </a:r>
-            <a:r>
-              <a:rPr lang="en-AU" sz="1200" kern="1200">
-                <a:solidFill>
-                  <a:schemeClr val="tx1"/>
-                </a:solidFill>
-                <a:effectLst/>
-                <a:latin typeface="+mn-lt"/>
-                <a:ea typeface="+mn-ea"/>
-                <a:cs typeface="+mn-cs"/>
-              </a:rPr>
-              <a:t>It should be noted that although our chosen proxy is two dimensional while MRI data is three dimensional, extending the maths to three dimensions is extremely simple.</a:t>
+              <a:t>A significant use case for MRI is the identification of neurodegenerative diseases and/or tumours within the brain. MRI scans produce enormous amounts of data which can be extremely difficult to analyse manually. As such, a combination of mathematical and machine learning techniques are often employed in conjunction with one another to aid such analysis. As a group we used a mathematical technique common in this field to create a model that can detect moustaches within images of faces. This was done as a demonstrative proxy for the use of this technique in the identification of tumours and/or biomarkers of disease within MRI brain scans. It should be noted that although our chosen proxy is two dimensional while MRI data is three dimensional, extending the maths to three dimensions is extremely simple.</a:t>
             </a:r>
           </a:p>
         </p:txBody>
@@ -22158,7 +22146,7 @@
         </p:blipFill>
         <p:spPr>
           <a:xfrm>
-            <a:off x="6304547" y="2024837"/>
+            <a:off x="6246467" y="2383183"/>
             <a:ext cx="5515992" cy="4129114"/>
           </a:xfrm>
           <a:prstGeom prst="rect">
@@ -22199,7 +22187,7 @@
         </p:blipFill>
         <p:spPr>
           <a:xfrm>
-            <a:off x="10052304" y="4718304"/>
+            <a:off x="9940848" y="149328"/>
             <a:ext cx="2057400" cy="2057400"/>
           </a:xfrm>
           <a:prstGeom prst="ellipse">

</xml_diff>

<commit_message>
Changed immage on my slide
</commit_message>
<xml_diff>
--- a/Report/Presentation.pptx
+++ b/Report/Presentation.pptx
@@ -22120,42 +22120,6 @@
       </p:sp>
       <p:pic>
         <p:nvPicPr>
-          <p:cNvPr id="3" name="Picture 2" descr="A collage of different facial expressions&#10;&#10;AI-generated content may be incorrect.">
-            <a:extLst>
-              <a:ext uri="{FF2B5EF4-FFF2-40B4-BE49-F238E27FC236}">
-                <a16:creationId xmlns:a16="http://schemas.microsoft.com/office/drawing/2014/main" id="{AEF378F8-3CC3-0897-6806-1883FC2F9825}"/>
-              </a:ext>
-            </a:extLst>
-          </p:cNvPr>
-          <p:cNvPicPr>
-            <a:picLocks noChangeAspect="1"/>
-          </p:cNvPicPr>
-          <p:nvPr/>
-        </p:nvPicPr>
-        <p:blipFill>
-          <a:blip r:embed="rId3">
-            <a:extLst>
-              <a:ext uri="{28A0092B-C50C-407E-A947-70E740481C1C}">
-                <a14:useLocalDpi xmlns:a14="http://schemas.microsoft.com/office/drawing/2010/main" val="0"/>
-              </a:ext>
-            </a:extLst>
-          </a:blip>
-          <a:stretch>
-            <a:fillRect/>
-          </a:stretch>
-        </p:blipFill>
-        <p:spPr>
-          <a:xfrm>
-            <a:off x="6246467" y="2383183"/>
-            <a:ext cx="5515992" cy="4129114"/>
-          </a:xfrm>
-          <a:prstGeom prst="rect">
-            <a:avLst/>
-          </a:prstGeom>
-        </p:spPr>
-      </p:pic>
-      <p:pic>
-        <p:nvPicPr>
           <p:cNvPr id="6" name="Video 5">
             <a:extLst>
               <a:ext uri="{FF2B5EF4-FFF2-40B4-BE49-F238E27FC236}">
@@ -22173,10 +22137,10 @@
           <p:nvPr/>
         </p:nvPicPr>
         <p:blipFill>
-          <a:blip r:embed="rId4">
+          <a:blip r:embed="rId3">
             <a:extLst>
               <a:ext uri="{96DAC541-7B7A-43D3-8B79-37D633B846F1}">
-                <asvg:svgBlip xmlns:asvg="http://schemas.microsoft.com/office/drawing/2016/SVG/main" r:embed="rId5"/>
+                <asvg:svgBlip xmlns:asvg="http://schemas.microsoft.com/office/drawing/2016/SVG/main" r:embed="rId4"/>
               </a:ext>
             </a:extLst>
           </a:blip>
@@ -22191,6 +22155,42 @@
             <a:ext cx="2057400" cy="2057400"/>
           </a:xfrm>
           <a:prstGeom prst="ellipse">
+            <a:avLst/>
+          </a:prstGeom>
+        </p:spPr>
+      </p:pic>
+      <p:pic>
+        <p:nvPicPr>
+          <p:cNvPr id="5" name="Picture 4" descr="A collage of different facial expressions&#10;&#10;AI-generated content may be incorrect.">
+            <a:extLst>
+              <a:ext uri="{FF2B5EF4-FFF2-40B4-BE49-F238E27FC236}">
+                <a16:creationId xmlns:a16="http://schemas.microsoft.com/office/drawing/2014/main" id="{794C08D2-9FEA-5EB6-9BF9-6A068A609705}"/>
+              </a:ext>
+            </a:extLst>
+          </p:cNvPr>
+          <p:cNvPicPr>
+            <a:picLocks noChangeAspect="1"/>
+          </p:cNvPicPr>
+          <p:nvPr/>
+        </p:nvPicPr>
+        <p:blipFill>
+          <a:blip r:embed="rId5">
+            <a:extLst>
+              <a:ext uri="{28A0092B-C50C-407E-A947-70E740481C1C}">
+                <a14:useLocalDpi xmlns:a14="http://schemas.microsoft.com/office/drawing/2010/main" val="0"/>
+              </a:ext>
+            </a:extLst>
+          </a:blip>
+          <a:stretch>
+            <a:fillRect/>
+          </a:stretch>
+        </p:blipFill>
+        <p:spPr>
+          <a:xfrm>
+            <a:off x="6331550" y="2404247"/>
+            <a:ext cx="5548684" cy="4153586"/>
+          </a:xfrm>
+          <a:prstGeom prst="rect">
             <a:avLst/>
           </a:prstGeom>
         </p:spPr>

</xml_diff>